<commit_message>
Corrections de petites erreurs.
</commit_message>
<xml_diff>
--- a/Soutenance/Horn_Mickael_presentation_4_102022.pptx
+++ b/Soutenance/Horn_Mickael_presentation_4_102022.pptx
@@ -359,7 +359,7 @@
           <a:p>
             <a:fld id="{ED291B17-9318-49DB-B28B-6E5994AE9581}" type="datetime1">
               <a:rPr lang="en-US" smtClean="0"/>
-              <a:t>1/9/23</a:t>
+              <a:t>1/10/23</a:t>
             </a:fld>
             <a:endParaRPr lang="en-US"/>
           </a:p>
@@ -562,7 +562,7 @@
           <a:p>
             <a:fld id="{2CED4963-E985-44C4-B8C4-FDD613B7C2F8}" type="datetime1">
               <a:rPr lang="en-US" smtClean="0"/>
-              <a:t>1/9/23</a:t>
+              <a:t>1/10/23</a:t>
             </a:fld>
             <a:endParaRPr lang="en-US"/>
           </a:p>
@@ -924,7 +924,7 @@
           <a:p>
             <a:fld id="{ED291B17-9318-49DB-B28B-6E5994AE9581}" type="datetime1">
               <a:rPr lang="en-US" smtClean="0"/>
-              <a:t>1/9/23</a:t>
+              <a:t>1/10/23</a:t>
             </a:fld>
             <a:endParaRPr lang="en-US"/>
           </a:p>
@@ -1122,7 +1122,7 @@
           <a:p>
             <a:fld id="{78DD82B9-B8EE-4375-B6FF-88FA6ABB15D9}" type="datetime1">
               <a:rPr lang="en-US" smtClean="0"/>
-              <a:t>1/9/23</a:t>
+              <a:t>1/10/23</a:t>
             </a:fld>
             <a:endParaRPr lang="en-US"/>
           </a:p>
@@ -1434,7 +1434,7 @@
           <a:p>
             <a:fld id="{B2497495-0637-405E-AE64-5CC7506D51F5}" type="datetime1">
               <a:rPr lang="en-US" smtClean="0"/>
-              <a:t>1/9/23</a:t>
+              <a:t>1/10/23</a:t>
             </a:fld>
             <a:endParaRPr lang="en-US"/>
           </a:p>
@@ -1687,7 +1687,7 @@
           <a:p>
             <a:fld id="{7BFFD690-9426-415D-8B65-26881E07B2D4}" type="datetime1">
               <a:rPr lang="en-US" smtClean="0"/>
-              <a:t>1/9/23</a:t>
+              <a:t>1/10/23</a:t>
             </a:fld>
             <a:endParaRPr lang="en-US"/>
           </a:p>
@@ -2109,7 +2109,7 @@
           <a:p>
             <a:fld id="{04C4989A-474C-40DE-95B9-011C28B71673}" type="datetime1">
               <a:rPr lang="en-US" smtClean="0"/>
-              <a:t>1/9/23</a:t>
+              <a:t>1/10/23</a:t>
             </a:fld>
             <a:endParaRPr lang="en-US"/>
           </a:p>
@@ -2232,7 +2232,7 @@
           <a:p>
             <a:fld id="{5DB4ED54-5B5E-4A04-93D3-5772E3CE3818}" type="datetime1">
               <a:rPr lang="en-US" smtClean="0"/>
-              <a:t>1/9/23</a:t>
+              <a:t>1/10/23</a:t>
             </a:fld>
             <a:endParaRPr lang="en-US"/>
           </a:p>
@@ -2327,7 +2327,7 @@
           <a:p>
             <a:fld id="{4EDE50D6-574B-40AF-946F-D52A04ADE379}" type="datetime1">
               <a:rPr lang="en-US" smtClean="0"/>
-              <a:t>1/9/23</a:t>
+              <a:t>1/10/23</a:t>
             </a:fld>
             <a:endParaRPr lang="en-US"/>
           </a:p>
@@ -2704,7 +2704,7 @@
           <a:p>
             <a:fld id="{D82884F1-FFEA-405F-9602-3DCA865EDA4E}" type="datetime1">
               <a:rPr lang="en-US" smtClean="0"/>
-              <a:t>1/9/23</a:t>
+              <a:t>1/10/23</a:t>
             </a:fld>
             <a:endParaRPr lang="en-US"/>
           </a:p>
@@ -2996,7 +2996,7 @@
           <a:p>
             <a:fld id="{7E18DB4A-8810-4A10-AD5C-D5E2C667F5B3}" type="datetime1">
               <a:rPr lang="en-US" smtClean="0"/>
-              <a:t>1/9/23</a:t>
+              <a:t>1/10/23</a:t>
             </a:fld>
             <a:endParaRPr lang="en-US"/>
           </a:p>
@@ -3211,7 +3211,7 @@
           <a:p>
             <a:fld id="{ED291B17-9318-49DB-B28B-6E5994AE9581}" type="datetime1">
               <a:rPr lang="en-US" smtClean="0"/>
-              <a:t>1/9/23</a:t>
+              <a:t>1/10/23</a:t>
             </a:fld>
             <a:endParaRPr lang="en-US"/>
           </a:p>
@@ -4268,7 +4268,7 @@
               <a:buChar char=""/>
             </a:pPr>
             <a:r>
-              <a:rPr lang="en-US" dirty="0" err="1">
+              <a:rPr lang="en-US" err="1">
                 <a:solidFill>
                   <a:schemeClr val="tx1">
                     <a:lumMod val="75000"/>
@@ -4279,7 +4279,7 @@
               <a:t>Projet</a:t>
             </a:r>
             <a:r>
-              <a:rPr lang="en-US" dirty="0">
+              <a:rPr lang="en-US">
                 <a:solidFill>
                   <a:schemeClr val="tx1">
                     <a:lumMod val="75000"/>
@@ -4296,7 +4296,7 @@
               <a:buChar char=""/>
             </a:pPr>
             <a:r>
-              <a:rPr lang="en-US" dirty="0" err="1">
+              <a:rPr lang="en-US" err="1">
                 <a:solidFill>
                   <a:schemeClr val="tx1">
                     <a:lumMod val="75000"/>
@@ -4306,7 +4306,7 @@
               </a:rPr>
               <a:t>OpenClassrooms</a:t>
             </a:r>
-            <a:endParaRPr lang="en-US" dirty="0">
+            <a:endParaRPr lang="en-US">
               <a:solidFill>
                 <a:schemeClr val="tx1">
                   <a:lumMod val="75000"/>
@@ -4321,7 +4321,7 @@
               <a:buChar char=""/>
             </a:pPr>
             <a:r>
-              <a:rPr lang="en-US" dirty="0" err="1">
+              <a:rPr lang="en-US" err="1">
                 <a:solidFill>
                   <a:schemeClr val="tx1">
                     <a:lumMod val="75000"/>
@@ -4332,7 +4332,7 @@
               <a:t>Mickaël</a:t>
             </a:r>
             <a:r>
-              <a:rPr lang="en-US" dirty="0">
+              <a:rPr lang="en-US">
                 <a:solidFill>
                   <a:schemeClr val="tx1">
                     <a:lumMod val="75000"/>
@@ -4349,7 +4349,7 @@
               <a:buChar char=""/>
             </a:pPr>
             <a:r>
-              <a:rPr lang="en-US" dirty="0" err="1">
+              <a:rPr lang="en-US" err="1">
                 <a:solidFill>
                   <a:schemeClr val="tx1">
                     <a:lumMod val="75000"/>
@@ -4360,7 +4360,7 @@
               <a:t>Etudiant</a:t>
             </a:r>
             <a:r>
-              <a:rPr lang="en-US" dirty="0">
+              <a:rPr lang="en-US">
                 <a:solidFill>
                   <a:schemeClr val="tx1">
                     <a:lumMod val="75000"/>
@@ -4371,7 +4371,7 @@
               <a:t> </a:t>
             </a:r>
             <a:r>
-              <a:rPr lang="en-US" dirty="0" err="1">
+              <a:rPr lang="en-US" err="1">
                 <a:solidFill>
                   <a:schemeClr val="tx1">
                     <a:lumMod val="75000"/>
@@ -4382,7 +4382,7 @@
               <a:t>Développeur</a:t>
             </a:r>
             <a:r>
-              <a:rPr lang="en-US" dirty="0">
+              <a:rPr lang="en-US">
                 <a:solidFill>
                   <a:schemeClr val="tx1">
                     <a:lumMod val="75000"/>
@@ -4393,7 +4393,7 @@
               <a:t> </a:t>
             </a:r>
             <a:r>
-              <a:rPr lang="en-US" dirty="0" err="1">
+              <a:rPr lang="en-US" err="1">
                 <a:solidFill>
                   <a:schemeClr val="tx1">
                     <a:lumMod val="75000"/>
@@ -4404,7 +4404,7 @@
               <a:t>d’applications</a:t>
             </a:r>
             <a:r>
-              <a:rPr lang="en-US" dirty="0">
+              <a:rPr lang="en-US">
                 <a:solidFill>
                   <a:schemeClr val="tx1">
                     <a:lumMod val="75000"/>
@@ -6847,7 +6847,7 @@
           <a:lstStyle/>
           <a:p>
             <a:r>
-              <a:rPr lang="en-US" sz="4000" b="0" kern="1200" cap="all">
+              <a:rPr lang="en-US" sz="4000" b="0" kern="1200" cap="all" dirty="0">
                 <a:solidFill>
                   <a:schemeClr val="tx1">
                     <a:lumMod val="85000"/>
@@ -6861,7 +6861,7 @@
               <a:t>Structure </a:t>
             </a:r>
             <a:r>
-              <a:rPr lang="en-US" sz="4000" b="0" kern="1200" cap="all" err="1">
+              <a:rPr lang="en-US" sz="4000" b="0" kern="1200" cap="all" dirty="0" err="1">
                 <a:solidFill>
                   <a:schemeClr val="tx1">
                     <a:lumMod val="85000"/>
@@ -6875,7 +6875,7 @@
               <a:t>mvc</a:t>
             </a:r>
             <a:r>
-              <a:rPr lang="en-US" sz="4000" b="0" kern="1200" cap="all">
+              <a:rPr lang="en-US" sz="4000" b="0" kern="1200" cap="all" dirty="0">
                 <a:solidFill>
                   <a:schemeClr val="tx1">
                     <a:lumMod val="85000"/>
@@ -7048,17 +7048,6 @@
               <a:buFont typeface="Wingdings 2" panose="05020102010507070707" pitchFamily="18" charset="2"/>
               <a:buChar char=""/>
             </a:pPr>
-            <a:r>
-              <a:rPr lang="en-US" sz="1400" dirty="0" err="1">
-                <a:solidFill>
-                  <a:schemeClr val="tx1">
-                    <a:lumMod val="75000"/>
-                    <a:lumOff val="25000"/>
-                  </a:schemeClr>
-                </a:solidFill>
-              </a:rPr>
-              <a:t>ExchangeVC</a:t>
-            </a:r>
             <a:endParaRPr lang="en-US" sz="1400" dirty="0">
               <a:solidFill>
                 <a:schemeClr val="tx1">
@@ -7067,222 +7056,6 @@
                 </a:schemeClr>
               </a:solidFill>
             </a:endParaRPr>
-          </a:p>
-          <a:p>
-            <a:pPr marL="742950" lvl="1" indent="-285750" defTabSz="457200">
-              <a:lnSpc>
-                <a:spcPct val="90000"/>
-              </a:lnSpc>
-              <a:spcBef>
-                <a:spcPct val="20000"/>
-              </a:spcBef>
-              <a:spcAft>
-                <a:spcPts val="600"/>
-              </a:spcAft>
-              <a:buClr>
-                <a:schemeClr val="accent1"/>
-              </a:buClr>
-              <a:buSzPct val="92000"/>
-              <a:buFont typeface="Wingdings 2" panose="05020102010507070707" pitchFamily="18" charset="2"/>
-              <a:buChar char=""/>
-            </a:pPr>
-            <a:r>
-              <a:rPr lang="en-US" sz="1400" dirty="0" err="1">
-                <a:solidFill>
-                  <a:schemeClr val="tx1">
-                    <a:lumMod val="75000"/>
-                    <a:lumOff val="25000"/>
-                  </a:schemeClr>
-                </a:solidFill>
-              </a:rPr>
-              <a:t>Demande</a:t>
-            </a:r>
-            <a:r>
-              <a:rPr lang="en-US" sz="1400" dirty="0">
-                <a:solidFill>
-                  <a:schemeClr val="tx1">
-                    <a:lumMod val="75000"/>
-                    <a:lumOff val="25000"/>
-                  </a:schemeClr>
-                </a:solidFill>
-              </a:rPr>
-              <a:t> le </a:t>
-            </a:r>
-            <a:r>
-              <a:rPr lang="en-US" sz="1400" dirty="0" err="1">
-                <a:solidFill>
-                  <a:schemeClr val="tx1">
-                    <a:lumMod val="75000"/>
-                    <a:lumOff val="25000"/>
-                  </a:schemeClr>
-                </a:solidFill>
-              </a:rPr>
-              <a:t>taux</a:t>
-            </a:r>
-            <a:r>
-              <a:rPr lang="en-US" sz="1400" dirty="0">
-                <a:solidFill>
-                  <a:schemeClr val="tx1">
-                    <a:lumMod val="75000"/>
-                    <a:lumOff val="25000"/>
-                  </a:schemeClr>
-                </a:solidFill>
-              </a:rPr>
-              <a:t> de change au </a:t>
-            </a:r>
-            <a:r>
-              <a:rPr lang="en-US" sz="1400" dirty="0" err="1">
-                <a:solidFill>
-                  <a:schemeClr val="tx1">
-                    <a:lumMod val="75000"/>
-                    <a:lumOff val="25000"/>
-                  </a:schemeClr>
-                </a:solidFill>
-              </a:rPr>
-              <a:t>modèle</a:t>
-            </a:r>
-            <a:endParaRPr lang="en-US" sz="1400" dirty="0">
-              <a:solidFill>
-                <a:schemeClr val="tx1">
-                  <a:lumMod val="75000"/>
-                  <a:lumOff val="25000"/>
-                </a:schemeClr>
-              </a:solidFill>
-            </a:endParaRPr>
-          </a:p>
-          <a:p>
-            <a:pPr marL="742950" lvl="1" indent="-285750" defTabSz="457200">
-              <a:lnSpc>
-                <a:spcPct val="90000"/>
-              </a:lnSpc>
-              <a:spcBef>
-                <a:spcPct val="20000"/>
-              </a:spcBef>
-              <a:spcAft>
-                <a:spcPts val="600"/>
-              </a:spcAft>
-              <a:buClr>
-                <a:schemeClr val="accent1"/>
-              </a:buClr>
-              <a:buSzPct val="92000"/>
-              <a:buFont typeface="Wingdings 2" panose="05020102010507070707" pitchFamily="18" charset="2"/>
-              <a:buChar char=""/>
-            </a:pPr>
-            <a:r>
-              <a:rPr lang="en-US" sz="1400" dirty="0">
-                <a:solidFill>
-                  <a:schemeClr val="tx1">
-                    <a:lumMod val="75000"/>
-                    <a:lumOff val="25000"/>
-                  </a:schemeClr>
-                </a:solidFill>
-              </a:rPr>
-              <a:t>Affiche </a:t>
-            </a:r>
-            <a:r>
-              <a:rPr lang="en-US" sz="1400" dirty="0" err="1">
-                <a:solidFill>
-                  <a:schemeClr val="tx1">
-                    <a:lumMod val="75000"/>
-                    <a:lumOff val="25000"/>
-                  </a:schemeClr>
-                </a:solidFill>
-              </a:rPr>
-              <a:t>celui</a:t>
-            </a:r>
-            <a:r>
-              <a:rPr lang="en-US" sz="1400" dirty="0">
-                <a:solidFill>
-                  <a:schemeClr val="tx1">
-                    <a:lumMod val="75000"/>
-                    <a:lumOff val="25000"/>
-                  </a:schemeClr>
-                </a:solidFill>
-              </a:rPr>
-              <a:t>-ci dans la </a:t>
-            </a:r>
-            <a:r>
-              <a:rPr lang="en-US" sz="1400" dirty="0" err="1">
-                <a:solidFill>
-                  <a:schemeClr val="tx1">
-                    <a:lumMod val="75000"/>
-                    <a:lumOff val="25000"/>
-                  </a:schemeClr>
-                </a:solidFill>
-              </a:rPr>
-              <a:t>vue</a:t>
-            </a:r>
-            <a:endParaRPr lang="en-US" sz="1400" dirty="0">
-              <a:solidFill>
-                <a:schemeClr val="tx1">
-                  <a:lumMod val="75000"/>
-                  <a:lumOff val="25000"/>
-                </a:schemeClr>
-              </a:solidFill>
-            </a:endParaRPr>
-          </a:p>
-          <a:p>
-            <a:pPr marL="742950" lvl="1" indent="-285750" defTabSz="457200">
-              <a:lnSpc>
-                <a:spcPct val="90000"/>
-              </a:lnSpc>
-              <a:spcBef>
-                <a:spcPct val="20000"/>
-              </a:spcBef>
-              <a:spcAft>
-                <a:spcPts val="600"/>
-              </a:spcAft>
-              <a:buClr>
-                <a:schemeClr val="accent1"/>
-              </a:buClr>
-              <a:buSzPct val="92000"/>
-              <a:buFont typeface="Wingdings 2" panose="05020102010507070707" pitchFamily="18" charset="2"/>
-              <a:buChar char=""/>
-            </a:pPr>
-            <a:r>
-              <a:rPr lang="en-US" sz="1400" dirty="0" err="1">
-                <a:solidFill>
-                  <a:schemeClr val="tx1">
-                    <a:lumMod val="75000"/>
-                    <a:lumOff val="25000"/>
-                  </a:schemeClr>
-                </a:solidFill>
-              </a:rPr>
-              <a:t>Calcule</a:t>
-            </a:r>
-            <a:r>
-              <a:rPr lang="en-US" sz="1400" dirty="0">
-                <a:solidFill>
-                  <a:schemeClr val="tx1">
-                    <a:lumMod val="75000"/>
-                    <a:lumOff val="25000"/>
-                  </a:schemeClr>
-                </a:solidFill>
-              </a:rPr>
-              <a:t> le </a:t>
-            </a:r>
-            <a:r>
-              <a:rPr lang="en-US" sz="1400" dirty="0" err="1">
-                <a:solidFill>
-                  <a:schemeClr val="tx1">
-                    <a:lumMod val="75000"/>
-                    <a:lumOff val="25000"/>
-                  </a:schemeClr>
-                </a:solidFill>
-              </a:rPr>
-              <a:t>taux</a:t>
-            </a:r>
-            <a:r>
-              <a:rPr lang="en-US" sz="1400" dirty="0">
-                <a:solidFill>
-                  <a:schemeClr val="tx1">
-                    <a:lumMod val="75000"/>
-                    <a:lumOff val="25000"/>
-                  </a:schemeClr>
-                </a:solidFill>
-              </a:rPr>
-              <a:t> de change</a:t>
-            </a:r>
           </a:p>
           <a:p>
             <a:pPr marL="285750" indent="-285750" defTabSz="457200">
@@ -7302,170 +7075,6 @@
               <a:buFont typeface="Wingdings 2" panose="05020102010507070707" pitchFamily="18" charset="2"/>
               <a:buChar char=""/>
             </a:pPr>
-            <a:r>
-              <a:rPr lang="en-US" sz="1400" dirty="0" err="1">
-                <a:solidFill>
-                  <a:schemeClr val="tx1">
-                    <a:lumMod val="75000"/>
-                    <a:lumOff val="25000"/>
-                  </a:schemeClr>
-                </a:solidFill>
-              </a:rPr>
-              <a:t>TraductionVC</a:t>
-            </a:r>
-            <a:endParaRPr lang="en-US" sz="1400" dirty="0">
-              <a:solidFill>
-                <a:schemeClr val="tx1">
-                  <a:lumMod val="75000"/>
-                  <a:lumOff val="25000"/>
-                </a:schemeClr>
-              </a:solidFill>
-            </a:endParaRPr>
-          </a:p>
-          <a:p>
-            <a:pPr marL="742950" lvl="1" indent="-285750" defTabSz="457200">
-              <a:lnSpc>
-                <a:spcPct val="90000"/>
-              </a:lnSpc>
-              <a:spcBef>
-                <a:spcPct val="20000"/>
-              </a:spcBef>
-              <a:spcAft>
-                <a:spcPts val="600"/>
-              </a:spcAft>
-              <a:buClr>
-                <a:schemeClr val="accent1"/>
-              </a:buClr>
-              <a:buSzPct val="92000"/>
-              <a:buFont typeface="Wingdings 2" panose="05020102010507070707" pitchFamily="18" charset="2"/>
-              <a:buChar char=""/>
-            </a:pPr>
-            <a:r>
-              <a:rPr lang="en-US" sz="1400" dirty="0" err="1">
-                <a:solidFill>
-                  <a:schemeClr val="tx1">
-                    <a:lumMod val="75000"/>
-                    <a:lumOff val="25000"/>
-                  </a:schemeClr>
-                </a:solidFill>
-              </a:rPr>
-              <a:t>Demande</a:t>
-            </a:r>
-            <a:r>
-              <a:rPr lang="en-US" sz="1400" dirty="0">
-                <a:solidFill>
-                  <a:schemeClr val="tx1">
-                    <a:lumMod val="75000"/>
-                    <a:lumOff val="25000"/>
-                  </a:schemeClr>
-                </a:solidFill>
-              </a:rPr>
-              <a:t> la </a:t>
-            </a:r>
-            <a:r>
-              <a:rPr lang="en-US" sz="1400" dirty="0" err="1">
-                <a:solidFill>
-                  <a:schemeClr val="tx1">
-                    <a:lumMod val="75000"/>
-                    <a:lumOff val="25000"/>
-                  </a:schemeClr>
-                </a:solidFill>
-              </a:rPr>
-              <a:t>traduction</a:t>
-            </a:r>
-            <a:r>
-              <a:rPr lang="en-US" sz="1400" dirty="0">
-                <a:solidFill>
-                  <a:schemeClr val="tx1">
-                    <a:lumMod val="75000"/>
-                    <a:lumOff val="25000"/>
-                  </a:schemeClr>
-                </a:solidFill>
-              </a:rPr>
-              <a:t> au </a:t>
-            </a:r>
-            <a:r>
-              <a:rPr lang="en-US" sz="1400" dirty="0" err="1">
-                <a:solidFill>
-                  <a:schemeClr val="tx1">
-                    <a:lumMod val="75000"/>
-                    <a:lumOff val="25000"/>
-                  </a:schemeClr>
-                </a:solidFill>
-              </a:rPr>
-              <a:t>modèle</a:t>
-            </a:r>
-            <a:endParaRPr lang="en-US" sz="1400" dirty="0">
-              <a:solidFill>
-                <a:schemeClr val="tx1">
-                  <a:lumMod val="75000"/>
-                  <a:lumOff val="25000"/>
-                </a:schemeClr>
-              </a:solidFill>
-            </a:endParaRPr>
-          </a:p>
-          <a:p>
-            <a:pPr marL="742950" lvl="1" indent="-285750" defTabSz="457200">
-              <a:lnSpc>
-                <a:spcPct val="90000"/>
-              </a:lnSpc>
-              <a:spcBef>
-                <a:spcPct val="20000"/>
-              </a:spcBef>
-              <a:spcAft>
-                <a:spcPts val="600"/>
-              </a:spcAft>
-              <a:buClr>
-                <a:schemeClr val="accent1"/>
-              </a:buClr>
-              <a:buSzPct val="92000"/>
-              <a:buFont typeface="Wingdings 2" panose="05020102010507070707" pitchFamily="18" charset="2"/>
-              <a:buChar char=""/>
-            </a:pPr>
-            <a:r>
-              <a:rPr lang="en-US" sz="1400" dirty="0">
-                <a:solidFill>
-                  <a:schemeClr val="tx1">
-                    <a:lumMod val="75000"/>
-                    <a:lumOff val="25000"/>
-                  </a:schemeClr>
-                </a:solidFill>
-              </a:rPr>
-              <a:t>Affiche le </a:t>
-            </a:r>
-            <a:r>
-              <a:rPr lang="en-US" sz="1400" dirty="0" err="1">
-                <a:solidFill>
-                  <a:schemeClr val="tx1">
-                    <a:lumMod val="75000"/>
-                    <a:lumOff val="25000"/>
-                  </a:schemeClr>
-                </a:solidFill>
-              </a:rPr>
-              <a:t>résultat</a:t>
-            </a:r>
-            <a:r>
-              <a:rPr lang="en-US" sz="1400" dirty="0">
-                <a:solidFill>
-                  <a:schemeClr val="tx1">
-                    <a:lumMod val="75000"/>
-                    <a:lumOff val="25000"/>
-                  </a:schemeClr>
-                </a:solidFill>
-              </a:rPr>
-              <a:t> dans la </a:t>
-            </a:r>
-            <a:r>
-              <a:rPr lang="en-US" sz="1400" dirty="0" err="1">
-                <a:solidFill>
-                  <a:schemeClr val="tx1">
-                    <a:lumMod val="75000"/>
-                    <a:lumOff val="25000"/>
-                  </a:schemeClr>
-                </a:solidFill>
-              </a:rPr>
-              <a:t>vue</a:t>
-            </a:r>
             <a:endParaRPr lang="en-US" sz="1400" dirty="0">
               <a:solidFill>
                 <a:schemeClr val="tx1">
@@ -7493,17 +7102,6 @@
               <a:buFont typeface="Wingdings 2" panose="05020102010507070707" pitchFamily="18" charset="2"/>
               <a:buChar char=""/>
             </a:pPr>
-            <a:r>
-              <a:rPr lang="en-US" sz="1400" dirty="0" err="1">
-                <a:solidFill>
-                  <a:schemeClr val="tx1">
-                    <a:lumMod val="75000"/>
-                    <a:lumOff val="25000"/>
-                  </a:schemeClr>
-                </a:solidFill>
-              </a:rPr>
-              <a:t>WeatherVC</a:t>
-            </a:r>
             <a:endParaRPr lang="en-US" sz="1400" dirty="0">
               <a:solidFill>
                 <a:schemeClr val="tx1">
@@ -7514,7 +7112,7 @@
             </a:endParaRPr>
           </a:p>
           <a:p>
-            <a:pPr marL="742950" lvl="1" indent="-285750" defTabSz="457200">
+            <a:pPr marL="285750" indent="-285750" defTabSz="457200">
               <a:lnSpc>
                 <a:spcPct val="90000"/>
               </a:lnSpc>
@@ -7531,61 +7129,6 @@
               <a:buFont typeface="Wingdings 2" panose="05020102010507070707" pitchFamily="18" charset="2"/>
               <a:buChar char=""/>
             </a:pPr>
-            <a:r>
-              <a:rPr lang="en-US" sz="1400" dirty="0" err="1">
-                <a:solidFill>
-                  <a:schemeClr val="tx1">
-                    <a:lumMod val="75000"/>
-                    <a:lumOff val="25000"/>
-                  </a:schemeClr>
-                </a:solidFill>
-              </a:rPr>
-              <a:t>Demande</a:t>
-            </a:r>
-            <a:r>
-              <a:rPr lang="en-US" sz="1400" dirty="0">
-                <a:solidFill>
-                  <a:schemeClr val="tx1">
-                    <a:lumMod val="75000"/>
-                    <a:lumOff val="25000"/>
-                  </a:schemeClr>
-                </a:solidFill>
-              </a:rPr>
-              <a:t> la </a:t>
-            </a:r>
-            <a:r>
-              <a:rPr lang="en-US" sz="1400" dirty="0" err="1">
-                <a:solidFill>
-                  <a:schemeClr val="tx1">
-                    <a:lumMod val="75000"/>
-                    <a:lumOff val="25000"/>
-                  </a:schemeClr>
-                </a:solidFill>
-              </a:rPr>
-              <a:t>météo</a:t>
-            </a:r>
-            <a:r>
-              <a:rPr lang="en-US" sz="1400" dirty="0">
-                <a:solidFill>
-                  <a:schemeClr val="tx1">
-                    <a:lumMod val="75000"/>
-                    <a:lumOff val="25000"/>
-                  </a:schemeClr>
-                </a:solidFill>
-              </a:rPr>
-              <a:t> au </a:t>
-            </a:r>
-            <a:r>
-              <a:rPr lang="en-US" sz="1400" dirty="0" err="1">
-                <a:solidFill>
-                  <a:schemeClr val="tx1">
-                    <a:lumMod val="75000"/>
-                    <a:lumOff val="25000"/>
-                  </a:schemeClr>
-                </a:solidFill>
-              </a:rPr>
-              <a:t>modèle</a:t>
-            </a:r>
             <a:endParaRPr lang="en-US" sz="1400" dirty="0">
               <a:solidFill>
                 <a:schemeClr val="tx1">
@@ -7596,7 +7139,7 @@
             </a:endParaRPr>
           </a:p>
           <a:p>
-            <a:pPr marL="742950" lvl="1" indent="-285750" defTabSz="457200">
+            <a:pPr marL="285750" indent="-285750" defTabSz="457200">
               <a:lnSpc>
                 <a:spcPct val="90000"/>
               </a:lnSpc>
@@ -7614,7 +7157,7 @@
               <a:buChar char=""/>
             </a:pPr>
             <a:r>
-              <a:rPr lang="en-US" sz="1400" dirty="0">
+              <a:rPr lang="en-US" sz="1400" dirty="0" err="1">
                 <a:solidFill>
                   <a:schemeClr val="tx1">
                     <a:lumMod val="75000"/>
@@ -7622,10 +7165,10 @@
                   </a:schemeClr>
                 </a:solidFill>
               </a:rPr>
-              <a:t>Affiche la </a:t>
-            </a:r>
-            <a:r>
-              <a:rPr lang="en-US" sz="1400" dirty="0" err="1">
+              <a:t>ExchangeVC</a:t>
+            </a:r>
+            <a:r>
+              <a:rPr lang="en-US" sz="1400" dirty="0">
                 <a:solidFill>
                   <a:schemeClr val="tx1">
                     <a:lumMod val="75000"/>
@@ -7633,10 +7176,10 @@
                   </a:schemeClr>
                 </a:solidFill>
               </a:rPr>
-              <a:t>résultat</a:t>
-            </a:r>
-            <a:r>
-              <a:rPr lang="en-US" sz="1400" dirty="0">
+              <a:t>, </a:t>
+            </a:r>
+            <a:r>
+              <a:rPr lang="en-US" sz="1400" dirty="0" err="1">
                 <a:solidFill>
                   <a:schemeClr val="tx1">
                     <a:lumMod val="75000"/>
@@ -7644,10 +7187,10 @@
                   </a:schemeClr>
                 </a:solidFill>
               </a:rPr>
-              <a:t> dans la </a:t>
-            </a:r>
-            <a:r>
-              <a:rPr lang="en-US" sz="1400" dirty="0" err="1">
+              <a:t>TraductionVC</a:t>
+            </a:r>
+            <a:r>
+              <a:rPr lang="en-US" sz="1400" dirty="0">
                 <a:solidFill>
                   <a:schemeClr val="tx1">
                     <a:lumMod val="75000"/>
@@ -7655,8 +7198,115 @@
                   </a:schemeClr>
                 </a:solidFill>
               </a:rPr>
-              <a:t>vue</a:t>
-            </a:r>
+              <a:t> et </a:t>
+            </a:r>
+            <a:r>
+              <a:rPr lang="en-US" sz="1400" dirty="0" err="1">
+                <a:solidFill>
+                  <a:schemeClr val="tx1">
+                    <a:lumMod val="75000"/>
+                    <a:lumOff val="25000"/>
+                  </a:schemeClr>
+                </a:solidFill>
+              </a:rPr>
+              <a:t>WeatherVC</a:t>
+            </a:r>
+            <a:r>
+              <a:rPr lang="en-US" sz="1400" dirty="0">
+                <a:solidFill>
+                  <a:schemeClr val="tx1">
+                    <a:lumMod val="75000"/>
+                    <a:lumOff val="25000"/>
+                  </a:schemeClr>
+                </a:solidFill>
+              </a:rPr>
+              <a:t> </a:t>
+            </a:r>
+            <a:r>
+              <a:rPr lang="en-US" sz="1400" dirty="0" err="1">
+                <a:solidFill>
+                  <a:schemeClr val="tx1">
+                    <a:lumMod val="75000"/>
+                    <a:lumOff val="25000"/>
+                  </a:schemeClr>
+                </a:solidFill>
+              </a:rPr>
+              <a:t>serviront</a:t>
+            </a:r>
+            <a:r>
+              <a:rPr lang="en-US" sz="1400" dirty="0">
+                <a:solidFill>
+                  <a:schemeClr val="tx1">
+                    <a:lumMod val="75000"/>
+                    <a:lumOff val="25000"/>
+                  </a:schemeClr>
+                </a:solidFill>
+              </a:rPr>
+              <a:t> de </a:t>
+            </a:r>
+            <a:r>
+              <a:rPr lang="en-US" sz="1400" dirty="0" err="1">
+                <a:solidFill>
+                  <a:schemeClr val="tx1">
+                    <a:lumMod val="75000"/>
+                    <a:lumOff val="25000"/>
+                  </a:schemeClr>
+                </a:solidFill>
+              </a:rPr>
+              <a:t>passerelles</a:t>
+            </a:r>
+            <a:r>
+              <a:rPr lang="en-US" sz="1400" dirty="0">
+                <a:solidFill>
+                  <a:schemeClr val="tx1">
+                    <a:lumMod val="75000"/>
+                    <a:lumOff val="25000"/>
+                  </a:schemeClr>
+                </a:solidFill>
+              </a:rPr>
+              <a:t> entre les models et les </a:t>
+            </a:r>
+            <a:r>
+              <a:rPr lang="en-US" sz="1400" dirty="0" err="1">
+                <a:solidFill>
+                  <a:schemeClr val="tx1">
+                    <a:lumMod val="75000"/>
+                    <a:lumOff val="25000"/>
+                  </a:schemeClr>
+                </a:solidFill>
+              </a:rPr>
+              <a:t>vues</a:t>
+            </a:r>
+            <a:r>
+              <a:rPr lang="en-US" sz="1400" dirty="0">
+                <a:solidFill>
+                  <a:schemeClr val="tx1">
+                    <a:lumMod val="75000"/>
+                    <a:lumOff val="25000"/>
+                  </a:schemeClr>
+                </a:solidFill>
+              </a:rPr>
+              <a:t>.</a:t>
+            </a:r>
+          </a:p>
+          <a:p>
+            <a:pPr marL="285750" indent="-285750" defTabSz="457200">
+              <a:lnSpc>
+                <a:spcPct val="90000"/>
+              </a:lnSpc>
+              <a:spcBef>
+                <a:spcPct val="20000"/>
+              </a:spcBef>
+              <a:spcAft>
+                <a:spcPts val="600"/>
+              </a:spcAft>
+              <a:buClr>
+                <a:schemeClr val="accent1"/>
+              </a:buClr>
+              <a:buSzPct val="92000"/>
+              <a:buFont typeface="Wingdings 2" panose="05020102010507070707" pitchFamily="18" charset="2"/>
+              <a:buChar char=""/>
+            </a:pPr>
             <a:endParaRPr lang="en-US" sz="1400" dirty="0">
               <a:solidFill>
                 <a:schemeClr val="tx1">
@@ -8739,8 +8389,8 @@
         </p:blipFill>
         <p:spPr>
           <a:xfrm>
-            <a:off x="1764629" y="536739"/>
-            <a:ext cx="8667194" cy="3358538"/>
+            <a:off x="441140" y="888261"/>
+            <a:ext cx="7814097" cy="3027963"/>
           </a:xfrm>
           <a:prstGeom prst="rect">
             <a:avLst/>
@@ -8907,6 +8557,36 @@
           </a:p>
         </p:txBody>
       </p:sp>
+      <p:pic>
+        <p:nvPicPr>
+          <p:cNvPr id="5" name="Image 4" descr="Une image contenant texte&#10;&#10;Description générée automatiquement">
+            <a:extLst>
+              <a:ext uri="{FF2B5EF4-FFF2-40B4-BE49-F238E27FC236}">
+                <a16:creationId xmlns:a16="http://schemas.microsoft.com/office/drawing/2014/main" id="{9C0FF547-09DB-1E52-CE86-E7531288096F}"/>
+              </a:ext>
+            </a:extLst>
+          </p:cNvPr>
+          <p:cNvPicPr>
+            <a:picLocks noChangeAspect="1"/>
+          </p:cNvPicPr>
+          <p:nvPr/>
+        </p:nvPicPr>
+        <p:blipFill>
+          <a:blip r:embed="rId3"/>
+          <a:stretch>
+            <a:fillRect/>
+          </a:stretch>
+        </p:blipFill>
+        <p:spPr>
+          <a:xfrm>
+            <a:off x="8628737" y="882665"/>
+            <a:ext cx="3116730" cy="3027963"/>
+          </a:xfrm>
+          <a:prstGeom prst="rect">
+            <a:avLst/>
+          </a:prstGeom>
+        </p:spPr>
+      </p:pic>
     </p:spTree>
     <p:extLst>
       <p:ext uri="{BB962C8B-B14F-4D97-AF65-F5344CB8AC3E}">

</xml_diff>

<commit_message>
Petites modifications (noms de variables, documents).
</commit_message>
<xml_diff>
--- a/Soutenance/Horn_Mickael_presentation_4_102022.pptx
+++ b/Soutenance/Horn_Mickael_presentation_4_102022.pptx
@@ -359,7 +359,7 @@
           <a:p>
             <a:fld id="{ED291B17-9318-49DB-B28B-6E5994AE9581}" type="datetime1">
               <a:rPr lang="en-US" smtClean="0"/>
-              <a:t>1/10/23</a:t>
+              <a:t>1/13/23</a:t>
             </a:fld>
             <a:endParaRPr lang="en-US"/>
           </a:p>
@@ -562,7 +562,7 @@
           <a:p>
             <a:fld id="{2CED4963-E985-44C4-B8C4-FDD613B7C2F8}" type="datetime1">
               <a:rPr lang="en-US" smtClean="0"/>
-              <a:t>1/10/23</a:t>
+              <a:t>1/13/23</a:t>
             </a:fld>
             <a:endParaRPr lang="en-US"/>
           </a:p>
@@ -924,7 +924,7 @@
           <a:p>
             <a:fld id="{ED291B17-9318-49DB-B28B-6E5994AE9581}" type="datetime1">
               <a:rPr lang="en-US" smtClean="0"/>
-              <a:t>1/10/23</a:t>
+              <a:t>1/13/23</a:t>
             </a:fld>
             <a:endParaRPr lang="en-US"/>
           </a:p>
@@ -1122,7 +1122,7 @@
           <a:p>
             <a:fld id="{78DD82B9-B8EE-4375-B6FF-88FA6ABB15D9}" type="datetime1">
               <a:rPr lang="en-US" smtClean="0"/>
-              <a:t>1/10/23</a:t>
+              <a:t>1/13/23</a:t>
             </a:fld>
             <a:endParaRPr lang="en-US"/>
           </a:p>
@@ -1434,7 +1434,7 @@
           <a:p>
             <a:fld id="{B2497495-0637-405E-AE64-5CC7506D51F5}" type="datetime1">
               <a:rPr lang="en-US" smtClean="0"/>
-              <a:t>1/10/23</a:t>
+              <a:t>1/13/23</a:t>
             </a:fld>
             <a:endParaRPr lang="en-US"/>
           </a:p>
@@ -1687,7 +1687,7 @@
           <a:p>
             <a:fld id="{7BFFD690-9426-415D-8B65-26881E07B2D4}" type="datetime1">
               <a:rPr lang="en-US" smtClean="0"/>
-              <a:t>1/10/23</a:t>
+              <a:t>1/13/23</a:t>
             </a:fld>
             <a:endParaRPr lang="en-US"/>
           </a:p>
@@ -2109,7 +2109,7 @@
           <a:p>
             <a:fld id="{04C4989A-474C-40DE-95B9-011C28B71673}" type="datetime1">
               <a:rPr lang="en-US" smtClean="0"/>
-              <a:t>1/10/23</a:t>
+              <a:t>1/13/23</a:t>
             </a:fld>
             <a:endParaRPr lang="en-US"/>
           </a:p>
@@ -2232,7 +2232,7 @@
           <a:p>
             <a:fld id="{5DB4ED54-5B5E-4A04-93D3-5772E3CE3818}" type="datetime1">
               <a:rPr lang="en-US" smtClean="0"/>
-              <a:t>1/10/23</a:t>
+              <a:t>1/13/23</a:t>
             </a:fld>
             <a:endParaRPr lang="en-US"/>
           </a:p>
@@ -2327,7 +2327,7 @@
           <a:p>
             <a:fld id="{4EDE50D6-574B-40AF-946F-D52A04ADE379}" type="datetime1">
               <a:rPr lang="en-US" smtClean="0"/>
-              <a:t>1/10/23</a:t>
+              <a:t>1/13/23</a:t>
             </a:fld>
             <a:endParaRPr lang="en-US"/>
           </a:p>
@@ -2704,7 +2704,7 @@
           <a:p>
             <a:fld id="{D82884F1-FFEA-405F-9602-3DCA865EDA4E}" type="datetime1">
               <a:rPr lang="en-US" smtClean="0"/>
-              <a:t>1/10/23</a:t>
+              <a:t>1/13/23</a:t>
             </a:fld>
             <a:endParaRPr lang="en-US"/>
           </a:p>
@@ -2996,7 +2996,7 @@
           <a:p>
             <a:fld id="{7E18DB4A-8810-4A10-AD5C-D5E2C667F5B3}" type="datetime1">
               <a:rPr lang="en-US" smtClean="0"/>
-              <a:t>1/10/23</a:t>
+              <a:t>1/13/23</a:t>
             </a:fld>
             <a:endParaRPr lang="en-US"/>
           </a:p>
@@ -3211,7 +3211,7 @@
           <a:p>
             <a:fld id="{ED291B17-9318-49DB-B28B-6E5994AE9581}" type="datetime1">
               <a:rPr lang="en-US" smtClean="0"/>
-              <a:t>1/10/23</a:t>
+              <a:t>1/13/23</a:t>
             </a:fld>
             <a:endParaRPr lang="en-US"/>
           </a:p>
@@ -5911,12 +5911,117 @@
           </a:prstGeom>
         </p:spPr>
       </p:pic>
+      <p:sp>
+        <p:nvSpPr>
+          <p:cNvPr id="7" name="ZoneTexte 6">
+            <a:extLst>
+              <a:ext uri="{FF2B5EF4-FFF2-40B4-BE49-F238E27FC236}">
+                <a16:creationId xmlns:a16="http://schemas.microsoft.com/office/drawing/2014/main" id="{5A7240BB-297A-9053-4774-F0B5600A2108}"/>
+              </a:ext>
+            </a:extLst>
+          </p:cNvPr>
+          <p:cNvSpPr txBox="1"/>
+          <p:nvPr/>
+        </p:nvSpPr>
+        <p:spPr>
+          <a:xfrm>
+            <a:off x="1485303" y="4579093"/>
+            <a:ext cx="1617751" cy="369332"/>
+          </a:xfrm>
+          <a:prstGeom prst="rect">
+            <a:avLst/>
+          </a:prstGeom>
+          <a:noFill/>
+        </p:spPr>
+        <p:txBody>
+          <a:bodyPr wrap="none" rtlCol="0">
+            <a:spAutoFit/>
+          </a:bodyPr>
+          <a:lstStyle/>
+          <a:p>
+            <a:r>
+              <a:rPr lang="fr-FR"/>
+              <a:t>Taux de change</a:t>
+            </a:r>
+          </a:p>
+        </p:txBody>
+      </p:sp>
+      <p:sp>
+        <p:nvSpPr>
+          <p:cNvPr id="8" name="ZoneTexte 7">
+            <a:extLst>
+              <a:ext uri="{FF2B5EF4-FFF2-40B4-BE49-F238E27FC236}">
+                <a16:creationId xmlns:a16="http://schemas.microsoft.com/office/drawing/2014/main" id="{3D607210-48D2-7024-0286-9AD8F99E0376}"/>
+              </a:ext>
+            </a:extLst>
+          </p:cNvPr>
+          <p:cNvSpPr txBox="1"/>
+          <p:nvPr/>
+        </p:nvSpPr>
+        <p:spPr>
+          <a:xfrm>
+            <a:off x="5499416" y="4574369"/>
+            <a:ext cx="1188146" cy="369332"/>
+          </a:xfrm>
+          <a:prstGeom prst="rect">
+            <a:avLst/>
+          </a:prstGeom>
+          <a:noFill/>
+        </p:spPr>
+        <p:txBody>
+          <a:bodyPr wrap="none" rtlCol="0">
+            <a:spAutoFit/>
+          </a:bodyPr>
+          <a:lstStyle/>
+          <a:p>
+            <a:r>
+              <a:rPr lang="fr-FR"/>
+              <a:t>Traduction</a:t>
+            </a:r>
+          </a:p>
+        </p:txBody>
+      </p:sp>
+      <p:sp>
+        <p:nvSpPr>
+          <p:cNvPr id="9" name="ZoneTexte 8">
+            <a:extLst>
+              <a:ext uri="{FF2B5EF4-FFF2-40B4-BE49-F238E27FC236}">
+                <a16:creationId xmlns:a16="http://schemas.microsoft.com/office/drawing/2014/main" id="{226FB120-1349-42C1-259D-F946CCE05ECE}"/>
+              </a:ext>
+            </a:extLst>
+          </p:cNvPr>
+          <p:cNvSpPr txBox="1"/>
+          <p:nvPr/>
+        </p:nvSpPr>
+        <p:spPr>
+          <a:xfrm>
+            <a:off x="9499307" y="4574369"/>
+            <a:ext cx="788999" cy="369332"/>
+          </a:xfrm>
+          <a:prstGeom prst="rect">
+            <a:avLst/>
+          </a:prstGeom>
+          <a:noFill/>
+        </p:spPr>
+        <p:txBody>
+          <a:bodyPr wrap="none" rtlCol="0">
+            <a:spAutoFit/>
+          </a:bodyPr>
+          <a:lstStyle/>
+          <a:p>
+            <a:r>
+              <a:rPr lang="fr-FR"/>
+              <a:t>Météo</a:t>
+            </a:r>
+          </a:p>
+        </p:txBody>
+      </p:sp>
       <p:pic>
         <p:nvPicPr>
-          <p:cNvPr id="4" name="Image 3">
-            <a:extLst>
-              <a:ext uri="{FF2B5EF4-FFF2-40B4-BE49-F238E27FC236}">
-                <a16:creationId xmlns:a16="http://schemas.microsoft.com/office/drawing/2014/main" id="{01D193D8-3AC8-F698-0EBD-8200D8CCD058}"/>
+          <p:cNvPr id="16" name="Image 15" descr="Une image contenant texte&#10;&#10;Description générée automatiquement">
+            <a:extLst>
+              <a:ext uri="{FF2B5EF4-FFF2-40B4-BE49-F238E27FC236}">
+                <a16:creationId xmlns:a16="http://schemas.microsoft.com/office/drawing/2014/main" id="{8A06426A-06BA-0497-CA06-4FD26DBF1ADB}"/>
               </a:ext>
             </a:extLst>
           </p:cNvPr>
@@ -5926,7 +6031,7 @@
           <p:nvPr/>
         </p:nvPicPr>
         <p:blipFill>
-          <a:blip r:embed="rId4" cstate="print">
+          <a:blip r:embed="rId4">
             <a:extLst>
               <a:ext uri="{28A0092B-C50C-407E-A947-70E740481C1C}">
                 <a14:useLocalDpi xmlns:a14="http://schemas.microsoft.com/office/drawing/2010/main" val="0"/>
@@ -5939,125 +6044,20 @@
         </p:blipFill>
         <p:spPr>
           <a:xfrm>
-            <a:off x="1475703" y="737763"/>
-            <a:ext cx="1636949" cy="3539352"/>
+            <a:off x="4650846" y="5379046"/>
+            <a:ext cx="2885285" cy="835547"/>
           </a:xfrm>
           <a:prstGeom prst="rect">
             <a:avLst/>
           </a:prstGeom>
         </p:spPr>
       </p:pic>
-      <p:sp>
-        <p:nvSpPr>
-          <p:cNvPr id="7" name="ZoneTexte 6">
-            <a:extLst>
-              <a:ext uri="{FF2B5EF4-FFF2-40B4-BE49-F238E27FC236}">
-                <a16:creationId xmlns:a16="http://schemas.microsoft.com/office/drawing/2014/main" id="{5A7240BB-297A-9053-4774-F0B5600A2108}"/>
-              </a:ext>
-            </a:extLst>
-          </p:cNvPr>
-          <p:cNvSpPr txBox="1"/>
-          <p:nvPr/>
-        </p:nvSpPr>
-        <p:spPr>
-          <a:xfrm>
-            <a:off x="1485303" y="4579093"/>
-            <a:ext cx="1617751" cy="369332"/>
-          </a:xfrm>
-          <a:prstGeom prst="rect">
-            <a:avLst/>
-          </a:prstGeom>
-          <a:noFill/>
-        </p:spPr>
-        <p:txBody>
-          <a:bodyPr wrap="none" rtlCol="0">
-            <a:spAutoFit/>
-          </a:bodyPr>
-          <a:lstStyle/>
-          <a:p>
-            <a:r>
-              <a:rPr lang="fr-FR"/>
-              <a:t>Taux de change</a:t>
-            </a:r>
-          </a:p>
-        </p:txBody>
-      </p:sp>
-      <p:sp>
-        <p:nvSpPr>
-          <p:cNvPr id="8" name="ZoneTexte 7">
-            <a:extLst>
-              <a:ext uri="{FF2B5EF4-FFF2-40B4-BE49-F238E27FC236}">
-                <a16:creationId xmlns:a16="http://schemas.microsoft.com/office/drawing/2014/main" id="{3D607210-48D2-7024-0286-9AD8F99E0376}"/>
-              </a:ext>
-            </a:extLst>
-          </p:cNvPr>
-          <p:cNvSpPr txBox="1"/>
-          <p:nvPr/>
-        </p:nvSpPr>
-        <p:spPr>
-          <a:xfrm>
-            <a:off x="5499416" y="4574369"/>
-            <a:ext cx="1188146" cy="369332"/>
-          </a:xfrm>
-          <a:prstGeom prst="rect">
-            <a:avLst/>
-          </a:prstGeom>
-          <a:noFill/>
-        </p:spPr>
-        <p:txBody>
-          <a:bodyPr wrap="none" rtlCol="0">
-            <a:spAutoFit/>
-          </a:bodyPr>
-          <a:lstStyle/>
-          <a:p>
-            <a:r>
-              <a:rPr lang="fr-FR"/>
-              <a:t>Traduction</a:t>
-            </a:r>
-          </a:p>
-        </p:txBody>
-      </p:sp>
-      <p:sp>
-        <p:nvSpPr>
-          <p:cNvPr id="9" name="ZoneTexte 8">
-            <a:extLst>
-              <a:ext uri="{FF2B5EF4-FFF2-40B4-BE49-F238E27FC236}">
-                <a16:creationId xmlns:a16="http://schemas.microsoft.com/office/drawing/2014/main" id="{226FB120-1349-42C1-259D-F946CCE05ECE}"/>
-              </a:ext>
-            </a:extLst>
-          </p:cNvPr>
-          <p:cNvSpPr txBox="1"/>
-          <p:nvPr/>
-        </p:nvSpPr>
-        <p:spPr>
-          <a:xfrm>
-            <a:off x="9499307" y="4574369"/>
-            <a:ext cx="788999" cy="369332"/>
-          </a:xfrm>
-          <a:prstGeom prst="rect">
-            <a:avLst/>
-          </a:prstGeom>
-          <a:noFill/>
-        </p:spPr>
-        <p:txBody>
-          <a:bodyPr wrap="none" rtlCol="0">
-            <a:spAutoFit/>
-          </a:bodyPr>
-          <a:lstStyle/>
-          <a:p>
-            <a:r>
-              <a:rPr lang="fr-FR"/>
-              <a:t>Météo</a:t>
-            </a:r>
-          </a:p>
-        </p:txBody>
-      </p:sp>
       <p:pic>
         <p:nvPicPr>
-          <p:cNvPr id="16" name="Image 15" descr="Une image contenant texte&#10;&#10;Description générée automatiquement">
-            <a:extLst>
-              <a:ext uri="{FF2B5EF4-FFF2-40B4-BE49-F238E27FC236}">
-                <a16:creationId xmlns:a16="http://schemas.microsoft.com/office/drawing/2014/main" id="{8A06426A-06BA-0497-CA06-4FD26DBF1ADB}"/>
+          <p:cNvPr id="10" name="Image 9">
+            <a:extLst>
+              <a:ext uri="{FF2B5EF4-FFF2-40B4-BE49-F238E27FC236}">
+                <a16:creationId xmlns:a16="http://schemas.microsoft.com/office/drawing/2014/main" id="{6AB16CF5-6686-0225-6478-3DEBCE1E3AFB}"/>
               </a:ext>
             </a:extLst>
           </p:cNvPr>
@@ -6067,21 +6067,15 @@
           <p:nvPr/>
         </p:nvPicPr>
         <p:blipFill>
-          <a:blip r:embed="rId5">
-            <a:extLst>
-              <a:ext uri="{28A0092B-C50C-407E-A947-70E740481C1C}">
-                <a14:useLocalDpi xmlns:a14="http://schemas.microsoft.com/office/drawing/2010/main" val="0"/>
-              </a:ext>
-            </a:extLst>
-          </a:blip>
+          <a:blip r:embed="rId5"/>
           <a:stretch>
             <a:fillRect/>
           </a:stretch>
         </p:blipFill>
         <p:spPr>
           <a:xfrm>
-            <a:off x="4650846" y="5379046"/>
-            <a:ext cx="2885285" cy="835547"/>
+            <a:off x="1475703" y="737763"/>
+            <a:ext cx="1635227" cy="3538800"/>
           </a:xfrm>
           <a:prstGeom prst="rect">
             <a:avLst/>
@@ -6107,7 +6101,7 @@
     <p:bg>
       <p:bgPr>
         <a:solidFill>
-          <a:schemeClr val="bg1"/>
+          <a:schemeClr val="bg2"/>
         </a:solidFill>
         <a:effectLst/>
       </p:bgPr>
@@ -6128,10 +6122,10 @@
       </p:grpSpPr>
       <p:sp>
         <p:nvSpPr>
-          <p:cNvPr id="10" name="Rectangle 9">
-            <a:extLst>
-              <a:ext uri="{FF2B5EF4-FFF2-40B4-BE49-F238E27FC236}">
-                <a16:creationId xmlns:a16="http://schemas.microsoft.com/office/drawing/2014/main" id="{3CED7894-4F62-4A6C-8DB5-DB5BE08E9C03}"/>
+          <p:cNvPr id="17" name="Rectangle 16">
+            <a:extLst>
+              <a:ext uri="{FF2B5EF4-FFF2-40B4-BE49-F238E27FC236}">
+                <a16:creationId xmlns:a16="http://schemas.microsoft.com/office/drawing/2014/main" id="{88C97474-5879-4DB5-B4F3-F0357104BC8E}"/>
               </a:ext>
               <a:ext uri="{C183D7F6-B498-43B3-948B-1728B52AA6E4}">
                 <adec:decorative xmlns:adec="http://schemas.microsoft.com/office/drawing/2017/decorative" val="1"/>
@@ -6158,10 +6152,70 @@
             <a:avLst/>
           </a:prstGeom>
           <a:solidFill>
-            <a:schemeClr val="bg1">
-              <a:lumMod val="75000"/>
-              <a:lumOff val="25000"/>
+            <a:schemeClr val="tx1"/>
+          </a:solidFill>
+          <a:ln>
+            <a:noFill/>
+          </a:ln>
+        </p:spPr>
+        <p:style>
+          <a:lnRef idx="2">
+            <a:schemeClr val="accent1">
+              <a:shade val="50000"/>
             </a:schemeClr>
+          </a:lnRef>
+          <a:fillRef idx="1">
+            <a:schemeClr val="accent1"/>
+          </a:fillRef>
+          <a:effectRef idx="0">
+            <a:schemeClr val="accent1"/>
+          </a:effectRef>
+          <a:fontRef idx="minor">
+            <a:schemeClr val="lt1"/>
+          </a:fontRef>
+        </p:style>
+        <p:txBody>
+          <a:bodyPr rtlCol="0" anchor="ctr"/>
+          <a:lstStyle/>
+          <a:p>
+            <a:pPr algn="ctr"/>
+            <a:endParaRPr lang="en-US"/>
+          </a:p>
+        </p:txBody>
+      </p:sp>
+      <p:sp>
+        <p:nvSpPr>
+          <p:cNvPr id="19" name="Rectangle 18">
+            <a:extLst>
+              <a:ext uri="{FF2B5EF4-FFF2-40B4-BE49-F238E27FC236}">
+                <a16:creationId xmlns:a16="http://schemas.microsoft.com/office/drawing/2014/main" id="{7D2AF00E-D433-4047-863F-BCB69CEC3C35}"/>
+              </a:ext>
+              <a:ext uri="{C183D7F6-B498-43B3-948B-1728B52AA6E4}">
+                <adec:decorative xmlns:adec="http://schemas.microsoft.com/office/drawing/2017/decorative" val="1"/>
+              </a:ext>
+            </a:extLst>
+          </p:cNvPr>
+          <p:cNvSpPr>
+            <a:spLocks noGrp="1" noRot="1" noChangeAspect="1" noMove="1" noResize="1" noEditPoints="1" noAdjustHandles="1" noChangeArrowheads="1" noChangeShapeType="1" noTextEdit="1"/>
+          </p:cNvSpPr>
+          <p:nvPr>
+            <p:extLst>
+              <p:ext uri="{386F3935-93C4-4BCD-93E2-E3B085C9AB24}">
+                <p16:designElem xmlns:p16="http://schemas.microsoft.com/office/powerpoint/2015/main" val="1"/>
+              </p:ext>
+            </p:extLst>
+          </p:nvPr>
+        </p:nvSpPr>
+        <p:spPr>
+          <a:xfrm>
+            <a:off x="451588" y="601200"/>
+            <a:ext cx="7498616" cy="5789365"/>
+          </a:xfrm>
+          <a:prstGeom prst="rect">
+            <a:avLst/>
+          </a:prstGeom>
+          <a:solidFill>
+            <a:srgbClr val="465359"/>
           </a:solidFill>
           <a:ln>
             <a:noFill/>
@@ -6201,8 +6255,8 @@
         </p:nvSpPr>
         <p:spPr>
           <a:xfrm>
-            <a:off x="609906" y="702155"/>
-            <a:ext cx="3568661" cy="1269713"/>
+            <a:off x="807559" y="938022"/>
+            <a:ext cx="6647905" cy="722998"/>
           </a:xfrm>
         </p:spPr>
         <p:txBody>
@@ -6212,15 +6266,27 @@
           <a:lstStyle/>
           <a:p>
             <a:r>
-              <a:rPr lang="en-US"/>
+              <a:rPr lang="en-US" dirty="0">
+                <a:solidFill>
+                  <a:srgbClr val="FFFFFF"/>
+                </a:solidFill>
+              </a:rPr>
               <a:t>Structure </a:t>
             </a:r>
             <a:r>
-              <a:rPr lang="en-US" err="1"/>
+              <a:rPr lang="en-US" dirty="0" err="1">
+                <a:solidFill>
+                  <a:srgbClr val="FFFFFF"/>
+                </a:solidFill>
+              </a:rPr>
               <a:t>mvc</a:t>
             </a:r>
             <a:r>
-              <a:rPr lang="en-US"/>
+              <a:rPr lang="en-US" dirty="0">
+                <a:solidFill>
+                  <a:srgbClr val="FFFFFF"/>
+                </a:solidFill>
+              </a:rPr>
               <a:t> - model</a:t>
             </a:r>
           </a:p>
@@ -6228,10 +6294,10 @@
       </p:sp>
       <p:sp>
         <p:nvSpPr>
-          <p:cNvPr id="12" name="Rectangle 11">
-            <a:extLst>
-              <a:ext uri="{FF2B5EF4-FFF2-40B4-BE49-F238E27FC236}">
-                <a16:creationId xmlns:a16="http://schemas.microsoft.com/office/drawing/2014/main" id="{E536F3B4-50F6-4C52-8F76-4EB1214719DC}"/>
+          <p:cNvPr id="21" name="Rectangle 20">
+            <a:extLst>
+              <a:ext uri="{FF2B5EF4-FFF2-40B4-BE49-F238E27FC236}">
+                <a16:creationId xmlns:a16="http://schemas.microsoft.com/office/drawing/2014/main" id="{0997DBEA-6DFC-457A-9850-E535053549D6}"/>
               </a:ext>
               <a:ext uri="{C183D7F6-B498-43B3-948B-1728B52AA6E4}">
                 <adec:decorative xmlns:adec="http://schemas.microsoft.com/office/drawing/2017/decorative" val="1"/>
@@ -6251,14 +6317,14 @@
         </p:nvSpPr>
         <p:spPr>
           <a:xfrm>
-            <a:off x="638620" y="457200"/>
-            <a:ext cx="3511233" cy="91439"/>
+            <a:off x="446534" y="457200"/>
+            <a:ext cx="3703320" cy="94997"/>
           </a:xfrm>
           <a:prstGeom prst="rect">
             <a:avLst/>
           </a:prstGeom>
           <a:solidFill>
-            <a:schemeClr val="accent1"/>
+            <a:srgbClr val="465359"/>
           </a:solidFill>
           <a:ln>
             <a:noFill/>
@@ -6282,6 +6348,114 @@
       </p:sp>
       <p:sp>
         <p:nvSpPr>
+          <p:cNvPr id="23" name="Rectangle 22">
+            <a:extLst>
+              <a:ext uri="{FF2B5EF4-FFF2-40B4-BE49-F238E27FC236}">
+                <a16:creationId xmlns:a16="http://schemas.microsoft.com/office/drawing/2014/main" id="{79446CF5-953A-4916-BFF4-F5558E5C2359}"/>
+              </a:ext>
+              <a:ext uri="{C183D7F6-B498-43B3-948B-1728B52AA6E4}">
+                <adec:decorative xmlns:adec="http://schemas.microsoft.com/office/drawing/2017/decorative" val="1"/>
+              </a:ext>
+            </a:extLst>
+          </p:cNvPr>
+          <p:cNvSpPr>
+            <a:spLocks noGrp="1" noRot="1" noChangeAspect="1" noMove="1" noResize="1" noEditPoints="1" noAdjustHandles="1" noChangeArrowheads="1" noChangeShapeType="1" noTextEdit="1"/>
+          </p:cNvSpPr>
+          <p:nvPr>
+            <p:extLst>
+              <p:ext uri="{386F3935-93C4-4BCD-93E2-E3B085C9AB24}">
+                <p16:designElem xmlns:p16="http://schemas.microsoft.com/office/powerpoint/2015/main" val="1"/>
+              </p:ext>
+            </p:extLst>
+          </p:nvPr>
+        </p:nvSpPr>
+        <p:spPr>
+          <a:xfrm>
+            <a:off x="4241830" y="457200"/>
+            <a:ext cx="3703320" cy="91440"/>
+          </a:xfrm>
+          <a:prstGeom prst="rect">
+            <a:avLst/>
+          </a:prstGeom>
+          <a:solidFill>
+            <a:schemeClr val="accent1"/>
+          </a:solidFill>
+          <a:ln>
+            <a:noFill/>
+          </a:ln>
+          <a:effectLst/>
+        </p:spPr>
+        <p:style>
+          <a:lnRef idx="1">
+            <a:schemeClr val="accent1"/>
+          </a:lnRef>
+          <a:fillRef idx="3">
+            <a:schemeClr val="accent1"/>
+          </a:fillRef>
+          <a:effectRef idx="2">
+            <a:schemeClr val="accent1"/>
+          </a:effectRef>
+          <a:fontRef idx="minor">
+            <a:schemeClr val="lt1"/>
+          </a:fontRef>
+        </p:style>
+      </p:sp>
+      <p:sp>
+        <p:nvSpPr>
+          <p:cNvPr id="25" name="Rectangle 24">
+            <a:extLst>
+              <a:ext uri="{FF2B5EF4-FFF2-40B4-BE49-F238E27FC236}">
+                <a16:creationId xmlns:a16="http://schemas.microsoft.com/office/drawing/2014/main" id="{477B945C-B433-4DFF-9A67-A5C9257E471C}"/>
+              </a:ext>
+              <a:ext uri="{C183D7F6-B498-43B3-948B-1728B52AA6E4}">
+                <adec:decorative xmlns:adec="http://schemas.microsoft.com/office/drawing/2017/decorative" val="1"/>
+              </a:ext>
+            </a:extLst>
+          </p:cNvPr>
+          <p:cNvSpPr>
+            <a:spLocks noGrp="1" noRot="1" noChangeAspect="1" noMove="1" noResize="1" noEditPoints="1" noAdjustHandles="1" noChangeArrowheads="1" noChangeShapeType="1" noTextEdit="1"/>
+          </p:cNvSpPr>
+          <p:nvPr>
+            <p:extLst>
+              <p:ext uri="{386F3935-93C4-4BCD-93E2-E3B085C9AB24}">
+                <p16:designElem xmlns:p16="http://schemas.microsoft.com/office/powerpoint/2015/main" val="1"/>
+              </p:ext>
+            </p:extLst>
+          </p:nvPr>
+        </p:nvSpPr>
+        <p:spPr>
+          <a:xfrm>
+            <a:off x="8042147" y="453643"/>
+            <a:ext cx="3703320" cy="98554"/>
+          </a:xfrm>
+          <a:prstGeom prst="rect">
+            <a:avLst/>
+          </a:prstGeom>
+          <a:solidFill>
+            <a:srgbClr val="969FA7"/>
+          </a:solidFill>
+          <a:ln>
+            <a:noFill/>
+          </a:ln>
+          <a:effectLst/>
+        </p:spPr>
+        <p:style>
+          <a:lnRef idx="1">
+            <a:schemeClr val="accent1"/>
+          </a:lnRef>
+          <a:fillRef idx="3">
+            <a:schemeClr val="accent1"/>
+          </a:fillRef>
+          <a:effectRef idx="2">
+            <a:schemeClr val="accent1"/>
+          </a:effectRef>
+          <a:fontRef idx="minor">
+            <a:schemeClr val="lt1"/>
+          </a:fontRef>
+        </p:style>
+      </p:sp>
+      <p:sp>
+        <p:nvSpPr>
           <p:cNvPr id="5" name="ZoneTexte 4">
             <a:extLst>
               <a:ext uri="{FF2B5EF4-FFF2-40B4-BE49-F238E27FC236}">
@@ -6294,8 +6468,8 @@
         </p:nvSpPr>
         <p:spPr>
           <a:xfrm>
-            <a:off x="609906" y="2340864"/>
-            <a:ext cx="3568661" cy="3634486"/>
+            <a:off x="807559" y="2340864"/>
+            <a:ext cx="6690843" cy="3793237"/>
           </a:xfrm>
           <a:prstGeom prst="rect">
             <a:avLst/>
@@ -6308,6 +6482,9 @@
           <a:lstStyle/>
           <a:p>
             <a:pPr marL="285750" indent="-285750" defTabSz="457200">
+              <a:lnSpc>
+                <a:spcPct val="90000"/>
+              </a:lnSpc>
               <a:spcBef>
                 <a:spcPct val="20000"/>
               </a:spcBef>
@@ -6322,30 +6499,19 @@
               <a:buChar char=""/>
             </a:pPr>
             <a:r>
-              <a:rPr lang="en-US" err="1">
-                <a:solidFill>
-                  <a:schemeClr val="tx1">
-                    <a:lumMod val="75000"/>
-                    <a:lumOff val="25000"/>
-                  </a:schemeClr>
+              <a:rPr lang="en-US" sz="1700">
+                <a:solidFill>
+                  <a:srgbClr val="FFFFFF"/>
                 </a:solidFill>
               </a:rPr>
-              <a:t>Fichiers</a:t>
-            </a:r>
-            <a:r>
-              <a:rPr lang="en-US">
-                <a:solidFill>
-                  <a:schemeClr val="tx1">
-                    <a:lumMod val="75000"/>
-                    <a:lumOff val="25000"/>
-                  </a:schemeClr>
-                </a:solidFill>
-              </a:rPr>
-              <a:t> Service</a:t>
+              <a:t>Fichiers Service</a:t>
             </a:r>
           </a:p>
           <a:p>
             <a:pPr marL="742950" lvl="1" indent="-285750" defTabSz="457200">
+              <a:lnSpc>
+                <a:spcPct val="90000"/>
+              </a:lnSpc>
               <a:spcBef>
                 <a:spcPct val="20000"/>
               </a:spcBef>
@@ -6360,63 +6526,19 @@
               <a:buChar char=""/>
             </a:pPr>
             <a:r>
-              <a:rPr lang="en-US">
-                <a:solidFill>
-                  <a:schemeClr val="tx1">
-                    <a:lumMod val="75000"/>
-                    <a:lumOff val="25000"/>
-                  </a:schemeClr>
+              <a:rPr lang="en-US" sz="1700">
+                <a:solidFill>
+                  <a:srgbClr val="FFFFFF"/>
                 </a:solidFill>
               </a:rPr>
-              <a:t>Appels API (</a:t>
-            </a:r>
-            <a:r>
-              <a:rPr lang="en-US" err="1">
-                <a:solidFill>
-                  <a:schemeClr val="tx1">
-                    <a:lumMod val="75000"/>
-                    <a:lumOff val="25000"/>
-                  </a:schemeClr>
-                </a:solidFill>
-              </a:rPr>
-              <a:t>URLSession</a:t>
-            </a:r>
-            <a:r>
-              <a:rPr lang="en-US">
-                <a:solidFill>
-                  <a:schemeClr val="tx1">
-                    <a:lumMod val="75000"/>
-                    <a:lumOff val="25000"/>
-                  </a:schemeClr>
-                </a:solidFill>
-              </a:rPr>
-              <a:t>, </a:t>
-            </a:r>
-            <a:r>
-              <a:rPr lang="en-US" err="1">
-                <a:solidFill>
-                  <a:schemeClr val="tx1">
-                    <a:lumMod val="75000"/>
-                    <a:lumOff val="25000"/>
-                  </a:schemeClr>
-                </a:solidFill>
-              </a:rPr>
-              <a:t>dataTask</a:t>
-            </a:r>
-            <a:r>
-              <a:rPr lang="en-US">
-                <a:solidFill>
-                  <a:schemeClr val="tx1">
-                    <a:lumMod val="75000"/>
-                    <a:lumOff val="25000"/>
-                  </a:schemeClr>
-                </a:solidFill>
-              </a:rPr>
-              <a:t>)</a:t>
+              <a:t>Appels API (URLSession, dataTask)</a:t>
             </a:r>
           </a:p>
           <a:p>
             <a:pPr marL="742950" lvl="1" indent="-285750" defTabSz="457200">
+              <a:lnSpc>
+                <a:spcPct val="90000"/>
+              </a:lnSpc>
               <a:spcBef>
                 <a:spcPct val="20000"/>
               </a:spcBef>
@@ -6431,12 +6553,9 @@
               <a:buChar char=""/>
             </a:pPr>
             <a:r>
-              <a:rPr lang="en-US">
-                <a:solidFill>
-                  <a:schemeClr val="tx1">
-                    <a:lumMod val="75000"/>
-                    <a:lumOff val="25000"/>
-                  </a:schemeClr>
+              <a:rPr lang="en-US" sz="1700">
+                <a:solidFill>
+                  <a:srgbClr val="FFFFFF"/>
                 </a:solidFill>
               </a:rPr>
               <a:t>Singleton</a:t>
@@ -6444,6 +6563,9 @@
           </a:p>
           <a:p>
             <a:pPr marL="742950" lvl="1" indent="-285750" defTabSz="457200">
+              <a:lnSpc>
+                <a:spcPct val="90000"/>
+              </a:lnSpc>
               <a:spcBef>
                 <a:spcPct val="20000"/>
               </a:spcBef>
@@ -6458,38 +6580,19 @@
               <a:buChar char=""/>
             </a:pPr>
             <a:r>
-              <a:rPr lang="en-US">
-                <a:solidFill>
-                  <a:schemeClr val="tx1">
-                    <a:lumMod val="75000"/>
-                    <a:lumOff val="25000"/>
-                  </a:schemeClr>
+              <a:rPr lang="en-US" sz="1700">
+                <a:solidFill>
+                  <a:srgbClr val="FFFFFF"/>
                 </a:solidFill>
               </a:rPr>
-              <a:t>Callback avec le </a:t>
-            </a:r>
-            <a:r>
-              <a:rPr lang="en-US" err="1">
-                <a:solidFill>
-                  <a:schemeClr val="tx1">
-                    <a:lumMod val="75000"/>
-                    <a:lumOff val="25000"/>
-                  </a:schemeClr>
-                </a:solidFill>
-              </a:rPr>
-              <a:t>résultat</a:t>
-            </a:r>
-            <a:endParaRPr lang="en-US">
-              <a:solidFill>
-                <a:schemeClr val="tx1">
-                  <a:lumMod val="75000"/>
-                  <a:lumOff val="25000"/>
-                </a:schemeClr>
-              </a:solidFill>
-            </a:endParaRPr>
+              <a:t>Callback avec le résultat</a:t>
+            </a:r>
           </a:p>
           <a:p>
             <a:pPr marL="285750" indent="-285750" defTabSz="457200">
+              <a:lnSpc>
+                <a:spcPct val="90000"/>
+              </a:lnSpc>
               <a:spcBef>
                 <a:spcPct val="20000"/>
               </a:spcBef>
@@ -6503,17 +6606,17 @@
               <a:buFont typeface="Wingdings 2" panose="05020102010507070707" pitchFamily="18" charset="2"/>
               <a:buChar char=""/>
             </a:pPr>
-            <a:endParaRPr lang="en-US">
+            <a:endParaRPr lang="en-US" sz="1700">
               <a:solidFill>
-                <a:schemeClr val="tx1">
-                  <a:lumMod val="75000"/>
-                  <a:lumOff val="25000"/>
-                </a:schemeClr>
+                <a:srgbClr val="FFFFFF"/>
               </a:solidFill>
             </a:endParaRPr>
           </a:p>
           <a:p>
             <a:pPr marL="285750" indent="-285750" defTabSz="457200">
+              <a:lnSpc>
+                <a:spcPct val="90000"/>
+              </a:lnSpc>
               <a:spcBef>
                 <a:spcPct val="20000"/>
               </a:spcBef>
@@ -6528,30 +6631,19 @@
               <a:buChar char=""/>
             </a:pPr>
             <a:r>
-              <a:rPr lang="en-US" err="1">
-                <a:solidFill>
-                  <a:schemeClr val="tx1">
-                    <a:lumMod val="75000"/>
-                    <a:lumOff val="25000"/>
-                  </a:schemeClr>
+              <a:rPr lang="en-US" sz="1700">
+                <a:solidFill>
+                  <a:srgbClr val="FFFFFF"/>
                 </a:solidFill>
               </a:rPr>
-              <a:t>Fichiers</a:t>
-            </a:r>
-            <a:r>
-              <a:rPr lang="en-US">
-                <a:solidFill>
-                  <a:schemeClr val="tx1">
-                    <a:lumMod val="75000"/>
-                    <a:lumOff val="25000"/>
-                  </a:schemeClr>
-                </a:solidFill>
-              </a:rPr>
-              <a:t> Response</a:t>
+              <a:t>Fichiers Response</a:t>
             </a:r>
           </a:p>
           <a:p>
             <a:pPr marL="742950" lvl="1" indent="-285750" defTabSz="457200">
+              <a:lnSpc>
+                <a:spcPct val="90000"/>
+              </a:lnSpc>
               <a:spcBef>
                 <a:spcPct val="20000"/>
               </a:spcBef>
@@ -6566,74 +6658,19 @@
               <a:buChar char=""/>
             </a:pPr>
             <a:r>
-              <a:rPr lang="en-US" err="1">
-                <a:solidFill>
-                  <a:schemeClr val="tx1">
-                    <a:lumMod val="75000"/>
-                    <a:lumOff val="25000"/>
-                  </a:schemeClr>
+              <a:rPr lang="en-US" sz="1700">
+                <a:solidFill>
+                  <a:srgbClr val="FFFFFF"/>
                 </a:solidFill>
               </a:rPr>
-              <a:t>Squelette</a:t>
-            </a:r>
-            <a:r>
-              <a:rPr lang="en-US">
-                <a:solidFill>
-                  <a:schemeClr val="tx1">
-                    <a:lumMod val="75000"/>
-                    <a:lumOff val="25000"/>
-                  </a:schemeClr>
-                </a:solidFill>
-              </a:rPr>
-              <a:t> du </a:t>
-            </a:r>
-            <a:r>
-              <a:rPr lang="en-US" err="1">
-                <a:solidFill>
-                  <a:schemeClr val="tx1">
-                    <a:lumMod val="75000"/>
-                    <a:lumOff val="25000"/>
-                  </a:schemeClr>
-                </a:solidFill>
-              </a:rPr>
-              <a:t>fichier</a:t>
-            </a:r>
-            <a:r>
-              <a:rPr lang="en-US">
-                <a:solidFill>
-                  <a:schemeClr val="tx1">
-                    <a:lumMod val="75000"/>
-                    <a:lumOff val="25000"/>
-                  </a:schemeClr>
-                </a:solidFill>
-              </a:rPr>
-              <a:t> JSON de </a:t>
-            </a:r>
-            <a:r>
-              <a:rPr lang="en-US" err="1">
-                <a:solidFill>
-                  <a:schemeClr val="tx1">
-                    <a:lumMod val="75000"/>
-                    <a:lumOff val="25000"/>
-                  </a:schemeClr>
-                </a:solidFill>
-              </a:rPr>
-              <a:t>l’appel</a:t>
-            </a:r>
-            <a:r>
-              <a:rPr lang="en-US">
-                <a:solidFill>
-                  <a:schemeClr val="tx1">
-                    <a:lumMod val="75000"/>
-                    <a:lumOff val="25000"/>
-                  </a:schemeClr>
-                </a:solidFill>
-              </a:rPr>
-              <a:t> API</a:t>
-            </a:r>
-          </a:p>
-          <a:p>
-            <a:pPr marL="285750" indent="-285750" defTabSz="457200">
+              <a:t>Squelette du fichier JSON de l’appel API</a:t>
+            </a:r>
+          </a:p>
+          <a:p>
+            <a:pPr lvl="1" defTabSz="457200">
+              <a:lnSpc>
+                <a:spcPct val="90000"/>
+              </a:lnSpc>
               <a:spcBef>
                 <a:spcPct val="20000"/>
               </a:spcBef>
@@ -6647,17 +6684,17 @@
               <a:buFont typeface="Wingdings 2" panose="05020102010507070707" pitchFamily="18" charset="2"/>
               <a:buChar char=""/>
             </a:pPr>
-            <a:endParaRPr lang="en-US">
+            <a:endParaRPr lang="en-US" sz="1700">
               <a:solidFill>
-                <a:schemeClr val="tx1">
-                  <a:lumMod val="75000"/>
-                  <a:lumOff val="25000"/>
-                </a:schemeClr>
+                <a:srgbClr val="FFFFFF"/>
               </a:solidFill>
             </a:endParaRPr>
           </a:p>
           <a:p>
-            <a:pPr marL="742950" lvl="1" indent="-285750" defTabSz="457200">
+            <a:pPr marL="285750" indent="-285750" defTabSz="457200">
+              <a:lnSpc>
+                <a:spcPct val="90000"/>
+              </a:lnSpc>
               <a:spcBef>
                 <a:spcPct val="20000"/>
               </a:spcBef>
@@ -6671,23 +6708,98 @@
               <a:buFont typeface="Wingdings 2" panose="05020102010507070707" pitchFamily="18" charset="2"/>
               <a:buChar char=""/>
             </a:pPr>
-            <a:endParaRPr lang="en-US">
+            <a:r>
+              <a:rPr lang="en-US" sz="1700">
+                <a:solidFill>
+                  <a:srgbClr val="FFFFFF"/>
+                </a:solidFill>
+              </a:rPr>
+              <a:t>Exchange.swift</a:t>
+            </a:r>
+          </a:p>
+          <a:p>
+            <a:pPr marL="742950" lvl="1" indent="-285750" defTabSz="457200">
+              <a:lnSpc>
+                <a:spcPct val="90000"/>
+              </a:lnSpc>
+              <a:spcBef>
+                <a:spcPct val="20000"/>
+              </a:spcBef>
+              <a:spcAft>
+                <a:spcPts val="600"/>
+              </a:spcAft>
+              <a:buClr>
+                <a:schemeClr val="accent1"/>
+              </a:buClr>
+              <a:buSzPct val="92000"/>
+              <a:buFont typeface="Wingdings 2" panose="05020102010507070707" pitchFamily="18" charset="2"/>
+              <a:buChar char=""/>
+            </a:pPr>
+            <a:r>
+              <a:rPr lang="en-US" sz="1700">
+                <a:solidFill>
+                  <a:srgbClr val="FFFFFF"/>
+                </a:solidFill>
+              </a:rPr>
+              <a:t>Pour convertir le montant EUR -&gt; USD</a:t>
+            </a:r>
+          </a:p>
+          <a:p>
+            <a:pPr marL="285750" indent="-285750" defTabSz="457200">
+              <a:lnSpc>
+                <a:spcPct val="90000"/>
+              </a:lnSpc>
+              <a:spcBef>
+                <a:spcPct val="20000"/>
+              </a:spcBef>
+              <a:spcAft>
+                <a:spcPts val="600"/>
+              </a:spcAft>
+              <a:buClr>
+                <a:schemeClr val="accent1"/>
+              </a:buClr>
+              <a:buSzPct val="92000"/>
+              <a:buFont typeface="Wingdings 2" panose="05020102010507070707" pitchFamily="18" charset="2"/>
+              <a:buChar char=""/>
+            </a:pPr>
+            <a:endParaRPr lang="en-US" sz="1700">
               <a:solidFill>
-                <a:schemeClr val="tx1">
-                  <a:lumMod val="75000"/>
-                  <a:lumOff val="25000"/>
-                </a:schemeClr>
+                <a:srgbClr val="FFFFFF"/>
               </a:solidFill>
             </a:endParaRPr>
           </a:p>
+          <a:p>
+            <a:pPr marL="742950" lvl="1" indent="-285750" defTabSz="457200">
+              <a:lnSpc>
+                <a:spcPct val="90000"/>
+              </a:lnSpc>
+              <a:spcBef>
+                <a:spcPct val="20000"/>
+              </a:spcBef>
+              <a:spcAft>
+                <a:spcPts val="600"/>
+              </a:spcAft>
+              <a:buClr>
+                <a:schemeClr val="accent1"/>
+              </a:buClr>
+              <a:buSzPct val="92000"/>
+              <a:buFont typeface="Wingdings 2" panose="05020102010507070707" pitchFamily="18" charset="2"/>
+              <a:buChar char=""/>
+            </a:pPr>
+            <a:endParaRPr lang="en-US" sz="1700">
+              <a:solidFill>
+                <a:srgbClr val="FFFFFF"/>
+              </a:solidFill>
+            </a:endParaRPr>
+          </a:p>
         </p:txBody>
       </p:sp>
       <p:pic>
         <p:nvPicPr>
-          <p:cNvPr id="4" name="Espace réservé du contenu 3">
-            <a:extLst>
-              <a:ext uri="{FF2B5EF4-FFF2-40B4-BE49-F238E27FC236}">
-                <a16:creationId xmlns:a16="http://schemas.microsoft.com/office/drawing/2014/main" id="{C8CE9C3B-7B70-0E09-1739-946568FDA3D4}"/>
+          <p:cNvPr id="8" name="Espace réservé du contenu 7" descr="Une image contenant texte&#10;&#10;Description générée automatiquement">
+            <a:extLst>
+              <a:ext uri="{FF2B5EF4-FFF2-40B4-BE49-F238E27FC236}">
+                <a16:creationId xmlns:a16="http://schemas.microsoft.com/office/drawing/2014/main" id="{76158C06-DA76-3C02-2A83-7F2E3457A96D}"/>
               </a:ext>
             </a:extLst>
           </p:cNvPr>
@@ -6699,21 +6811,15 @@
           </p:nvPr>
         </p:nvPicPr>
         <p:blipFill>
-          <a:blip r:embed="rId2">
-            <a:extLst>
-              <a:ext uri="{28A0092B-C50C-407E-A947-70E740481C1C}">
-                <a14:useLocalDpi xmlns:a14="http://schemas.microsoft.com/office/drawing/2010/main" val="0"/>
-              </a:ext>
-            </a:extLst>
-          </a:blip>
+          <a:blip r:embed="rId2"/>
           <a:stretch>
             <a:fillRect/>
           </a:stretch>
         </p:blipFill>
         <p:spPr>
           <a:xfrm>
-            <a:off x="6096000" y="1558925"/>
-            <a:ext cx="4311991" cy="3740150"/>
+            <a:off x="8040568" y="1896612"/>
+            <a:ext cx="4061068" cy="3198539"/>
           </a:xfrm>
           <a:prstGeom prst="rect">
             <a:avLst/>
@@ -6728,7 +6834,7 @@
     </p:extLst>
   </p:cSld>
   <p:clrMapOvr>
-    <a:masterClrMapping/>
+    <a:overrideClrMapping bg1="dk1" tx1="lt1" bg2="dk2" tx2="lt2" accent1="accent1" accent2="accent2" accent3="accent3" accent4="accent4" accent5="accent5" accent6="accent6" hlink="hlink" folHlink="folHlink"/>
   </p:clrMapOvr>
 </p:sld>
 </file>
@@ -7556,7 +7662,7 @@
       </p:grpSpPr>
       <p:sp>
         <p:nvSpPr>
-          <p:cNvPr id="9" name="Rectangle 8">
+          <p:cNvPr id="26" name="Rectangle 25">
             <a:extLst>
               <a:ext uri="{FF2B5EF4-FFF2-40B4-BE49-F238E27FC236}">
                 <a16:creationId xmlns:a16="http://schemas.microsoft.com/office/drawing/2014/main" id="{DD651B61-325E-4E73-8445-38B0DE8AAAB6}"/>
@@ -7610,7 +7716,7 @@
       </p:sp>
       <p:sp>
         <p:nvSpPr>
-          <p:cNvPr id="11" name="Rectangle 10">
+          <p:cNvPr id="28" name="Rectangle 27">
             <a:extLst>
               <a:ext uri="{FF2B5EF4-FFF2-40B4-BE49-F238E27FC236}">
                 <a16:creationId xmlns:a16="http://schemas.microsoft.com/office/drawing/2014/main" id="{B42E5253-D3AC-4AC2-B766-8B34F13C2F5E}"/>
@@ -7664,7 +7770,7 @@
       </p:sp>
       <p:sp>
         <p:nvSpPr>
-          <p:cNvPr id="13" name="Rectangle 12">
+          <p:cNvPr id="30" name="Rectangle 29">
             <a:extLst>
               <a:ext uri="{FF2B5EF4-FFF2-40B4-BE49-F238E27FC236}">
                 <a16:creationId xmlns:a16="http://schemas.microsoft.com/office/drawing/2014/main" id="{10AE8D57-436A-4073-9A75-15BB5949F8B4}"/>
@@ -7718,7 +7824,7 @@
       </p:sp>
       <p:sp>
         <p:nvSpPr>
-          <p:cNvPr id="15" name="Rectangle 14">
+          <p:cNvPr id="32" name="Rectangle 31">
             <a:extLst>
               <a:ext uri="{FF2B5EF4-FFF2-40B4-BE49-F238E27FC236}">
                 <a16:creationId xmlns:a16="http://schemas.microsoft.com/office/drawing/2014/main" id="{E2852671-8EB6-4EAF-8AF8-65CF3FD66456}"/>
@@ -7772,7 +7878,7 @@
       </p:sp>
       <p:sp useBgFill="1">
         <p:nvSpPr>
-          <p:cNvPr id="17" name="Rectangle 16">
+          <p:cNvPr id="34" name="Rectangle 33">
             <a:extLst>
               <a:ext uri="{FF2B5EF4-FFF2-40B4-BE49-F238E27FC236}">
                 <a16:creationId xmlns:a16="http://schemas.microsoft.com/office/drawing/2014/main" id="{26B4480E-B7FF-4481-890E-043A69AE6FE2}"/>
@@ -7832,7 +7938,7 @@
       </p:sp>
       <p:grpSp>
         <p:nvGrpSpPr>
-          <p:cNvPr id="19" name="Group 18">
+          <p:cNvPr id="36" name="Group 35">
             <a:extLst>
               <a:ext uri="{FF2B5EF4-FFF2-40B4-BE49-F238E27FC236}">
                 <a16:creationId xmlns:a16="http://schemas.microsoft.com/office/drawing/2014/main" id="{79394E1F-0B5F-497D-B2A6-8383A2A54834}"/>
@@ -7863,7 +7969,7 @@
         </p:grpSpPr>
         <p:sp>
           <p:nvSpPr>
-            <p:cNvPr id="20" name="Rectangle 19">
+            <p:cNvPr id="37" name="Rectangle 36">
               <a:extLst>
                 <a:ext uri="{FF2B5EF4-FFF2-40B4-BE49-F238E27FC236}">
                   <a16:creationId xmlns:a16="http://schemas.microsoft.com/office/drawing/2014/main" id="{1F1FF39A-AC3C-4066-9D4C-519AA22812EA}"/>
@@ -7917,7 +8023,7 @@
         </p:sp>
         <p:sp>
           <p:nvSpPr>
-            <p:cNvPr id="21" name="Rectangle 20">
+            <p:cNvPr id="38" name="Rectangle 37">
               <a:extLst>
                 <a:ext uri="{FF2B5EF4-FFF2-40B4-BE49-F238E27FC236}">
                   <a16:creationId xmlns:a16="http://schemas.microsoft.com/office/drawing/2014/main" id="{64C13BAB-7C00-4D21-A857-E3D41C0A2A66}"/>
@@ -8009,10 +8115,10 @@
       </p:sp>
       <p:pic>
         <p:nvPicPr>
-          <p:cNvPr id="4" name="Espace réservé du contenu 3">
-            <a:extLst>
-              <a:ext uri="{FF2B5EF4-FFF2-40B4-BE49-F238E27FC236}">
-                <a16:creationId xmlns:a16="http://schemas.microsoft.com/office/drawing/2014/main" id="{36BC8B22-D0D1-552B-2BA1-A0C1E15BC4B4}"/>
+          <p:cNvPr id="7" name="Espace réservé du contenu 6">
+            <a:extLst>
+              <a:ext uri="{FF2B5EF4-FFF2-40B4-BE49-F238E27FC236}">
+                <a16:creationId xmlns:a16="http://schemas.microsoft.com/office/drawing/2014/main" id="{394FE42E-F8A6-6D69-6EFA-D317AD01AB6B}"/>
               </a:ext>
             </a:extLst>
           </p:cNvPr>
@@ -8024,13 +8130,7 @@
           </p:nvPr>
         </p:nvPicPr>
         <p:blipFill>
-          <a:blip r:embed="rId2">
-            <a:extLst>
-              <a:ext uri="{28A0092B-C50C-407E-A947-70E740481C1C}">
-                <a14:useLocalDpi xmlns:a14="http://schemas.microsoft.com/office/drawing/2010/main" val="0"/>
-              </a:ext>
-            </a:extLst>
-          </a:blip>
+          <a:blip r:embed="rId2"/>
           <a:stretch>
             <a:fillRect/>
           </a:stretch>
@@ -8038,7 +8138,7 @@
         <p:spPr>
           <a:xfrm>
             <a:off x="4765053" y="660464"/>
-            <a:ext cx="6764864" cy="5513363"/>
+            <a:ext cx="6764864" cy="5513362"/>
           </a:xfrm>
           <a:prstGeom prst="rect">
             <a:avLst/>

</xml_diff>

<commit_message>
Modifications des documents et corrections dans le code
</commit_message>
<xml_diff>
--- a/Soutenance/Horn_Mickael_presentation_4_102022.pptx
+++ b/Soutenance/Horn_Mickael_presentation_4_102022.pptx
@@ -12,9 +12,10 @@
     <p:sldId id="260" r:id="rId6"/>
     <p:sldId id="262" r:id="rId7"/>
     <p:sldId id="263" r:id="rId8"/>
-    <p:sldId id="266" r:id="rId9"/>
-    <p:sldId id="264" r:id="rId10"/>
-    <p:sldId id="265" r:id="rId11"/>
+    <p:sldId id="267" r:id="rId9"/>
+    <p:sldId id="266" r:id="rId10"/>
+    <p:sldId id="264" r:id="rId11"/>
+    <p:sldId id="265" r:id="rId12"/>
   </p:sldIdLst>
   <p:sldSz cx="12192000" cy="6858000"/>
   <p:notesSz cx="6858000" cy="9144000"/>
@@ -359,7 +360,7 @@
           <a:p>
             <a:fld id="{ED291B17-9318-49DB-B28B-6E5994AE9581}" type="datetime1">
               <a:rPr lang="en-US" smtClean="0"/>
-              <a:t>1/13/23</a:t>
+              <a:t>1/18/23</a:t>
             </a:fld>
             <a:endParaRPr lang="en-US"/>
           </a:p>
@@ -562,7 +563,7 @@
           <a:p>
             <a:fld id="{2CED4963-E985-44C4-B8C4-FDD613B7C2F8}" type="datetime1">
               <a:rPr lang="en-US" smtClean="0"/>
-              <a:t>1/13/23</a:t>
+              <a:t>1/18/23</a:t>
             </a:fld>
             <a:endParaRPr lang="en-US"/>
           </a:p>
@@ -924,7 +925,7 @@
           <a:p>
             <a:fld id="{ED291B17-9318-49DB-B28B-6E5994AE9581}" type="datetime1">
               <a:rPr lang="en-US" smtClean="0"/>
-              <a:t>1/13/23</a:t>
+              <a:t>1/18/23</a:t>
             </a:fld>
             <a:endParaRPr lang="en-US"/>
           </a:p>
@@ -1122,7 +1123,7 @@
           <a:p>
             <a:fld id="{78DD82B9-B8EE-4375-B6FF-88FA6ABB15D9}" type="datetime1">
               <a:rPr lang="en-US" smtClean="0"/>
-              <a:t>1/13/23</a:t>
+              <a:t>1/18/23</a:t>
             </a:fld>
             <a:endParaRPr lang="en-US"/>
           </a:p>
@@ -1434,7 +1435,7 @@
           <a:p>
             <a:fld id="{B2497495-0637-405E-AE64-5CC7506D51F5}" type="datetime1">
               <a:rPr lang="en-US" smtClean="0"/>
-              <a:t>1/13/23</a:t>
+              <a:t>1/18/23</a:t>
             </a:fld>
             <a:endParaRPr lang="en-US"/>
           </a:p>
@@ -1687,7 +1688,7 @@
           <a:p>
             <a:fld id="{7BFFD690-9426-415D-8B65-26881E07B2D4}" type="datetime1">
               <a:rPr lang="en-US" smtClean="0"/>
-              <a:t>1/13/23</a:t>
+              <a:t>1/18/23</a:t>
             </a:fld>
             <a:endParaRPr lang="en-US"/>
           </a:p>
@@ -2109,7 +2110,7 @@
           <a:p>
             <a:fld id="{04C4989A-474C-40DE-95B9-011C28B71673}" type="datetime1">
               <a:rPr lang="en-US" smtClean="0"/>
-              <a:t>1/13/23</a:t>
+              <a:t>1/18/23</a:t>
             </a:fld>
             <a:endParaRPr lang="en-US"/>
           </a:p>
@@ -2232,7 +2233,7 @@
           <a:p>
             <a:fld id="{5DB4ED54-5B5E-4A04-93D3-5772E3CE3818}" type="datetime1">
               <a:rPr lang="en-US" smtClean="0"/>
-              <a:t>1/13/23</a:t>
+              <a:t>1/18/23</a:t>
             </a:fld>
             <a:endParaRPr lang="en-US"/>
           </a:p>
@@ -2327,7 +2328,7 @@
           <a:p>
             <a:fld id="{4EDE50D6-574B-40AF-946F-D52A04ADE379}" type="datetime1">
               <a:rPr lang="en-US" smtClean="0"/>
-              <a:t>1/13/23</a:t>
+              <a:t>1/18/23</a:t>
             </a:fld>
             <a:endParaRPr lang="en-US"/>
           </a:p>
@@ -2704,7 +2705,7 @@
           <a:p>
             <a:fld id="{D82884F1-FFEA-405F-9602-3DCA865EDA4E}" type="datetime1">
               <a:rPr lang="en-US" smtClean="0"/>
-              <a:t>1/13/23</a:t>
+              <a:t>1/18/23</a:t>
             </a:fld>
             <a:endParaRPr lang="en-US"/>
           </a:p>
@@ -2996,7 +2997,7 @@
           <a:p>
             <a:fld id="{7E18DB4A-8810-4A10-AD5C-D5E2C667F5B3}" type="datetime1">
               <a:rPr lang="en-US" smtClean="0"/>
-              <a:t>1/13/23</a:t>
+              <a:t>1/18/23</a:t>
             </a:fld>
             <a:endParaRPr lang="en-US"/>
           </a:p>
@@ -3211,7 +3212,7 @@
           <a:p>
             <a:fld id="{ED291B17-9318-49DB-B28B-6E5994AE9581}" type="datetime1">
               <a:rPr lang="en-US" smtClean="0"/>
-              <a:t>1/13/23</a:t>
+              <a:t>1/18/23</a:t>
             </a:fld>
             <a:endParaRPr lang="en-US"/>
           </a:p>
@@ -4455,6 +4456,536 @@
           <a:chExt cx="0" cy="0"/>
         </a:xfrm>
       </p:grpSpPr>
+      <p:sp>
+        <p:nvSpPr>
+          <p:cNvPr id="10" name="Rectangle 9">
+            <a:extLst>
+              <a:ext uri="{FF2B5EF4-FFF2-40B4-BE49-F238E27FC236}">
+                <a16:creationId xmlns:a16="http://schemas.microsoft.com/office/drawing/2014/main" id="{DD651B61-325E-4E73-8445-38B0DE8AAAB6}"/>
+              </a:ext>
+              <a:ext uri="{C183D7F6-B498-43B3-948B-1728B52AA6E4}">
+                <adec:decorative xmlns:adec="http://schemas.microsoft.com/office/drawing/2017/decorative" val="1"/>
+              </a:ext>
+            </a:extLst>
+          </p:cNvPr>
+          <p:cNvSpPr>
+            <a:spLocks noGrp="1" noRot="1" noChangeAspect="1" noMove="1" noResize="1" noEditPoints="1" noAdjustHandles="1" noChangeArrowheads="1" noChangeShapeType="1" noTextEdit="1"/>
+          </p:cNvSpPr>
+          <p:nvPr>
+            <p:extLst>
+              <p:ext uri="{386F3935-93C4-4BCD-93E2-E3B085C9AB24}">
+                <p16:designElem xmlns:p16="http://schemas.microsoft.com/office/powerpoint/2015/main" val="1"/>
+              </p:ext>
+            </p:extLst>
+          </p:nvPr>
+        </p:nvSpPr>
+        <p:spPr>
+          <a:xfrm>
+            <a:off x="446534" y="457200"/>
+            <a:ext cx="3703320" cy="94997"/>
+          </a:xfrm>
+          <a:prstGeom prst="rect">
+            <a:avLst/>
+          </a:prstGeom>
+          <a:solidFill>
+            <a:srgbClr val="465359"/>
+          </a:solidFill>
+          <a:ln>
+            <a:noFill/>
+          </a:ln>
+          <a:effectLst/>
+        </p:spPr>
+        <p:style>
+          <a:lnRef idx="1">
+            <a:schemeClr val="accent1"/>
+          </a:lnRef>
+          <a:fillRef idx="3">
+            <a:schemeClr val="accent1"/>
+          </a:fillRef>
+          <a:effectRef idx="2">
+            <a:schemeClr val="accent1"/>
+          </a:effectRef>
+          <a:fontRef idx="minor">
+            <a:schemeClr val="lt1"/>
+          </a:fontRef>
+        </p:style>
+      </p:sp>
+      <p:sp>
+        <p:nvSpPr>
+          <p:cNvPr id="12" name="Rectangle 11">
+            <a:extLst>
+              <a:ext uri="{FF2B5EF4-FFF2-40B4-BE49-F238E27FC236}">
+                <a16:creationId xmlns:a16="http://schemas.microsoft.com/office/drawing/2014/main" id="{B42E5253-D3AC-4AC2-B766-8B34F13C2F5E}"/>
+              </a:ext>
+              <a:ext uri="{C183D7F6-B498-43B3-948B-1728B52AA6E4}">
+                <adec:decorative xmlns:adec="http://schemas.microsoft.com/office/drawing/2017/decorative" val="1"/>
+              </a:ext>
+            </a:extLst>
+          </p:cNvPr>
+          <p:cNvSpPr>
+            <a:spLocks noGrp="1" noRot="1" noChangeAspect="1" noMove="1" noResize="1" noEditPoints="1" noAdjustHandles="1" noChangeArrowheads="1" noChangeShapeType="1" noTextEdit="1"/>
+          </p:cNvSpPr>
+          <p:nvPr>
+            <p:extLst>
+              <p:ext uri="{386F3935-93C4-4BCD-93E2-E3B085C9AB24}">
+                <p16:designElem xmlns:p16="http://schemas.microsoft.com/office/powerpoint/2015/main" val="1"/>
+              </p:ext>
+            </p:extLst>
+          </p:nvPr>
+        </p:nvSpPr>
+        <p:spPr>
+          <a:xfrm>
+            <a:off x="8042147" y="453643"/>
+            <a:ext cx="3703320" cy="98554"/>
+          </a:xfrm>
+          <a:prstGeom prst="rect">
+            <a:avLst/>
+          </a:prstGeom>
+          <a:solidFill>
+            <a:srgbClr val="969FA7"/>
+          </a:solidFill>
+          <a:ln>
+            <a:noFill/>
+          </a:ln>
+          <a:effectLst/>
+        </p:spPr>
+        <p:style>
+          <a:lnRef idx="1">
+            <a:schemeClr val="accent1"/>
+          </a:lnRef>
+          <a:fillRef idx="3">
+            <a:schemeClr val="accent1"/>
+          </a:fillRef>
+          <a:effectRef idx="2">
+            <a:schemeClr val="accent1"/>
+          </a:effectRef>
+          <a:fontRef idx="minor">
+            <a:schemeClr val="lt1"/>
+          </a:fontRef>
+        </p:style>
+      </p:sp>
+      <p:sp>
+        <p:nvSpPr>
+          <p:cNvPr id="14" name="Rectangle 13">
+            <a:extLst>
+              <a:ext uri="{FF2B5EF4-FFF2-40B4-BE49-F238E27FC236}">
+                <a16:creationId xmlns:a16="http://schemas.microsoft.com/office/drawing/2014/main" id="{10AE8D57-436A-4073-9A75-15BB5949F8B4}"/>
+              </a:ext>
+              <a:ext uri="{C183D7F6-B498-43B3-948B-1728B52AA6E4}">
+                <adec:decorative xmlns:adec="http://schemas.microsoft.com/office/drawing/2017/decorative" val="1"/>
+              </a:ext>
+            </a:extLst>
+          </p:cNvPr>
+          <p:cNvSpPr>
+            <a:spLocks noGrp="1" noRot="1" noChangeAspect="1" noMove="1" noResize="1" noEditPoints="1" noAdjustHandles="1" noChangeArrowheads="1" noChangeShapeType="1" noTextEdit="1"/>
+          </p:cNvSpPr>
+          <p:nvPr>
+            <p:extLst>
+              <p:ext uri="{386F3935-93C4-4BCD-93E2-E3B085C9AB24}">
+                <p16:designElem xmlns:p16="http://schemas.microsoft.com/office/powerpoint/2015/main" val="1"/>
+              </p:ext>
+            </p:extLst>
+          </p:nvPr>
+        </p:nvSpPr>
+        <p:spPr>
+          <a:xfrm>
+            <a:off x="4241830" y="457200"/>
+            <a:ext cx="3703320" cy="91440"/>
+          </a:xfrm>
+          <a:prstGeom prst="rect">
+            <a:avLst/>
+          </a:prstGeom>
+          <a:solidFill>
+            <a:schemeClr val="accent1"/>
+          </a:solidFill>
+          <a:ln>
+            <a:noFill/>
+          </a:ln>
+          <a:effectLst/>
+        </p:spPr>
+        <p:style>
+          <a:lnRef idx="1">
+            <a:schemeClr val="accent1"/>
+          </a:lnRef>
+          <a:fillRef idx="3">
+            <a:schemeClr val="accent1"/>
+          </a:fillRef>
+          <a:effectRef idx="2">
+            <a:schemeClr val="accent1"/>
+          </a:effectRef>
+          <a:fontRef idx="minor">
+            <a:schemeClr val="lt1"/>
+          </a:fontRef>
+        </p:style>
+      </p:sp>
+      <p:sp>
+        <p:nvSpPr>
+          <p:cNvPr id="16" name="Rectangle 15">
+            <a:extLst>
+              <a:ext uri="{FF2B5EF4-FFF2-40B4-BE49-F238E27FC236}">
+                <a16:creationId xmlns:a16="http://schemas.microsoft.com/office/drawing/2014/main" id="{E2852671-8EB6-4EAF-8AF8-65CF3FD66456}"/>
+              </a:ext>
+              <a:ext uri="{C183D7F6-B498-43B3-948B-1728B52AA6E4}">
+                <adec:decorative xmlns:adec="http://schemas.microsoft.com/office/drawing/2017/decorative" val="1"/>
+              </a:ext>
+            </a:extLst>
+          </p:cNvPr>
+          <p:cNvSpPr>
+            <a:spLocks noGrp="1" noRot="1" noChangeAspect="1" noMove="1" noResize="1" noEditPoints="1" noAdjustHandles="1" noChangeArrowheads="1" noChangeShapeType="1" noTextEdit="1"/>
+          </p:cNvSpPr>
+          <p:nvPr>
+            <p:extLst>
+              <p:ext uri="{386F3935-93C4-4BCD-93E2-E3B085C9AB24}">
+                <p16:designElem xmlns:p16="http://schemas.microsoft.com/office/powerpoint/2015/main" val="1"/>
+              </p:ext>
+            </p:extLst>
+          </p:nvPr>
+        </p:nvSpPr>
+        <p:spPr>
+          <a:xfrm>
+            <a:off x="446534" y="3085764"/>
+            <a:ext cx="11298932" cy="3338149"/>
+          </a:xfrm>
+          <a:prstGeom prst="rect">
+            <a:avLst/>
+          </a:prstGeom>
+          <a:solidFill>
+            <a:srgbClr val="465359"/>
+          </a:solidFill>
+          <a:ln>
+            <a:noFill/>
+          </a:ln>
+          <a:effectLst/>
+        </p:spPr>
+        <p:style>
+          <a:lnRef idx="1">
+            <a:schemeClr val="accent1"/>
+          </a:lnRef>
+          <a:fillRef idx="3">
+            <a:schemeClr val="accent1"/>
+          </a:fillRef>
+          <a:effectRef idx="2">
+            <a:schemeClr val="accent1"/>
+          </a:effectRef>
+          <a:fontRef idx="minor">
+            <a:schemeClr val="lt1"/>
+          </a:fontRef>
+        </p:style>
+      </p:sp>
+      <p:sp useBgFill="1">
+        <p:nvSpPr>
+          <p:cNvPr id="18" name="Rectangle 17">
+            <a:extLst>
+              <a:ext uri="{FF2B5EF4-FFF2-40B4-BE49-F238E27FC236}">
+                <a16:creationId xmlns:a16="http://schemas.microsoft.com/office/drawing/2014/main" id="{26B4480E-B7FF-4481-890E-043A69AE6FE2}"/>
+              </a:ext>
+              <a:ext uri="{C183D7F6-B498-43B3-948B-1728B52AA6E4}">
+                <adec:decorative xmlns:adec="http://schemas.microsoft.com/office/drawing/2017/decorative" val="1"/>
+              </a:ext>
+            </a:extLst>
+          </p:cNvPr>
+          <p:cNvSpPr>
+            <a:spLocks noGrp="1" noRot="1" noChangeAspect="1" noMove="1" noResize="1" noEditPoints="1" noAdjustHandles="1" noChangeArrowheads="1" noChangeShapeType="1" noTextEdit="1"/>
+          </p:cNvSpPr>
+          <p:nvPr>
+            <p:extLst>
+              <p:ext uri="{386F3935-93C4-4BCD-93E2-E3B085C9AB24}">
+                <p16:designElem xmlns:p16="http://schemas.microsoft.com/office/powerpoint/2015/main" val="1"/>
+              </p:ext>
+            </p:extLst>
+          </p:nvPr>
+        </p:nvSpPr>
+        <p:spPr>
+          <a:xfrm>
+            <a:off x="0" y="0"/>
+            <a:ext cx="12192000" cy="6858000"/>
+          </a:xfrm>
+          <a:prstGeom prst="rect">
+            <a:avLst/>
+          </a:prstGeom>
+          <a:ln>
+            <a:noFill/>
+          </a:ln>
+        </p:spPr>
+        <p:style>
+          <a:lnRef idx="2">
+            <a:schemeClr val="accent1">
+              <a:shade val="50000"/>
+            </a:schemeClr>
+          </a:lnRef>
+          <a:fillRef idx="1">
+            <a:schemeClr val="accent1"/>
+          </a:fillRef>
+          <a:effectRef idx="0">
+            <a:schemeClr val="accent1"/>
+          </a:effectRef>
+          <a:fontRef idx="minor">
+            <a:schemeClr val="lt1"/>
+          </a:fontRef>
+        </p:style>
+        <p:txBody>
+          <a:bodyPr rtlCol="0" anchor="ctr"/>
+          <a:lstStyle/>
+          <a:p>
+            <a:pPr algn="ctr"/>
+            <a:endParaRPr lang="en-US"/>
+          </a:p>
+        </p:txBody>
+      </p:sp>
+      <p:grpSp>
+        <p:nvGrpSpPr>
+          <p:cNvPr id="20" name="Group 19">
+            <a:extLst>
+              <a:ext uri="{FF2B5EF4-FFF2-40B4-BE49-F238E27FC236}">
+                <a16:creationId xmlns:a16="http://schemas.microsoft.com/office/drawing/2014/main" id="{79394E1F-0B5F-497D-B2A6-8383A2A54834}"/>
+              </a:ext>
+              <a:ext uri="{C183D7F6-B498-43B3-948B-1728B52AA6E4}">
+                <adec:decorative xmlns:adec="http://schemas.microsoft.com/office/drawing/2017/decorative" val="1"/>
+              </a:ext>
+            </a:extLst>
+          </p:cNvPr>
+          <p:cNvGrpSpPr>
+            <a:grpSpLocks noGrp="1" noUngrp="1" noRot="1" noChangeAspect="1" noMove="1" noResize="1"/>
+          </p:cNvGrpSpPr>
+          <p:nvPr>
+            <p:extLst>
+              <p:ext uri="{386F3935-93C4-4BCD-93E2-E3B085C9AB24}">
+                <p16:designElem xmlns:p16="http://schemas.microsoft.com/office/powerpoint/2015/main" val="1"/>
+              </p:ext>
+            </p:extLst>
+          </p:nvPr>
+        </p:nvGrpSpPr>
+        <p:grpSpPr>
+          <a:xfrm>
+            <a:off x="438068" y="457200"/>
+            <a:ext cx="3703320" cy="5935133"/>
+            <a:chOff x="438068" y="457200"/>
+            <a:chExt cx="3703320" cy="5935133"/>
+          </a:xfrm>
+        </p:grpSpPr>
+        <p:sp>
+          <p:nvSpPr>
+            <p:cNvPr id="21" name="Rectangle 20">
+              <a:extLst>
+                <a:ext uri="{FF2B5EF4-FFF2-40B4-BE49-F238E27FC236}">
+                  <a16:creationId xmlns:a16="http://schemas.microsoft.com/office/drawing/2014/main" id="{1F1FF39A-AC3C-4066-9D4C-519AA22812EA}"/>
+                </a:ext>
+                <a:ext uri="{C183D7F6-B498-43B3-948B-1728B52AA6E4}">
+                  <adec:decorative xmlns:adec="http://schemas.microsoft.com/office/drawing/2017/decorative" val="1"/>
+                </a:ext>
+              </a:extLst>
+            </p:cNvPr>
+            <p:cNvSpPr/>
+            <p:nvPr>
+              <p:extLst>
+                <p:ext uri="{386F3935-93C4-4BCD-93E2-E3B085C9AB24}">
+                  <p16:designElem xmlns:p16="http://schemas.microsoft.com/office/powerpoint/2015/main" val="1"/>
+                </p:ext>
+              </p:extLst>
+            </p:nvPr>
+          </p:nvSpPr>
+          <p:spPr>
+            <a:xfrm>
+              <a:off x="438068" y="601201"/>
+              <a:ext cx="3702134" cy="5791132"/>
+            </a:xfrm>
+            <a:prstGeom prst="rect">
+              <a:avLst/>
+            </a:prstGeom>
+            <a:solidFill>
+              <a:srgbClr val="465359">
+                <a:alpha val="97000"/>
+              </a:srgbClr>
+            </a:solidFill>
+            <a:ln w="6350" cmpd="sng">
+              <a:noFill/>
+            </a:ln>
+            <a:effectLst/>
+          </p:spPr>
+          <p:style>
+            <a:lnRef idx="1">
+              <a:schemeClr val="accent1"/>
+            </a:lnRef>
+            <a:fillRef idx="3">
+              <a:schemeClr val="accent1"/>
+            </a:fillRef>
+            <a:effectRef idx="2">
+              <a:schemeClr val="accent1"/>
+            </a:effectRef>
+            <a:fontRef idx="minor">
+              <a:schemeClr val="lt1"/>
+            </a:fontRef>
+          </p:style>
+        </p:sp>
+        <p:sp>
+          <p:nvSpPr>
+            <p:cNvPr id="22" name="Rectangle 21">
+              <a:extLst>
+                <a:ext uri="{FF2B5EF4-FFF2-40B4-BE49-F238E27FC236}">
+                  <a16:creationId xmlns:a16="http://schemas.microsoft.com/office/drawing/2014/main" id="{64C13BAB-7C00-4D21-A857-E3D41C0A2A66}"/>
+                </a:ext>
+                <a:ext uri="{C183D7F6-B498-43B3-948B-1728B52AA6E4}">
+                  <adec:decorative xmlns:adec="http://schemas.microsoft.com/office/drawing/2017/decorative" val="1"/>
+                </a:ext>
+              </a:extLst>
+            </p:cNvPr>
+            <p:cNvSpPr/>
+            <p:nvPr>
+              <p:extLst>
+                <p:ext uri="{386F3935-93C4-4BCD-93E2-E3B085C9AB24}">
+                  <p16:designElem xmlns:p16="http://schemas.microsoft.com/office/powerpoint/2015/main" val="1"/>
+                </p:ext>
+              </p:extLst>
+            </p:nvPr>
+          </p:nvSpPr>
+          <p:spPr>
+            <a:xfrm>
+              <a:off x="438068" y="457200"/>
+              <a:ext cx="3703320" cy="94997"/>
+            </a:xfrm>
+            <a:prstGeom prst="rect">
+              <a:avLst/>
+            </a:prstGeom>
+            <a:solidFill>
+              <a:srgbClr val="465359"/>
+            </a:solidFill>
+            <a:ln>
+              <a:noFill/>
+            </a:ln>
+            <a:effectLst/>
+          </p:spPr>
+          <p:style>
+            <a:lnRef idx="1">
+              <a:schemeClr val="accent1"/>
+            </a:lnRef>
+            <a:fillRef idx="3">
+              <a:schemeClr val="accent1"/>
+            </a:fillRef>
+            <a:effectRef idx="2">
+              <a:schemeClr val="accent1"/>
+            </a:effectRef>
+            <a:fontRef idx="minor">
+              <a:schemeClr val="lt1"/>
+            </a:fontRef>
+          </p:style>
+        </p:sp>
+      </p:grpSp>
+      <p:sp>
+        <p:nvSpPr>
+          <p:cNvPr id="2" name="Titre 1">
+            <a:extLst>
+              <a:ext uri="{FF2B5EF4-FFF2-40B4-BE49-F238E27FC236}">
+                <a16:creationId xmlns:a16="http://schemas.microsoft.com/office/drawing/2014/main" id="{4B3BEAB0-CD94-5B01-DA9F-080E5EF51460}"/>
+              </a:ext>
+            </a:extLst>
+          </p:cNvPr>
+          <p:cNvSpPr>
+            <a:spLocks noGrp="1"/>
+          </p:cNvSpPr>
+          <p:nvPr>
+            <p:ph type="title"/>
+          </p:nvPr>
+        </p:nvSpPr>
+        <p:spPr>
+          <a:xfrm>
+            <a:off x="584200" y="1524001"/>
+            <a:ext cx="3412067" cy="3478384"/>
+          </a:xfrm>
+        </p:spPr>
+        <p:txBody>
+          <a:bodyPr vert="horz" lIns="91440" tIns="45720" rIns="91440" bIns="45720" rtlCol="0" anchor="b">
+            <a:normAutofit/>
+          </a:bodyPr>
+          <a:lstStyle/>
+          <a:p>
+            <a:r>
+              <a:rPr lang="en-US">
+                <a:solidFill>
+                  <a:srgbClr val="FFFFFF"/>
+                </a:solidFill>
+              </a:rPr>
+              <a:t>Démonstration de l’application</a:t>
+            </a:r>
+          </a:p>
+        </p:txBody>
+      </p:sp>
+      <p:pic>
+        <p:nvPicPr>
+          <p:cNvPr id="7" name="Graphic 6" descr="Enseignant">
+            <a:extLst>
+              <a:ext uri="{FF2B5EF4-FFF2-40B4-BE49-F238E27FC236}">
+                <a16:creationId xmlns:a16="http://schemas.microsoft.com/office/drawing/2014/main" id="{778700BB-3F2B-1467-9A53-CA789CBD6E96}"/>
+              </a:ext>
+            </a:extLst>
+          </p:cNvPr>
+          <p:cNvPicPr>
+            <a:picLocks noChangeAspect="1"/>
+          </p:cNvPicPr>
+          <p:nvPr/>
+        </p:nvPicPr>
+        <p:blipFill>
+          <a:blip r:embed="rId2">
+            <a:extLst>
+              <a:ext uri="{28A0092B-C50C-407E-A947-70E740481C1C}">
+                <a14:useLocalDpi xmlns:a14="http://schemas.microsoft.com/office/drawing/2010/main" val="0"/>
+              </a:ext>
+              <a:ext uri="{96DAC541-7B7A-43D3-8B79-37D633B846F1}">
+                <asvg:svgBlip xmlns:asvg="http://schemas.microsoft.com/office/drawing/2016/SVG/main" r:embed="rId3"/>
+              </a:ext>
+            </a:extLst>
+          </a:blip>
+          <a:stretch>
+            <a:fillRect/>
+          </a:stretch>
+        </p:blipFill>
+        <p:spPr>
+          <a:xfrm>
+            <a:off x="5348406" y="618067"/>
+            <a:ext cx="5598157" cy="5598157"/>
+          </a:xfrm>
+          <a:prstGeom prst="rect">
+            <a:avLst/>
+          </a:prstGeom>
+        </p:spPr>
+      </p:pic>
+    </p:spTree>
+    <p:extLst>
+      <p:ext uri="{BB962C8B-B14F-4D97-AF65-F5344CB8AC3E}">
+        <p14:creationId xmlns:p14="http://schemas.microsoft.com/office/powerpoint/2010/main" val="1767854227"/>
+      </p:ext>
+    </p:extLst>
+  </p:cSld>
+  <p:clrMapOvr>
+    <a:masterClrMapping/>
+  </p:clrMapOvr>
+</p:sld>
+</file>
+
+<file path=ppt/slides/slide11.xml><?xml version="1.0" encoding="utf-8"?>
+<p:sld xmlns:a="http://schemas.openxmlformats.org/drawingml/2006/main" xmlns:r="http://schemas.openxmlformats.org/officeDocument/2006/relationships" xmlns:p="http://schemas.openxmlformats.org/presentationml/2006/main">
+  <p:cSld>
+    <p:bg>
+      <p:bgPr>
+        <a:solidFill>
+          <a:schemeClr val="bg1"/>
+        </a:solidFill>
+        <a:effectLst/>
+      </p:bgPr>
+    </p:bg>
+    <p:spTree>
+      <p:nvGrpSpPr>
+        <p:cNvPr id="1" name=""/>
+        <p:cNvGrpSpPr/>
+        <p:nvPr/>
+      </p:nvGrpSpPr>
+      <p:grpSpPr>
+        <a:xfrm>
+          <a:off x="0" y="0"/>
+          <a:ext cx="0" cy="0"/>
+          <a:chOff x="0" y="0"/>
+          <a:chExt cx="0" cy="0"/>
+        </a:xfrm>
+      </p:grpSpPr>
       <p:sp useBgFill="1">
         <p:nvSpPr>
           <p:cNvPr id="9" name="Rectangle 8">
@@ -4978,53 +5509,59 @@
           <a:lstStyle/>
           <a:p>
             <a:r>
-              <a:rPr lang="fr-FR" sz="2000"/>
+              <a:rPr lang="fr-FR" sz="2000" dirty="0"/>
               <a:t>Contexte</a:t>
             </a:r>
           </a:p>
           <a:p>
             <a:r>
-              <a:rPr lang="fr-FR" sz="2000"/>
+              <a:rPr lang="fr-FR" sz="2000" dirty="0"/>
               <a:t>Structure MVC</a:t>
             </a:r>
           </a:p>
           <a:p>
             <a:pPr lvl="1"/>
             <a:r>
-              <a:rPr lang="fr-FR" sz="1800" err="1"/>
+              <a:rPr lang="fr-FR" sz="1800" dirty="0" err="1"/>
               <a:t>View</a:t>
             </a:r>
-            <a:endParaRPr lang="fr-FR" sz="1800"/>
+            <a:endParaRPr lang="fr-FR" sz="1800" dirty="0"/>
           </a:p>
           <a:p>
             <a:pPr lvl="1"/>
             <a:r>
-              <a:rPr lang="fr-FR" sz="1800"/>
+              <a:rPr lang="fr-FR" sz="1800" dirty="0"/>
               <a:t>Model</a:t>
             </a:r>
           </a:p>
           <a:p>
             <a:pPr lvl="1"/>
             <a:r>
-              <a:rPr lang="fr-FR" sz="1800"/>
+              <a:rPr lang="fr-FR" sz="1800" dirty="0"/>
               <a:t>Controller</a:t>
             </a:r>
           </a:p>
           <a:p>
             <a:r>
-              <a:rPr lang="fr-FR" sz="2000"/>
-              <a:t>Communications entre MVC</a:t>
-            </a:r>
-          </a:p>
-          <a:p>
-            <a:r>
-              <a:rPr lang="fr-FR" sz="2000"/>
+              <a:rPr lang="fr-FR" sz="2000" dirty="0"/>
+              <a:t>MVC Principaux</a:t>
+            </a:r>
+          </a:p>
+          <a:p>
+            <a:r>
+              <a:rPr lang="fr-FR" sz="2000" dirty="0"/>
+              <a:t>MVC Secondaires</a:t>
+            </a:r>
+          </a:p>
+          <a:p>
+            <a:r>
+              <a:rPr lang="fr-FR" sz="2000" dirty="0"/>
               <a:t>Démonstration de l’application</a:t>
             </a:r>
           </a:p>
           <a:p>
             <a:r>
-              <a:rPr lang="fr-FR" sz="2000"/>
+              <a:rPr lang="fr-FR" sz="2000" dirty="0"/>
               <a:t>Conclusion</a:t>
             </a:r>
           </a:p>
@@ -5841,10 +6378,10 @@
       </p:sp>
       <p:pic>
         <p:nvPicPr>
-          <p:cNvPr id="6" name="Image 5">
+          <p:cNvPr id="5" name="Image 4">
             <a:extLst>
               <a:ext uri="{FF2B5EF4-FFF2-40B4-BE49-F238E27FC236}">
-                <a16:creationId xmlns:a16="http://schemas.microsoft.com/office/drawing/2014/main" id="{015C4EDA-E3B6-B199-E419-1248E26146A6}"/>
+                <a16:creationId xmlns:a16="http://schemas.microsoft.com/office/drawing/2014/main" id="{D1A2EEE5-C623-BDFD-1A34-7A2BDDD4EBE8}"/>
               </a:ext>
             </a:extLst>
           </p:cNvPr>
@@ -5867,20 +6404,125 @@
         </p:blipFill>
         <p:spPr>
           <a:xfrm>
-            <a:off x="9079348" y="737763"/>
-            <a:ext cx="1636949" cy="3539352"/>
+            <a:off x="5275015" y="737763"/>
+            <a:ext cx="1636949" cy="3539353"/>
           </a:xfrm>
           <a:prstGeom prst="rect">
             <a:avLst/>
           </a:prstGeom>
         </p:spPr>
       </p:pic>
+      <p:sp>
+        <p:nvSpPr>
+          <p:cNvPr id="7" name="ZoneTexte 6">
+            <a:extLst>
+              <a:ext uri="{FF2B5EF4-FFF2-40B4-BE49-F238E27FC236}">
+                <a16:creationId xmlns:a16="http://schemas.microsoft.com/office/drawing/2014/main" id="{5A7240BB-297A-9053-4774-F0B5600A2108}"/>
+              </a:ext>
+            </a:extLst>
+          </p:cNvPr>
+          <p:cNvSpPr txBox="1"/>
+          <p:nvPr/>
+        </p:nvSpPr>
+        <p:spPr>
+          <a:xfrm>
+            <a:off x="1485303" y="4579093"/>
+            <a:ext cx="1617751" cy="369332"/>
+          </a:xfrm>
+          <a:prstGeom prst="rect">
+            <a:avLst/>
+          </a:prstGeom>
+          <a:noFill/>
+        </p:spPr>
+        <p:txBody>
+          <a:bodyPr wrap="none" rtlCol="0">
+            <a:spAutoFit/>
+          </a:bodyPr>
+          <a:lstStyle/>
+          <a:p>
+            <a:r>
+              <a:rPr lang="fr-FR"/>
+              <a:t>Taux de change</a:t>
+            </a:r>
+          </a:p>
+        </p:txBody>
+      </p:sp>
+      <p:sp>
+        <p:nvSpPr>
+          <p:cNvPr id="8" name="ZoneTexte 7">
+            <a:extLst>
+              <a:ext uri="{FF2B5EF4-FFF2-40B4-BE49-F238E27FC236}">
+                <a16:creationId xmlns:a16="http://schemas.microsoft.com/office/drawing/2014/main" id="{3D607210-48D2-7024-0286-9AD8F99E0376}"/>
+              </a:ext>
+            </a:extLst>
+          </p:cNvPr>
+          <p:cNvSpPr txBox="1"/>
+          <p:nvPr/>
+        </p:nvSpPr>
+        <p:spPr>
+          <a:xfrm>
+            <a:off x="5499416" y="4574369"/>
+            <a:ext cx="1188146" cy="369332"/>
+          </a:xfrm>
+          <a:prstGeom prst="rect">
+            <a:avLst/>
+          </a:prstGeom>
+          <a:noFill/>
+        </p:spPr>
+        <p:txBody>
+          <a:bodyPr wrap="none" rtlCol="0">
+            <a:spAutoFit/>
+          </a:bodyPr>
+          <a:lstStyle/>
+          <a:p>
+            <a:r>
+              <a:rPr lang="fr-FR"/>
+              <a:t>Traduction</a:t>
+            </a:r>
+          </a:p>
+        </p:txBody>
+      </p:sp>
+      <p:sp>
+        <p:nvSpPr>
+          <p:cNvPr id="9" name="ZoneTexte 8">
+            <a:extLst>
+              <a:ext uri="{FF2B5EF4-FFF2-40B4-BE49-F238E27FC236}">
+                <a16:creationId xmlns:a16="http://schemas.microsoft.com/office/drawing/2014/main" id="{226FB120-1349-42C1-259D-F946CCE05ECE}"/>
+              </a:ext>
+            </a:extLst>
+          </p:cNvPr>
+          <p:cNvSpPr txBox="1"/>
+          <p:nvPr/>
+        </p:nvSpPr>
+        <p:spPr>
+          <a:xfrm>
+            <a:off x="9499307" y="4574369"/>
+            <a:ext cx="788999" cy="369332"/>
+          </a:xfrm>
+          <a:prstGeom prst="rect">
+            <a:avLst/>
+          </a:prstGeom>
+          <a:noFill/>
+        </p:spPr>
+        <p:txBody>
+          <a:bodyPr wrap="none" rtlCol="0">
+            <a:spAutoFit/>
+          </a:bodyPr>
+          <a:lstStyle/>
+          <a:p>
+            <a:r>
+              <a:rPr lang="fr-FR"/>
+              <a:t>Météo</a:t>
+            </a:r>
+          </a:p>
+        </p:txBody>
+      </p:sp>
       <p:pic>
         <p:nvPicPr>
-          <p:cNvPr id="5" name="Image 4">
+          <p:cNvPr id="16" name="Image 15" descr="Une image contenant texte&#10;&#10;Description générée automatiquement">
             <a:extLst>
               <a:ext uri="{FF2B5EF4-FFF2-40B4-BE49-F238E27FC236}">
-                <a16:creationId xmlns:a16="http://schemas.microsoft.com/office/drawing/2014/main" id="{D1A2EEE5-C623-BDFD-1A34-7A2BDDD4EBE8}"/>
+                <a16:creationId xmlns:a16="http://schemas.microsoft.com/office/drawing/2014/main" id="{8A06426A-06BA-0497-CA06-4FD26DBF1ADB}"/>
               </a:ext>
             </a:extLst>
           </p:cNvPr>
@@ -5890,7 +6532,7 @@
           <p:nvPr/>
         </p:nvPicPr>
         <p:blipFill>
-          <a:blip r:embed="rId3" cstate="print">
+          <a:blip r:embed="rId3">
             <a:extLst>
               <a:ext uri="{28A0092B-C50C-407E-A947-70E740481C1C}">
                 <a14:useLocalDpi xmlns:a14="http://schemas.microsoft.com/office/drawing/2010/main" val="0"/>
@@ -5903,125 +6545,20 @@
         </p:blipFill>
         <p:spPr>
           <a:xfrm>
-            <a:off x="5275015" y="737763"/>
-            <a:ext cx="1636949" cy="3539353"/>
+            <a:off x="4650846" y="5379046"/>
+            <a:ext cx="2885285" cy="835547"/>
           </a:xfrm>
           <a:prstGeom prst="rect">
             <a:avLst/>
           </a:prstGeom>
         </p:spPr>
       </p:pic>
-      <p:sp>
-        <p:nvSpPr>
-          <p:cNvPr id="7" name="ZoneTexte 6">
-            <a:extLst>
-              <a:ext uri="{FF2B5EF4-FFF2-40B4-BE49-F238E27FC236}">
-                <a16:creationId xmlns:a16="http://schemas.microsoft.com/office/drawing/2014/main" id="{5A7240BB-297A-9053-4774-F0B5600A2108}"/>
-              </a:ext>
-            </a:extLst>
-          </p:cNvPr>
-          <p:cNvSpPr txBox="1"/>
-          <p:nvPr/>
-        </p:nvSpPr>
-        <p:spPr>
-          <a:xfrm>
-            <a:off x="1485303" y="4579093"/>
-            <a:ext cx="1617751" cy="369332"/>
-          </a:xfrm>
-          <a:prstGeom prst="rect">
-            <a:avLst/>
-          </a:prstGeom>
-          <a:noFill/>
-        </p:spPr>
-        <p:txBody>
-          <a:bodyPr wrap="none" rtlCol="0">
-            <a:spAutoFit/>
-          </a:bodyPr>
-          <a:lstStyle/>
-          <a:p>
-            <a:r>
-              <a:rPr lang="fr-FR"/>
-              <a:t>Taux de change</a:t>
-            </a:r>
-          </a:p>
-        </p:txBody>
-      </p:sp>
-      <p:sp>
-        <p:nvSpPr>
-          <p:cNvPr id="8" name="ZoneTexte 7">
-            <a:extLst>
-              <a:ext uri="{FF2B5EF4-FFF2-40B4-BE49-F238E27FC236}">
-                <a16:creationId xmlns:a16="http://schemas.microsoft.com/office/drawing/2014/main" id="{3D607210-48D2-7024-0286-9AD8F99E0376}"/>
-              </a:ext>
-            </a:extLst>
-          </p:cNvPr>
-          <p:cNvSpPr txBox="1"/>
-          <p:nvPr/>
-        </p:nvSpPr>
-        <p:spPr>
-          <a:xfrm>
-            <a:off x="5499416" y="4574369"/>
-            <a:ext cx="1188146" cy="369332"/>
-          </a:xfrm>
-          <a:prstGeom prst="rect">
-            <a:avLst/>
-          </a:prstGeom>
-          <a:noFill/>
-        </p:spPr>
-        <p:txBody>
-          <a:bodyPr wrap="none" rtlCol="0">
-            <a:spAutoFit/>
-          </a:bodyPr>
-          <a:lstStyle/>
-          <a:p>
-            <a:r>
-              <a:rPr lang="fr-FR"/>
-              <a:t>Traduction</a:t>
-            </a:r>
-          </a:p>
-        </p:txBody>
-      </p:sp>
-      <p:sp>
-        <p:nvSpPr>
-          <p:cNvPr id="9" name="ZoneTexte 8">
-            <a:extLst>
-              <a:ext uri="{FF2B5EF4-FFF2-40B4-BE49-F238E27FC236}">
-                <a16:creationId xmlns:a16="http://schemas.microsoft.com/office/drawing/2014/main" id="{226FB120-1349-42C1-259D-F946CCE05ECE}"/>
-              </a:ext>
-            </a:extLst>
-          </p:cNvPr>
-          <p:cNvSpPr txBox="1"/>
-          <p:nvPr/>
-        </p:nvSpPr>
-        <p:spPr>
-          <a:xfrm>
-            <a:off x="9499307" y="4574369"/>
-            <a:ext cx="788999" cy="369332"/>
-          </a:xfrm>
-          <a:prstGeom prst="rect">
-            <a:avLst/>
-          </a:prstGeom>
-          <a:noFill/>
-        </p:spPr>
-        <p:txBody>
-          <a:bodyPr wrap="none" rtlCol="0">
-            <a:spAutoFit/>
-          </a:bodyPr>
-          <a:lstStyle/>
-          <a:p>
-            <a:r>
-              <a:rPr lang="fr-FR"/>
-              <a:t>Météo</a:t>
-            </a:r>
-          </a:p>
-        </p:txBody>
-      </p:sp>
       <p:pic>
         <p:nvPicPr>
-          <p:cNvPr id="16" name="Image 15" descr="Une image contenant texte&#10;&#10;Description générée automatiquement">
+          <p:cNvPr id="10" name="Image 9">
             <a:extLst>
               <a:ext uri="{FF2B5EF4-FFF2-40B4-BE49-F238E27FC236}">
-                <a16:creationId xmlns:a16="http://schemas.microsoft.com/office/drawing/2014/main" id="{8A06426A-06BA-0497-CA06-4FD26DBF1ADB}"/>
+                <a16:creationId xmlns:a16="http://schemas.microsoft.com/office/drawing/2014/main" id="{6AB16CF5-6686-0225-6478-3DEBCE1E3AFB}"/>
               </a:ext>
             </a:extLst>
           </p:cNvPr>
@@ -6031,21 +6568,15 @@
           <p:nvPr/>
         </p:nvPicPr>
         <p:blipFill>
-          <a:blip r:embed="rId4">
-            <a:extLst>
-              <a:ext uri="{28A0092B-C50C-407E-A947-70E740481C1C}">
-                <a14:useLocalDpi xmlns:a14="http://schemas.microsoft.com/office/drawing/2010/main" val="0"/>
-              </a:ext>
-            </a:extLst>
-          </a:blip>
+          <a:blip r:embed="rId4"/>
           <a:stretch>
             <a:fillRect/>
           </a:stretch>
         </p:blipFill>
         <p:spPr>
           <a:xfrm>
-            <a:off x="4650846" y="5379046"/>
-            <a:ext cx="2885285" cy="835547"/>
+            <a:off x="1475703" y="737763"/>
+            <a:ext cx="1635227" cy="3538800"/>
           </a:xfrm>
           <a:prstGeom prst="rect">
             <a:avLst/>
@@ -6054,10 +6585,10 @@
       </p:pic>
       <p:pic>
         <p:nvPicPr>
-          <p:cNvPr id="10" name="Image 9">
+          <p:cNvPr id="4" name="Image 3" descr="Une image contenant texte&#10;&#10;Description générée automatiquement">
             <a:extLst>
               <a:ext uri="{FF2B5EF4-FFF2-40B4-BE49-F238E27FC236}">
-                <a16:creationId xmlns:a16="http://schemas.microsoft.com/office/drawing/2014/main" id="{6AB16CF5-6686-0225-6478-3DEBCE1E3AFB}"/>
+                <a16:creationId xmlns:a16="http://schemas.microsoft.com/office/drawing/2014/main" id="{24E90E6A-9273-EDE1-404E-A2CC9787703D}"/>
               </a:ext>
             </a:extLst>
           </p:cNvPr>
@@ -6074,7 +6605,7 @@
         </p:blipFill>
         <p:spPr>
           <a:xfrm>
-            <a:off x="1475703" y="737763"/>
+            <a:off x="9081070" y="737763"/>
             <a:ext cx="1635227" cy="3538800"/>
           </a:xfrm>
           <a:prstGeom prst="rect">
@@ -6101,7 +6632,7 @@
     <p:bg>
       <p:bgPr>
         <a:solidFill>
-          <a:schemeClr val="bg2"/>
+          <a:schemeClr val="bg1"/>
         </a:solidFill>
         <a:effectLst/>
       </p:bgPr>
@@ -6120,12 +6651,12 @@
           <a:chExt cx="0" cy="0"/>
         </a:xfrm>
       </p:grpSpPr>
-      <p:sp>
-        <p:nvSpPr>
-          <p:cNvPr id="17" name="Rectangle 16">
+      <p:sp useBgFill="1">
+        <p:nvSpPr>
+          <p:cNvPr id="30" name="Rectangle 29">
             <a:extLst>
               <a:ext uri="{FF2B5EF4-FFF2-40B4-BE49-F238E27FC236}">
-                <a16:creationId xmlns:a16="http://schemas.microsoft.com/office/drawing/2014/main" id="{88C97474-5879-4DB5-B4F3-F0357104BC8E}"/>
+                <a16:creationId xmlns:a16="http://schemas.microsoft.com/office/drawing/2014/main" id="{1BB56EB9-078F-4952-AC1F-149C7A0AE4D5}"/>
               </a:ext>
               <a:ext uri="{C183D7F6-B498-43B3-948B-1728B52AA6E4}">
                 <adec:decorative xmlns:adec="http://schemas.microsoft.com/office/drawing/2017/decorative" val="1"/>
@@ -6151,9 +6682,6 @@
           <a:prstGeom prst="rect">
             <a:avLst/>
           </a:prstGeom>
-          <a:solidFill>
-            <a:schemeClr val="tx1"/>
-          </a:solidFill>
           <a:ln>
             <a:noFill/>
           </a:ln>
@@ -6185,10 +6713,52 @@
       </p:sp>
       <p:sp>
         <p:nvSpPr>
-          <p:cNvPr id="19" name="Rectangle 18">
+          <p:cNvPr id="2" name="Titre 1">
             <a:extLst>
               <a:ext uri="{FF2B5EF4-FFF2-40B4-BE49-F238E27FC236}">
-                <a16:creationId xmlns:a16="http://schemas.microsoft.com/office/drawing/2014/main" id="{7D2AF00E-D433-4047-863F-BCB69CEC3C35}"/>
+                <a16:creationId xmlns:a16="http://schemas.microsoft.com/office/drawing/2014/main" id="{3AD804A7-3286-E9E8-FE11-026DBB1DC074}"/>
+              </a:ext>
+            </a:extLst>
+          </p:cNvPr>
+          <p:cNvSpPr>
+            <a:spLocks noGrp="1"/>
+          </p:cNvSpPr>
+          <p:nvPr>
+            <p:ph type="title"/>
+          </p:nvPr>
+        </p:nvSpPr>
+        <p:spPr>
+          <a:xfrm>
+            <a:off x="4382724" y="702156"/>
+            <a:ext cx="7225075" cy="1013800"/>
+          </a:xfrm>
+        </p:spPr>
+        <p:txBody>
+          <a:bodyPr vert="horz" lIns="91440" tIns="45720" rIns="91440" bIns="45720" rtlCol="0" anchor="b">
+            <a:normAutofit/>
+          </a:bodyPr>
+          <a:lstStyle/>
+          <a:p>
+            <a:r>
+              <a:rPr lang="en-US" b="0" kern="1200" cap="all">
+                <a:solidFill>
+                  <a:schemeClr val="tx2"/>
+                </a:solidFill>
+                <a:latin typeface="+mj-lt"/>
+                <a:ea typeface="+mj-ea"/>
+                <a:cs typeface="+mj-cs"/>
+              </a:rPr>
+              <a:t>Structure mvc - model</a:t>
+            </a:r>
+          </a:p>
+        </p:txBody>
+      </p:sp>
+      <p:sp>
+        <p:nvSpPr>
+          <p:cNvPr id="32" name="Rectangle 31">
+            <a:extLst>
+              <a:ext uri="{FF2B5EF4-FFF2-40B4-BE49-F238E27FC236}">
+                <a16:creationId xmlns:a16="http://schemas.microsoft.com/office/drawing/2014/main" id="{10058680-D07C-4893-B2B7-91543F18AB32}"/>
               </a:ext>
               <a:ext uri="{C183D7F6-B498-43B3-948B-1728B52AA6E4}">
                 <adec:decorative xmlns:adec="http://schemas.microsoft.com/office/drawing/2017/decorative" val="1"/>
@@ -6208,8 +6778,8 @@
         </p:nvSpPr>
         <p:spPr>
           <a:xfrm>
-            <a:off x="451588" y="601200"/>
-            <a:ext cx="7498616" cy="5789365"/>
+            <a:off x="446534" y="472603"/>
+            <a:ext cx="3703320" cy="94997"/>
           </a:xfrm>
           <a:prstGeom prst="rect">
             <a:avLst/>
@@ -6239,65 +6809,10 @@
       </p:sp>
       <p:sp>
         <p:nvSpPr>
-          <p:cNvPr id="2" name="Titre 1">
+          <p:cNvPr id="34" name="Rectangle 33">
             <a:extLst>
               <a:ext uri="{FF2B5EF4-FFF2-40B4-BE49-F238E27FC236}">
-                <a16:creationId xmlns:a16="http://schemas.microsoft.com/office/drawing/2014/main" id="{3AD804A7-3286-E9E8-FE11-026DBB1DC074}"/>
-              </a:ext>
-            </a:extLst>
-          </p:cNvPr>
-          <p:cNvSpPr>
-            <a:spLocks noGrp="1"/>
-          </p:cNvSpPr>
-          <p:nvPr>
-            <p:ph type="title"/>
-          </p:nvPr>
-        </p:nvSpPr>
-        <p:spPr>
-          <a:xfrm>
-            <a:off x="807559" y="938022"/>
-            <a:ext cx="6647905" cy="722998"/>
-          </a:xfrm>
-        </p:spPr>
-        <p:txBody>
-          <a:bodyPr vert="horz" lIns="91440" tIns="45720" rIns="91440" bIns="45720" rtlCol="0" anchor="b">
-            <a:normAutofit/>
-          </a:bodyPr>
-          <a:lstStyle/>
-          <a:p>
-            <a:r>
-              <a:rPr lang="en-US" dirty="0">
-                <a:solidFill>
-                  <a:srgbClr val="FFFFFF"/>
-                </a:solidFill>
-              </a:rPr>
-              <a:t>Structure </a:t>
-            </a:r>
-            <a:r>
-              <a:rPr lang="en-US" dirty="0" err="1">
-                <a:solidFill>
-                  <a:srgbClr val="FFFFFF"/>
-                </a:solidFill>
-              </a:rPr>
-              <a:t>mvc</a:t>
-            </a:r>
-            <a:r>
-              <a:rPr lang="en-US" dirty="0">
-                <a:solidFill>
-                  <a:srgbClr val="FFFFFF"/>
-                </a:solidFill>
-              </a:rPr>
-              <a:t> - model</a:t>
-            </a:r>
-          </a:p>
-        </p:txBody>
-      </p:sp>
-      <p:sp>
-        <p:nvSpPr>
-          <p:cNvPr id="21" name="Rectangle 20">
-            <a:extLst>
-              <a:ext uri="{FF2B5EF4-FFF2-40B4-BE49-F238E27FC236}">
-                <a16:creationId xmlns:a16="http://schemas.microsoft.com/office/drawing/2014/main" id="{0997DBEA-6DFC-457A-9850-E535053549D6}"/>
+                <a16:creationId xmlns:a16="http://schemas.microsoft.com/office/drawing/2014/main" id="{7B42427A-0A1F-4A55-8705-D9179F1E0CFB}"/>
               </a:ext>
               <a:ext uri="{C183D7F6-B498-43B3-948B-1728B52AA6E4}">
                 <adec:decorative xmlns:adec="http://schemas.microsoft.com/office/drawing/2017/decorative" val="1"/>
@@ -6317,14 +6832,14 @@
         </p:nvSpPr>
         <p:spPr>
           <a:xfrm>
-            <a:off x="446534" y="457200"/>
-            <a:ext cx="3703320" cy="94997"/>
+            <a:off x="4241830" y="457200"/>
+            <a:ext cx="3703320" cy="91440"/>
           </a:xfrm>
           <a:prstGeom prst="rect">
             <a:avLst/>
           </a:prstGeom>
           <a:solidFill>
-            <a:srgbClr val="465359"/>
+            <a:schemeClr val="accent1"/>
           </a:solidFill>
           <a:ln>
             <a:noFill/>
@@ -6345,67 +6860,20 @@
             <a:schemeClr val="lt1"/>
           </a:fontRef>
         </p:style>
-      </p:sp>
-      <p:sp>
-        <p:nvSpPr>
-          <p:cNvPr id="23" name="Rectangle 22">
+        <p:txBody>
+          <a:bodyPr/>
+          <a:lstStyle/>
+          <a:p>
+            <a:endParaRPr lang="en-US" dirty="0"/>
+          </a:p>
+        </p:txBody>
+      </p:sp>
+      <p:sp>
+        <p:nvSpPr>
+          <p:cNvPr id="36" name="Rectangle 35">
             <a:extLst>
               <a:ext uri="{FF2B5EF4-FFF2-40B4-BE49-F238E27FC236}">
-                <a16:creationId xmlns:a16="http://schemas.microsoft.com/office/drawing/2014/main" id="{79446CF5-953A-4916-BFF4-F5558E5C2359}"/>
-              </a:ext>
-              <a:ext uri="{C183D7F6-B498-43B3-948B-1728B52AA6E4}">
-                <adec:decorative xmlns:adec="http://schemas.microsoft.com/office/drawing/2017/decorative" val="1"/>
-              </a:ext>
-            </a:extLst>
-          </p:cNvPr>
-          <p:cNvSpPr>
-            <a:spLocks noGrp="1" noRot="1" noChangeAspect="1" noMove="1" noResize="1" noEditPoints="1" noAdjustHandles="1" noChangeArrowheads="1" noChangeShapeType="1" noTextEdit="1"/>
-          </p:cNvSpPr>
-          <p:nvPr>
-            <p:extLst>
-              <p:ext uri="{386F3935-93C4-4BCD-93E2-E3B085C9AB24}">
-                <p16:designElem xmlns:p16="http://schemas.microsoft.com/office/powerpoint/2015/main" val="1"/>
-              </p:ext>
-            </p:extLst>
-          </p:nvPr>
-        </p:nvSpPr>
-        <p:spPr>
-          <a:xfrm>
-            <a:off x="4241830" y="457200"/>
-            <a:ext cx="3703320" cy="91440"/>
-          </a:xfrm>
-          <a:prstGeom prst="rect">
-            <a:avLst/>
-          </a:prstGeom>
-          <a:solidFill>
-            <a:schemeClr val="accent1"/>
-          </a:solidFill>
-          <a:ln>
-            <a:noFill/>
-          </a:ln>
-          <a:effectLst/>
-        </p:spPr>
-        <p:style>
-          <a:lnRef idx="1">
-            <a:schemeClr val="accent1"/>
-          </a:lnRef>
-          <a:fillRef idx="3">
-            <a:schemeClr val="accent1"/>
-          </a:fillRef>
-          <a:effectRef idx="2">
-            <a:schemeClr val="accent1"/>
-          </a:effectRef>
-          <a:fontRef idx="minor">
-            <a:schemeClr val="lt1"/>
-          </a:fontRef>
-        </p:style>
-      </p:sp>
-      <p:sp>
-        <p:nvSpPr>
-          <p:cNvPr id="25" name="Rectangle 24">
-            <a:extLst>
-              <a:ext uri="{FF2B5EF4-FFF2-40B4-BE49-F238E27FC236}">
-                <a16:creationId xmlns:a16="http://schemas.microsoft.com/office/drawing/2014/main" id="{477B945C-B433-4DFF-9A67-A5C9257E471C}"/>
+                <a16:creationId xmlns:a16="http://schemas.microsoft.com/office/drawing/2014/main" id="{EE54A6FE-D8CB-48A3-900B-053D4EBD3B85}"/>
               </a:ext>
               <a:ext uri="{C183D7F6-B498-43B3-948B-1728B52AA6E4}">
                 <adec:decorative xmlns:adec="http://schemas.microsoft.com/office/drawing/2017/decorative" val="1"/>
@@ -6468,8 +6936,8 @@
         </p:nvSpPr>
         <p:spPr>
           <a:xfrm>
-            <a:off x="807559" y="2340864"/>
-            <a:ext cx="6690843" cy="3793237"/>
+            <a:off x="4382726" y="1896532"/>
+            <a:ext cx="6878108" cy="4504267"/>
           </a:xfrm>
           <a:prstGeom prst="rect">
             <a:avLst/>
@@ -6477,7 +6945,7 @@
         </p:spPr>
         <p:txBody>
           <a:bodyPr vert="horz" lIns="91440" tIns="45720" rIns="91440" bIns="45720" rtlCol="0" anchor="ctr">
-            <a:normAutofit/>
+            <a:normAutofit fontScale="77500" lnSpcReduction="20000"/>
           </a:bodyPr>
           <a:lstStyle/>
           <a:p>
@@ -6499,9 +6967,12 @@
               <a:buChar char=""/>
             </a:pPr>
             <a:r>
-              <a:rPr lang="en-US" sz="1700">
-                <a:solidFill>
-                  <a:srgbClr val="FFFFFF"/>
+              <a:rPr lang="en-US" sz="2100" dirty="0">
+                <a:solidFill>
+                  <a:schemeClr val="tx1">
+                    <a:lumMod val="75000"/>
+                    <a:lumOff val="25000"/>
+                  </a:schemeClr>
                 </a:solidFill>
               </a:rPr>
               <a:t>Fichiers Service</a:t>
@@ -6526,9 +6997,12 @@
               <a:buChar char=""/>
             </a:pPr>
             <a:r>
-              <a:rPr lang="en-US" sz="1700">
-                <a:solidFill>
-                  <a:srgbClr val="FFFFFF"/>
+              <a:rPr lang="en-US" dirty="0">
+                <a:solidFill>
+                  <a:schemeClr val="tx1">
+                    <a:lumMod val="75000"/>
+                    <a:lumOff val="25000"/>
+                  </a:schemeClr>
                 </a:solidFill>
               </a:rPr>
               <a:t>Appels API (URLSession, dataTask)</a:t>
@@ -6553,9 +7027,12 @@
               <a:buChar char=""/>
             </a:pPr>
             <a:r>
-              <a:rPr lang="en-US" sz="1700">
-                <a:solidFill>
-                  <a:srgbClr val="FFFFFF"/>
+              <a:rPr lang="en-US" dirty="0">
+                <a:solidFill>
+                  <a:schemeClr val="tx1">
+                    <a:lumMod val="75000"/>
+                    <a:lumOff val="25000"/>
+                  </a:schemeClr>
                 </a:solidFill>
               </a:rPr>
               <a:t>Singleton</a:t>
@@ -6580,9 +7057,12 @@
               <a:buChar char=""/>
             </a:pPr>
             <a:r>
-              <a:rPr lang="en-US" sz="1700">
-                <a:solidFill>
-                  <a:srgbClr val="FFFFFF"/>
+              <a:rPr lang="en-US" dirty="0">
+                <a:solidFill>
+                  <a:schemeClr val="tx1">
+                    <a:lumMod val="75000"/>
+                    <a:lumOff val="25000"/>
+                  </a:schemeClr>
                 </a:solidFill>
               </a:rPr>
               <a:t>Callback avec le résultat</a:t>
@@ -6606,9 +7086,12 @@
               <a:buFont typeface="Wingdings 2" panose="05020102010507070707" pitchFamily="18" charset="2"/>
               <a:buChar char=""/>
             </a:pPr>
-            <a:endParaRPr lang="en-US" sz="1700">
+            <a:endParaRPr lang="en-US" dirty="0">
               <a:solidFill>
-                <a:srgbClr val="FFFFFF"/>
+                <a:schemeClr val="tx1">
+                  <a:lumMod val="75000"/>
+                  <a:lumOff val="25000"/>
+                </a:schemeClr>
               </a:solidFill>
             </a:endParaRPr>
           </a:p>
@@ -6631,9 +7114,12 @@
               <a:buChar char=""/>
             </a:pPr>
             <a:r>
-              <a:rPr lang="en-US" sz="1700">
-                <a:solidFill>
-                  <a:srgbClr val="FFFFFF"/>
+              <a:rPr lang="en-US" sz="2100" dirty="0">
+                <a:solidFill>
+                  <a:schemeClr val="tx1">
+                    <a:lumMod val="75000"/>
+                    <a:lumOff val="25000"/>
+                  </a:schemeClr>
                 </a:solidFill>
               </a:rPr>
               <a:t>Fichiers Response</a:t>
@@ -6658,9 +7144,12 @@
               <a:buChar char=""/>
             </a:pPr>
             <a:r>
-              <a:rPr lang="en-US" sz="1700">
-                <a:solidFill>
-                  <a:srgbClr val="FFFFFF"/>
+              <a:rPr lang="en-US" dirty="0">
+                <a:solidFill>
+                  <a:schemeClr val="tx1">
+                    <a:lumMod val="75000"/>
+                    <a:lumOff val="25000"/>
+                  </a:schemeClr>
                 </a:solidFill>
               </a:rPr>
               <a:t>Squelette du fichier JSON de l’appel API</a:t>
@@ -6684,9 +7173,12 @@
               <a:buFont typeface="Wingdings 2" panose="05020102010507070707" pitchFamily="18" charset="2"/>
               <a:buChar char=""/>
             </a:pPr>
-            <a:endParaRPr lang="en-US" sz="1700">
+            <a:endParaRPr lang="en-US" dirty="0">
               <a:solidFill>
-                <a:srgbClr val="FFFFFF"/>
+                <a:schemeClr val="tx1">
+                  <a:lumMod val="75000"/>
+                  <a:lumOff val="25000"/>
+                </a:schemeClr>
               </a:solidFill>
             </a:endParaRPr>
           </a:p>
@@ -6709,13 +7201,24 @@
               <a:buChar char=""/>
             </a:pPr>
             <a:r>
-              <a:rPr lang="en-US" sz="1700">
-                <a:solidFill>
-                  <a:srgbClr val="FFFFFF"/>
+              <a:rPr lang="en-US" sz="2100" dirty="0" err="1">
+                <a:solidFill>
+                  <a:schemeClr val="tx1">
+                    <a:lumMod val="75000"/>
+                    <a:lumOff val="25000"/>
+                  </a:schemeClr>
                 </a:solidFill>
               </a:rPr>
-              <a:t>Exchange.swift</a:t>
-            </a:r>
+              <a:t>ExchangeControl.swift</a:t>
+            </a:r>
+            <a:endParaRPr lang="en-US" sz="2100" dirty="0">
+              <a:solidFill>
+                <a:schemeClr val="tx1">
+                  <a:lumMod val="75000"/>
+                  <a:lumOff val="25000"/>
+                </a:schemeClr>
+              </a:solidFill>
+            </a:endParaRPr>
           </a:p>
           <a:p>
             <a:pPr marL="742950" lvl="1" indent="-285750" defTabSz="457200">
@@ -6736,13 +7239,85 @@
               <a:buChar char=""/>
             </a:pPr>
             <a:r>
-              <a:rPr lang="en-US" sz="1700">
-                <a:solidFill>
-                  <a:srgbClr val="FFFFFF"/>
+              <a:rPr lang="en-US" dirty="0">
+                <a:solidFill>
+                  <a:schemeClr val="tx1">
+                    <a:lumMod val="75000"/>
+                    <a:lumOff val="25000"/>
+                  </a:schemeClr>
                 </a:solidFill>
               </a:rPr>
-              <a:t>Pour convertir le montant EUR -&gt; USD</a:t>
-            </a:r>
+              <a:t>Pour </a:t>
+            </a:r>
+            <a:r>
+              <a:rPr lang="en-US" dirty="0" err="1">
+                <a:solidFill>
+                  <a:schemeClr val="tx1">
+                    <a:lumMod val="75000"/>
+                    <a:lumOff val="25000"/>
+                  </a:schemeClr>
+                </a:solidFill>
+              </a:rPr>
+              <a:t>convertir</a:t>
+            </a:r>
+            <a:r>
+              <a:rPr lang="en-US" dirty="0">
+                <a:solidFill>
+                  <a:schemeClr val="tx1">
+                    <a:lumMod val="75000"/>
+                    <a:lumOff val="25000"/>
+                  </a:schemeClr>
+                </a:solidFill>
+              </a:rPr>
+              <a:t> le </a:t>
+            </a:r>
+            <a:r>
+              <a:rPr lang="en-US" dirty="0" err="1">
+                <a:solidFill>
+                  <a:schemeClr val="tx1">
+                    <a:lumMod val="75000"/>
+                    <a:lumOff val="25000"/>
+                  </a:schemeClr>
+                </a:solidFill>
+              </a:rPr>
+              <a:t>montant</a:t>
+            </a:r>
+            <a:r>
+              <a:rPr lang="en-US" dirty="0">
+                <a:solidFill>
+                  <a:schemeClr val="tx1">
+                    <a:lumMod val="75000"/>
+                    <a:lumOff val="25000"/>
+                  </a:schemeClr>
+                </a:solidFill>
+              </a:rPr>
+              <a:t> EUR -&gt; USD</a:t>
+            </a:r>
+          </a:p>
+          <a:p>
+            <a:pPr lvl="1" defTabSz="457200">
+              <a:lnSpc>
+                <a:spcPct val="90000"/>
+              </a:lnSpc>
+              <a:spcBef>
+                <a:spcPct val="20000"/>
+              </a:spcBef>
+              <a:spcAft>
+                <a:spcPts val="600"/>
+              </a:spcAft>
+              <a:buClr>
+                <a:schemeClr val="accent1"/>
+              </a:buClr>
+              <a:buSzPct val="92000"/>
+            </a:pPr>
+            <a:endParaRPr lang="en-US" dirty="0">
+              <a:solidFill>
+                <a:schemeClr val="tx1">
+                  <a:lumMod val="75000"/>
+                  <a:lumOff val="25000"/>
+                </a:schemeClr>
+              </a:solidFill>
+            </a:endParaRPr>
           </a:p>
           <a:p>
             <a:pPr marL="285750" indent="-285750" defTabSz="457200">
@@ -6762,9 +7337,23 @@
               <a:buFont typeface="Wingdings 2" panose="05020102010507070707" pitchFamily="18" charset="2"/>
               <a:buChar char=""/>
             </a:pPr>
-            <a:endParaRPr lang="en-US" sz="1700">
+            <a:r>
+              <a:rPr lang="en-US" sz="2100" dirty="0" err="1">
+                <a:solidFill>
+                  <a:schemeClr val="tx1">
+                    <a:lumMod val="75000"/>
+                    <a:lumOff val="25000"/>
+                  </a:schemeClr>
+                </a:solidFill>
+              </a:rPr>
+              <a:t>LanguageConfiguration.swift</a:t>
+            </a:r>
+            <a:endParaRPr lang="en-US" sz="2100" dirty="0">
               <a:solidFill>
-                <a:srgbClr val="FFFFFF"/>
+                <a:schemeClr val="tx1">
+                  <a:lumMod val="75000"/>
+                  <a:lumOff val="25000"/>
+                </a:schemeClr>
               </a:solidFill>
             </a:endParaRPr>
           </a:p>
@@ -6786,20 +7375,360 @@
               <a:buFont typeface="Wingdings 2" panose="05020102010507070707" pitchFamily="18" charset="2"/>
               <a:buChar char=""/>
             </a:pPr>
-            <a:endParaRPr lang="en-US" sz="1700">
+            <a:r>
+              <a:rPr lang="en-US" dirty="0">
+                <a:solidFill>
+                  <a:schemeClr val="tx1">
+                    <a:lumMod val="75000"/>
+                    <a:lumOff val="25000"/>
+                  </a:schemeClr>
+                </a:solidFill>
+              </a:rPr>
+              <a:t>Comment les </a:t>
+            </a:r>
+            <a:r>
+              <a:rPr lang="en-US" dirty="0" err="1">
+                <a:solidFill>
+                  <a:schemeClr val="tx1">
+                    <a:lumMod val="75000"/>
+                    <a:lumOff val="25000"/>
+                  </a:schemeClr>
+                </a:solidFill>
+              </a:rPr>
+              <a:t>langues</a:t>
+            </a:r>
+            <a:r>
+              <a:rPr lang="en-US" dirty="0">
+                <a:solidFill>
+                  <a:schemeClr val="tx1">
+                    <a:lumMod val="75000"/>
+                    <a:lumOff val="25000"/>
+                  </a:schemeClr>
+                </a:solidFill>
+              </a:rPr>
+              <a:t> </a:t>
+            </a:r>
+            <a:r>
+              <a:rPr lang="en-US" dirty="0" err="1">
+                <a:solidFill>
+                  <a:schemeClr val="tx1">
+                    <a:lumMod val="75000"/>
+                    <a:lumOff val="25000"/>
+                  </a:schemeClr>
+                </a:solidFill>
+              </a:rPr>
+              <a:t>vont</a:t>
+            </a:r>
+            <a:r>
+              <a:rPr lang="en-US" dirty="0">
+                <a:solidFill>
+                  <a:schemeClr val="tx1">
+                    <a:lumMod val="75000"/>
+                    <a:lumOff val="25000"/>
+                  </a:schemeClr>
+                </a:solidFill>
+              </a:rPr>
+              <a:t> </a:t>
+            </a:r>
+            <a:r>
+              <a:rPr lang="en-US" dirty="0" err="1">
+                <a:solidFill>
+                  <a:schemeClr val="tx1">
+                    <a:lumMod val="75000"/>
+                    <a:lumOff val="25000"/>
+                  </a:schemeClr>
+                </a:solidFill>
+              </a:rPr>
+              <a:t>êtres</a:t>
+            </a:r>
+            <a:r>
+              <a:rPr lang="en-US" dirty="0">
+                <a:solidFill>
+                  <a:schemeClr val="tx1">
+                    <a:lumMod val="75000"/>
+                    <a:lumOff val="25000"/>
+                  </a:schemeClr>
+                </a:solidFill>
+              </a:rPr>
+              <a:t> </a:t>
+            </a:r>
+            <a:r>
+              <a:rPr lang="en-US" dirty="0" err="1">
+                <a:solidFill>
+                  <a:schemeClr val="tx1">
+                    <a:lumMod val="75000"/>
+                    <a:lumOff val="25000"/>
+                  </a:schemeClr>
+                </a:solidFill>
+              </a:rPr>
+              <a:t>présentées</a:t>
+            </a:r>
+            <a:r>
+              <a:rPr lang="en-US" dirty="0">
+                <a:solidFill>
+                  <a:schemeClr val="tx1">
+                    <a:lumMod val="75000"/>
+                    <a:lumOff val="25000"/>
+                  </a:schemeClr>
+                </a:solidFill>
+              </a:rPr>
+              <a:t> et </a:t>
+            </a:r>
+            <a:r>
+              <a:rPr lang="en-US" dirty="0" err="1">
+                <a:solidFill>
+                  <a:schemeClr val="tx1">
+                    <a:lumMod val="75000"/>
+                    <a:lumOff val="25000"/>
+                  </a:schemeClr>
+                </a:solidFill>
+              </a:rPr>
+              <a:t>utilisées</a:t>
+            </a:r>
+            <a:endParaRPr lang="en-US" dirty="0">
               <a:solidFill>
-                <a:srgbClr val="FFFFFF"/>
+                <a:schemeClr val="tx1">
+                  <a:lumMod val="75000"/>
+                  <a:lumOff val="25000"/>
+                </a:schemeClr>
               </a:solidFill>
             </a:endParaRPr>
           </a:p>
+          <a:p>
+            <a:pPr lvl="1" defTabSz="457200">
+              <a:lnSpc>
+                <a:spcPct val="90000"/>
+              </a:lnSpc>
+              <a:spcBef>
+                <a:spcPct val="20000"/>
+              </a:spcBef>
+              <a:spcAft>
+                <a:spcPts val="600"/>
+              </a:spcAft>
+              <a:buClr>
+                <a:schemeClr val="accent1"/>
+              </a:buClr>
+              <a:buSzPct val="92000"/>
+            </a:pPr>
+            <a:endParaRPr lang="en-US" dirty="0">
+              <a:solidFill>
+                <a:schemeClr val="tx1">
+                  <a:lumMod val="75000"/>
+                  <a:lumOff val="25000"/>
+                </a:schemeClr>
+              </a:solidFill>
+            </a:endParaRPr>
+          </a:p>
+          <a:p>
+            <a:pPr marL="285750" indent="-285750" defTabSz="457200">
+              <a:lnSpc>
+                <a:spcPct val="90000"/>
+              </a:lnSpc>
+              <a:spcBef>
+                <a:spcPct val="20000"/>
+              </a:spcBef>
+              <a:spcAft>
+                <a:spcPts val="600"/>
+              </a:spcAft>
+              <a:buClr>
+                <a:schemeClr val="accent1"/>
+              </a:buClr>
+              <a:buSzPct val="92000"/>
+              <a:buFont typeface="Wingdings 2" panose="05020102010507070707" pitchFamily="18" charset="2"/>
+              <a:buChar char=""/>
+            </a:pPr>
+            <a:r>
+              <a:rPr lang="en-US" sz="2100" dirty="0" err="1">
+                <a:solidFill>
+                  <a:schemeClr val="tx1">
+                    <a:lumMod val="75000"/>
+                    <a:lumOff val="25000"/>
+                  </a:schemeClr>
+                </a:solidFill>
+              </a:rPr>
+              <a:t>WeatherSupport.swift</a:t>
+            </a:r>
+            <a:endParaRPr lang="en-US" sz="2100" dirty="0">
+              <a:solidFill>
+                <a:schemeClr val="tx1">
+                  <a:lumMod val="75000"/>
+                  <a:lumOff val="25000"/>
+                </a:schemeClr>
+              </a:solidFill>
+            </a:endParaRPr>
+          </a:p>
+          <a:p>
+            <a:pPr marL="742950" lvl="1" indent="-285750" defTabSz="457200">
+              <a:lnSpc>
+                <a:spcPct val="90000"/>
+              </a:lnSpc>
+              <a:spcBef>
+                <a:spcPct val="20000"/>
+              </a:spcBef>
+              <a:spcAft>
+                <a:spcPts val="600"/>
+              </a:spcAft>
+              <a:buClr>
+                <a:schemeClr val="accent1"/>
+              </a:buClr>
+              <a:buSzPct val="92000"/>
+              <a:buFont typeface="Wingdings 2" panose="05020102010507070707" pitchFamily="18" charset="2"/>
+              <a:buChar char=""/>
+            </a:pPr>
+            <a:r>
+              <a:rPr lang="en-US" dirty="0">
+                <a:solidFill>
+                  <a:schemeClr val="tx1">
+                    <a:lumMod val="75000"/>
+                    <a:lumOff val="25000"/>
+                  </a:schemeClr>
+                </a:solidFill>
+              </a:rPr>
+              <a:t>Comment les </a:t>
+            </a:r>
+            <a:r>
+              <a:rPr lang="en-US" dirty="0" err="1">
+                <a:solidFill>
+                  <a:schemeClr val="tx1">
+                    <a:lumMod val="75000"/>
+                    <a:lumOff val="25000"/>
+                  </a:schemeClr>
+                </a:solidFill>
+              </a:rPr>
+              <a:t>données</a:t>
+            </a:r>
+            <a:r>
+              <a:rPr lang="en-US" dirty="0">
+                <a:solidFill>
+                  <a:schemeClr val="tx1">
+                    <a:lumMod val="75000"/>
+                    <a:lumOff val="25000"/>
+                  </a:schemeClr>
+                </a:solidFill>
+              </a:rPr>
+              <a:t> </a:t>
+            </a:r>
+            <a:r>
+              <a:rPr lang="en-US" dirty="0" err="1">
+                <a:solidFill>
+                  <a:schemeClr val="tx1">
+                    <a:lumMod val="75000"/>
+                    <a:lumOff val="25000"/>
+                  </a:schemeClr>
+                </a:solidFill>
+              </a:rPr>
+              <a:t>météos</a:t>
+            </a:r>
+            <a:r>
+              <a:rPr lang="en-US" dirty="0">
+                <a:solidFill>
+                  <a:schemeClr val="tx1">
+                    <a:lumMod val="75000"/>
+                    <a:lumOff val="25000"/>
+                  </a:schemeClr>
+                </a:solidFill>
+              </a:rPr>
+              <a:t> </a:t>
+            </a:r>
+            <a:r>
+              <a:rPr lang="en-US" dirty="0" err="1">
+                <a:solidFill>
+                  <a:schemeClr val="tx1">
+                    <a:lumMod val="75000"/>
+                    <a:lumOff val="25000"/>
+                  </a:schemeClr>
+                </a:solidFill>
+              </a:rPr>
+              <a:t>vont</a:t>
+            </a:r>
+            <a:r>
+              <a:rPr lang="en-US" dirty="0">
+                <a:solidFill>
+                  <a:schemeClr val="tx1">
+                    <a:lumMod val="75000"/>
+                    <a:lumOff val="25000"/>
+                  </a:schemeClr>
+                </a:solidFill>
+              </a:rPr>
+              <a:t> </a:t>
+            </a:r>
+            <a:r>
+              <a:rPr lang="en-US" dirty="0" err="1">
+                <a:solidFill>
+                  <a:schemeClr val="tx1">
+                    <a:lumMod val="75000"/>
+                    <a:lumOff val="25000"/>
+                  </a:schemeClr>
+                </a:solidFill>
+              </a:rPr>
+              <a:t>êtres</a:t>
+            </a:r>
+            <a:r>
+              <a:rPr lang="en-US" dirty="0">
+                <a:solidFill>
+                  <a:schemeClr val="tx1">
+                    <a:lumMod val="75000"/>
+                    <a:lumOff val="25000"/>
+                  </a:schemeClr>
+                </a:solidFill>
+              </a:rPr>
+              <a:t> </a:t>
+            </a:r>
+            <a:r>
+              <a:rPr lang="en-US" dirty="0" err="1">
+                <a:solidFill>
+                  <a:schemeClr val="tx1">
+                    <a:lumMod val="75000"/>
+                    <a:lumOff val="25000"/>
+                  </a:schemeClr>
+                </a:solidFill>
+              </a:rPr>
+              <a:t>présentées</a:t>
+            </a:r>
+            <a:endParaRPr lang="en-US" dirty="0">
+              <a:solidFill>
+                <a:schemeClr val="tx1">
+                  <a:lumMod val="75000"/>
+                  <a:lumOff val="25000"/>
+                </a:schemeClr>
+              </a:solidFill>
+            </a:endParaRPr>
+          </a:p>
+          <a:p>
+            <a:pPr marL="742950" lvl="1" indent="-285750" defTabSz="457200">
+              <a:lnSpc>
+                <a:spcPct val="90000"/>
+              </a:lnSpc>
+              <a:spcBef>
+                <a:spcPct val="20000"/>
+              </a:spcBef>
+              <a:spcAft>
+                <a:spcPts val="600"/>
+              </a:spcAft>
+              <a:buClr>
+                <a:schemeClr val="accent1"/>
+              </a:buClr>
+              <a:buSzPct val="92000"/>
+              <a:buFont typeface="Wingdings 2" panose="05020102010507070707" pitchFamily="18" charset="2"/>
+              <a:buChar char=""/>
+            </a:pPr>
+            <a:endParaRPr lang="en-US" dirty="0">
+              <a:solidFill>
+                <a:schemeClr val="tx1">
+                  <a:lumMod val="75000"/>
+                  <a:lumOff val="25000"/>
+                </a:schemeClr>
+              </a:solidFill>
+            </a:endParaRPr>
+          </a:p>
         </p:txBody>
       </p:sp>
       <p:pic>
         <p:nvPicPr>
-          <p:cNvPr id="8" name="Espace réservé du contenu 7" descr="Une image contenant texte&#10;&#10;Description générée automatiquement">
+          <p:cNvPr id="12" name="Espace réservé du contenu 11" descr="Une image contenant texte&#10;&#10;Description générée automatiquement">
             <a:extLst>
               <a:ext uri="{FF2B5EF4-FFF2-40B4-BE49-F238E27FC236}">
-                <a16:creationId xmlns:a16="http://schemas.microsoft.com/office/drawing/2014/main" id="{76158C06-DA76-3C02-2A83-7F2E3457A96D}"/>
+                <a16:creationId xmlns:a16="http://schemas.microsoft.com/office/drawing/2014/main" id="{A6221246-9392-233D-61BF-FB9A330C6189}"/>
               </a:ext>
             </a:extLst>
           </p:cNvPr>
@@ -6818,12 +7747,9 @@
         </p:blipFill>
         <p:spPr>
           <a:xfrm>
-            <a:off x="8040568" y="1896612"/>
-            <a:ext cx="4061068" cy="3198539"/>
-          </a:xfrm>
-          <a:prstGeom prst="rect">
-            <a:avLst/>
-          </a:prstGeom>
+            <a:off x="1055771" y="2334656"/>
+            <a:ext cx="2484846" cy="3086019"/>
+          </a:xfrm>
         </p:spPr>
       </p:pic>
     </p:spTree>
@@ -6834,7 +7760,7 @@
     </p:extLst>
   </p:cSld>
   <p:clrMapOvr>
-    <a:overrideClrMapping bg1="dk1" tx1="lt1" bg2="dk2" tx2="lt2" accent1="accent1" accent2="accent2" accent3="accent3" accent4="accent4" accent5="accent5" accent6="accent6" hlink="hlink" folHlink="folHlink"/>
+    <a:masterClrMapping/>
   </p:clrMapOvr>
 </p:sld>
 </file>
@@ -8103,22 +9029,35 @@
           <a:lstStyle/>
           <a:p>
             <a:r>
-              <a:rPr lang="en-US">
+              <a:rPr lang="en-US" dirty="0">
                 <a:solidFill>
                   <a:srgbClr val="FFFFFF"/>
                 </a:solidFill>
               </a:rPr>
-              <a:t>Communication entre mvc</a:t>
-            </a:r>
+              <a:t>MVC </a:t>
+            </a:r>
+            <a:r>
+              <a:rPr lang="en-US" dirty="0" err="1">
+                <a:solidFill>
+                  <a:srgbClr val="FFFFFF"/>
+                </a:solidFill>
+              </a:rPr>
+              <a:t>Principaux</a:t>
+            </a:r>
+            <a:endParaRPr lang="en-US" dirty="0">
+              <a:solidFill>
+                <a:srgbClr val="FFFFFF"/>
+              </a:solidFill>
+            </a:endParaRPr>
           </a:p>
         </p:txBody>
       </p:sp>
       <p:pic>
         <p:nvPicPr>
-          <p:cNvPr id="7" name="Espace réservé du contenu 6">
+          <p:cNvPr id="6" name="Espace réservé du contenu 5">
             <a:extLst>
               <a:ext uri="{FF2B5EF4-FFF2-40B4-BE49-F238E27FC236}">
-                <a16:creationId xmlns:a16="http://schemas.microsoft.com/office/drawing/2014/main" id="{394FE42E-F8A6-6D69-6EFA-D317AD01AB6B}"/>
+                <a16:creationId xmlns:a16="http://schemas.microsoft.com/office/drawing/2014/main" id="{8F632837-E919-8E31-A838-196C3EC90933}"/>
               </a:ext>
             </a:extLst>
           </p:cNvPr>
@@ -8137,12 +9076,9 @@
         </p:blipFill>
         <p:spPr>
           <a:xfrm>
-            <a:off x="4765053" y="660464"/>
-            <a:ext cx="6764864" cy="5513362"/>
-          </a:xfrm>
-          <a:prstGeom prst="rect">
-            <a:avLst/>
-          </a:prstGeom>
+            <a:off x="4349478" y="812608"/>
+            <a:ext cx="7633246" cy="5368317"/>
+          </a:xfrm>
         </p:spPr>
       </p:pic>
     </p:spTree>
@@ -8161,14 +9097,6 @@
 <file path=ppt/slides/slide8.xml><?xml version="1.0" encoding="utf-8"?>
 <p:sld xmlns:a="http://schemas.openxmlformats.org/drawingml/2006/main" xmlns:r="http://schemas.openxmlformats.org/officeDocument/2006/relationships" xmlns:p="http://schemas.openxmlformats.org/presentationml/2006/main">
   <p:cSld>
-    <p:bg>
-      <p:bgPr>
-        <a:solidFill>
-          <a:schemeClr val="bg1"/>
-        </a:solidFill>
-        <a:effectLst/>
-      </p:bgPr>
-    </p:bg>
     <p:spTree>
       <p:nvGrpSpPr>
         <p:cNvPr id="1" name=""/>
@@ -8185,286 +9113,38 @@
       </p:grpSpPr>
       <p:sp>
         <p:nvSpPr>
-          <p:cNvPr id="9" name="Rectangle 8">
+          <p:cNvPr id="2" name="Titre 1">
             <a:extLst>
               <a:ext uri="{FF2B5EF4-FFF2-40B4-BE49-F238E27FC236}">
-                <a16:creationId xmlns:a16="http://schemas.microsoft.com/office/drawing/2014/main" id="{DD651B61-325E-4E73-8445-38B0DE8AAAB6}"/>
-              </a:ext>
-              <a:ext uri="{C183D7F6-B498-43B3-948B-1728B52AA6E4}">
-                <adec:decorative xmlns:adec="http://schemas.microsoft.com/office/drawing/2017/decorative" val="1"/>
+                <a16:creationId xmlns:a16="http://schemas.microsoft.com/office/drawing/2014/main" id="{178F6407-633E-7DE2-4338-A875A72FCF4C}"/>
               </a:ext>
             </a:extLst>
           </p:cNvPr>
           <p:cNvSpPr>
-            <a:spLocks noGrp="1" noRot="1" noChangeAspect="1" noMove="1" noResize="1" noEditPoints="1" noAdjustHandles="1" noChangeArrowheads="1" noChangeShapeType="1" noTextEdit="1"/>
-          </p:cNvSpPr>
-          <p:nvPr>
-            <p:extLst>
-              <p:ext uri="{386F3935-93C4-4BCD-93E2-E3B085C9AB24}">
-                <p16:designElem xmlns:p16="http://schemas.microsoft.com/office/powerpoint/2015/main" val="1"/>
-              </p:ext>
-            </p:extLst>
-          </p:nvPr>
-        </p:nvSpPr>
-        <p:spPr>
-          <a:xfrm>
-            <a:off x="446534" y="457200"/>
-            <a:ext cx="3703320" cy="94997"/>
-          </a:xfrm>
-          <a:prstGeom prst="rect">
-            <a:avLst/>
-          </a:prstGeom>
-          <a:solidFill>
-            <a:srgbClr val="465359"/>
-          </a:solidFill>
-          <a:ln>
-            <a:noFill/>
-          </a:ln>
-          <a:effectLst/>
-        </p:spPr>
-        <p:style>
-          <a:lnRef idx="1">
-            <a:schemeClr val="accent1"/>
-          </a:lnRef>
-          <a:fillRef idx="3">
-            <a:schemeClr val="accent1"/>
-          </a:fillRef>
-          <a:effectRef idx="2">
-            <a:schemeClr val="accent1"/>
-          </a:effectRef>
-          <a:fontRef idx="minor">
-            <a:schemeClr val="lt1"/>
-          </a:fontRef>
-        </p:style>
-      </p:sp>
-      <p:sp>
-        <p:nvSpPr>
-          <p:cNvPr id="11" name="Rectangle 10">
-            <a:extLst>
-              <a:ext uri="{FF2B5EF4-FFF2-40B4-BE49-F238E27FC236}">
-                <a16:creationId xmlns:a16="http://schemas.microsoft.com/office/drawing/2014/main" id="{B42E5253-D3AC-4AC2-B766-8B34F13C2F5E}"/>
-              </a:ext>
-              <a:ext uri="{C183D7F6-B498-43B3-948B-1728B52AA6E4}">
-                <adec:decorative xmlns:adec="http://schemas.microsoft.com/office/drawing/2017/decorative" val="1"/>
-              </a:ext>
-            </a:extLst>
-          </p:cNvPr>
-          <p:cNvSpPr>
-            <a:spLocks noGrp="1" noRot="1" noChangeAspect="1" noMove="1" noResize="1" noEditPoints="1" noAdjustHandles="1" noChangeArrowheads="1" noChangeShapeType="1" noTextEdit="1"/>
-          </p:cNvSpPr>
-          <p:nvPr>
-            <p:extLst>
-              <p:ext uri="{386F3935-93C4-4BCD-93E2-E3B085C9AB24}">
-                <p16:designElem xmlns:p16="http://schemas.microsoft.com/office/powerpoint/2015/main" val="1"/>
-              </p:ext>
-            </p:extLst>
-          </p:nvPr>
-        </p:nvSpPr>
-        <p:spPr>
-          <a:xfrm>
-            <a:off x="8042147" y="453643"/>
-            <a:ext cx="3703320" cy="98554"/>
-          </a:xfrm>
-          <a:prstGeom prst="rect">
-            <a:avLst/>
-          </a:prstGeom>
-          <a:solidFill>
-            <a:srgbClr val="969FA7"/>
-          </a:solidFill>
-          <a:ln>
-            <a:noFill/>
-          </a:ln>
-          <a:effectLst/>
-        </p:spPr>
-        <p:style>
-          <a:lnRef idx="1">
-            <a:schemeClr val="accent1"/>
-          </a:lnRef>
-          <a:fillRef idx="3">
-            <a:schemeClr val="accent1"/>
-          </a:fillRef>
-          <a:effectRef idx="2">
-            <a:schemeClr val="accent1"/>
-          </a:effectRef>
-          <a:fontRef idx="minor">
-            <a:schemeClr val="lt1"/>
-          </a:fontRef>
-        </p:style>
-      </p:sp>
-      <p:sp>
-        <p:nvSpPr>
-          <p:cNvPr id="13" name="Rectangle 12">
-            <a:extLst>
-              <a:ext uri="{FF2B5EF4-FFF2-40B4-BE49-F238E27FC236}">
-                <a16:creationId xmlns:a16="http://schemas.microsoft.com/office/drawing/2014/main" id="{10AE8D57-436A-4073-9A75-15BB5949F8B4}"/>
-              </a:ext>
-              <a:ext uri="{C183D7F6-B498-43B3-948B-1728B52AA6E4}">
-                <adec:decorative xmlns:adec="http://schemas.microsoft.com/office/drawing/2017/decorative" val="1"/>
-              </a:ext>
-            </a:extLst>
-          </p:cNvPr>
-          <p:cNvSpPr>
-            <a:spLocks noGrp="1" noRot="1" noChangeAspect="1" noMove="1" noResize="1" noEditPoints="1" noAdjustHandles="1" noChangeArrowheads="1" noChangeShapeType="1" noTextEdit="1"/>
-          </p:cNvSpPr>
-          <p:nvPr>
-            <p:extLst>
-              <p:ext uri="{386F3935-93C4-4BCD-93E2-E3B085C9AB24}">
-                <p16:designElem xmlns:p16="http://schemas.microsoft.com/office/powerpoint/2015/main" val="1"/>
-              </p:ext>
-            </p:extLst>
-          </p:nvPr>
-        </p:nvSpPr>
-        <p:spPr>
-          <a:xfrm>
-            <a:off x="4241830" y="457200"/>
-            <a:ext cx="3703320" cy="91440"/>
-          </a:xfrm>
-          <a:prstGeom prst="rect">
-            <a:avLst/>
-          </a:prstGeom>
-          <a:solidFill>
-            <a:schemeClr val="accent1"/>
-          </a:solidFill>
-          <a:ln>
-            <a:noFill/>
-          </a:ln>
-          <a:effectLst/>
-        </p:spPr>
-        <p:style>
-          <a:lnRef idx="1">
-            <a:schemeClr val="accent1"/>
-          </a:lnRef>
-          <a:fillRef idx="3">
-            <a:schemeClr val="accent1"/>
-          </a:fillRef>
-          <a:effectRef idx="2">
-            <a:schemeClr val="accent1"/>
-          </a:effectRef>
-          <a:fontRef idx="minor">
-            <a:schemeClr val="lt1"/>
-          </a:fontRef>
-        </p:style>
-      </p:sp>
-      <p:sp>
-        <p:nvSpPr>
-          <p:cNvPr id="15" name="Rectangle 14">
-            <a:extLst>
-              <a:ext uri="{FF2B5EF4-FFF2-40B4-BE49-F238E27FC236}">
-                <a16:creationId xmlns:a16="http://schemas.microsoft.com/office/drawing/2014/main" id="{E2852671-8EB6-4EAF-8AF8-65CF3FD66456}"/>
-              </a:ext>
-              <a:ext uri="{C183D7F6-B498-43B3-948B-1728B52AA6E4}">
-                <adec:decorative xmlns:adec="http://schemas.microsoft.com/office/drawing/2017/decorative" val="1"/>
-              </a:ext>
-            </a:extLst>
-          </p:cNvPr>
-          <p:cNvSpPr>
-            <a:spLocks noGrp="1" noRot="1" noChangeAspect="1" noMove="1" noResize="1" noEditPoints="1" noAdjustHandles="1" noChangeArrowheads="1" noChangeShapeType="1" noTextEdit="1"/>
-          </p:cNvSpPr>
-          <p:nvPr>
-            <p:extLst>
-              <p:ext uri="{386F3935-93C4-4BCD-93E2-E3B085C9AB24}">
-                <p16:designElem xmlns:p16="http://schemas.microsoft.com/office/powerpoint/2015/main" val="1"/>
-              </p:ext>
-            </p:extLst>
-          </p:nvPr>
-        </p:nvSpPr>
-        <p:spPr>
-          <a:xfrm>
-            <a:off x="446534" y="3085764"/>
-            <a:ext cx="11298932" cy="3338149"/>
-          </a:xfrm>
-          <a:prstGeom prst="rect">
-            <a:avLst/>
-          </a:prstGeom>
-          <a:solidFill>
-            <a:srgbClr val="465359"/>
-          </a:solidFill>
-          <a:ln>
-            <a:noFill/>
-          </a:ln>
-          <a:effectLst/>
-        </p:spPr>
-        <p:style>
-          <a:lnRef idx="1">
-            <a:schemeClr val="accent1"/>
-          </a:lnRef>
-          <a:fillRef idx="3">
-            <a:schemeClr val="accent1"/>
-          </a:fillRef>
-          <a:effectRef idx="2">
-            <a:schemeClr val="accent1"/>
-          </a:effectRef>
-          <a:fontRef idx="minor">
-            <a:schemeClr val="lt1"/>
-          </a:fontRef>
-        </p:style>
-      </p:sp>
-      <p:sp useBgFill="1">
-        <p:nvSpPr>
-          <p:cNvPr id="17" name="Rectangle 16">
-            <a:extLst>
-              <a:ext uri="{FF2B5EF4-FFF2-40B4-BE49-F238E27FC236}">
-                <a16:creationId xmlns:a16="http://schemas.microsoft.com/office/drawing/2014/main" id="{C1FA8F66-3B85-411D-A2A6-A50DF3026D9A}"/>
-              </a:ext>
-              <a:ext uri="{C183D7F6-B498-43B3-948B-1728B52AA6E4}">
-                <adec:decorative xmlns:adec="http://schemas.microsoft.com/office/drawing/2017/decorative" val="1"/>
-              </a:ext>
-            </a:extLst>
-          </p:cNvPr>
-          <p:cNvSpPr>
-            <a:spLocks noGrp="1" noRot="1" noChangeAspect="1" noMove="1" noResize="1" noEditPoints="1" noAdjustHandles="1" noChangeArrowheads="1" noChangeShapeType="1" noTextEdit="1"/>
-          </p:cNvSpPr>
-          <p:nvPr>
-            <p:extLst>
-              <p:ext uri="{386F3935-93C4-4BCD-93E2-E3B085C9AB24}">
-                <p16:designElem xmlns:p16="http://schemas.microsoft.com/office/powerpoint/2015/main" val="1"/>
-              </p:ext>
-            </p:extLst>
-          </p:nvPr>
-        </p:nvSpPr>
-        <p:spPr>
-          <a:xfrm>
-            <a:off x="0" y="0"/>
-            <a:ext cx="12192000" cy="6858000"/>
-          </a:xfrm>
-          <a:prstGeom prst="rect">
-            <a:avLst/>
-          </a:prstGeom>
-          <a:ln>
-            <a:noFill/>
-          </a:ln>
-        </p:spPr>
-        <p:style>
-          <a:lnRef idx="2">
-            <a:schemeClr val="accent1">
-              <a:shade val="50000"/>
-            </a:schemeClr>
-          </a:lnRef>
-          <a:fillRef idx="1">
-            <a:schemeClr val="accent1"/>
-          </a:fillRef>
-          <a:effectRef idx="0">
-            <a:schemeClr val="accent1"/>
-          </a:effectRef>
-          <a:fontRef idx="minor">
-            <a:schemeClr val="lt1"/>
-          </a:fontRef>
-        </p:style>
+            <a:spLocks noGrp="1"/>
+          </p:cNvSpPr>
+          <p:nvPr>
+            <p:ph type="title"/>
+          </p:nvPr>
+        </p:nvSpPr>
+        <p:spPr/>
         <p:txBody>
-          <a:bodyPr rtlCol="0" anchor="ctr"/>
+          <a:bodyPr/>
           <a:lstStyle/>
           <a:p>
-            <a:pPr algn="ctr"/>
-            <a:endParaRPr lang="en-US"/>
+            <a:r>
+              <a:rPr lang="fr-FR" dirty="0"/>
+              <a:t>MVC Secondaires</a:t>
+            </a:r>
           </a:p>
         </p:txBody>
       </p:sp>
       <p:pic>
         <p:nvPicPr>
-          <p:cNvPr id="4" name="Espace réservé du contenu 3">
+          <p:cNvPr id="5" name="Espace réservé du contenu 4">
             <a:extLst>
               <a:ext uri="{FF2B5EF4-FFF2-40B4-BE49-F238E27FC236}">
-                <a16:creationId xmlns:a16="http://schemas.microsoft.com/office/drawing/2014/main" id="{8243DC87-D750-FE24-0AEE-03E515957A2A}"/>
+                <a16:creationId xmlns:a16="http://schemas.microsoft.com/office/drawing/2014/main" id="{E5FB0E3C-CF3F-65E1-046A-55EA1DF3464C}"/>
               </a:ext>
             </a:extLst>
           </p:cNvPr>
@@ -8476,221 +9156,22 @@
           </p:nvPr>
         </p:nvPicPr>
         <p:blipFill>
-          <a:blip r:embed="rId2">
-            <a:extLst>
-              <a:ext uri="{28A0092B-C50C-407E-A947-70E740481C1C}">
-                <a14:useLocalDpi xmlns:a14="http://schemas.microsoft.com/office/drawing/2010/main" val="0"/>
-              </a:ext>
-            </a:extLst>
-          </a:blip>
+          <a:blip r:embed="rId2"/>
           <a:stretch>
             <a:fillRect/>
           </a:stretch>
         </p:blipFill>
         <p:spPr>
           <a:xfrm>
-            <a:off x="441140" y="888261"/>
-            <a:ext cx="7814097" cy="3027963"/>
-          </a:xfrm>
-          <a:prstGeom prst="rect">
-            <a:avLst/>
-          </a:prstGeom>
-        </p:spPr>
-      </p:pic>
-      <p:sp>
-        <p:nvSpPr>
-          <p:cNvPr id="19" name="Rectangle 18">
-            <a:extLst>
-              <a:ext uri="{FF2B5EF4-FFF2-40B4-BE49-F238E27FC236}">
-                <a16:creationId xmlns:a16="http://schemas.microsoft.com/office/drawing/2014/main" id="{4179E790-E691-4202-B7FA-62924FC8D195}"/>
-              </a:ext>
-              <a:ext uri="{C183D7F6-B498-43B3-948B-1728B52AA6E4}">
-                <adec:decorative xmlns:adec="http://schemas.microsoft.com/office/drawing/2017/decorative" val="1"/>
-              </a:ext>
-            </a:extLst>
-          </p:cNvPr>
-          <p:cNvSpPr>
-            <a:spLocks noGrp="1" noRot="1" noChangeAspect="1" noMove="1" noResize="1" noEditPoints="1" noAdjustHandles="1" noChangeArrowheads="1" noChangeShapeType="1" noTextEdit="1"/>
-          </p:cNvSpPr>
-          <p:nvPr>
-            <p:extLst>
-              <p:ext uri="{386F3935-93C4-4BCD-93E2-E3B085C9AB24}">
-                <p16:designElem xmlns:p16="http://schemas.microsoft.com/office/powerpoint/2015/main" val="1"/>
-              </p:ext>
-            </p:extLst>
-          </p:nvPr>
-        </p:nvSpPr>
-        <p:spPr>
-          <a:xfrm>
-            <a:off x="447234" y="4219240"/>
-            <a:ext cx="11301984" cy="94997"/>
-          </a:xfrm>
-          <a:prstGeom prst="rect">
-            <a:avLst/>
-          </a:prstGeom>
-          <a:solidFill>
-            <a:srgbClr val="465359"/>
-          </a:solidFill>
-          <a:ln>
-            <a:noFill/>
-          </a:ln>
-          <a:effectLst/>
-        </p:spPr>
-        <p:style>
-          <a:lnRef idx="1">
-            <a:schemeClr val="accent1"/>
-          </a:lnRef>
-          <a:fillRef idx="3">
-            <a:schemeClr val="accent1"/>
-          </a:fillRef>
-          <a:effectRef idx="2">
-            <a:schemeClr val="accent1"/>
-          </a:effectRef>
-          <a:fontRef idx="minor">
-            <a:schemeClr val="lt1"/>
-          </a:fontRef>
-        </p:style>
-      </p:sp>
-      <p:sp>
-        <p:nvSpPr>
-          <p:cNvPr id="21" name="Rectangle 20">
-            <a:extLst>
-              <a:ext uri="{FF2B5EF4-FFF2-40B4-BE49-F238E27FC236}">
-                <a16:creationId xmlns:a16="http://schemas.microsoft.com/office/drawing/2014/main" id="{065EE0A0-4DA6-4AA2-A475-14DB03C55AFA}"/>
-              </a:ext>
-              <a:ext uri="{C183D7F6-B498-43B3-948B-1728B52AA6E4}">
-                <adec:decorative xmlns:adec="http://schemas.microsoft.com/office/drawing/2017/decorative" val="1"/>
-              </a:ext>
-            </a:extLst>
-          </p:cNvPr>
-          <p:cNvSpPr>
-            <a:spLocks noGrp="1" noRot="1" noChangeAspect="1" noMove="1" noResize="1" noEditPoints="1" noAdjustHandles="1" noChangeArrowheads="1" noChangeShapeType="1" noTextEdit="1"/>
-          </p:cNvSpPr>
-          <p:nvPr>
-            <p:extLst>
-              <p:ext uri="{386F3935-93C4-4BCD-93E2-E3B085C9AB24}">
-                <p16:designElem xmlns:p16="http://schemas.microsoft.com/office/powerpoint/2015/main" val="1"/>
-              </p:ext>
-            </p:extLst>
-          </p:nvPr>
-        </p:nvSpPr>
-        <p:spPr>
-          <a:xfrm>
-            <a:off x="447234" y="4365523"/>
-            <a:ext cx="11303626" cy="2045243"/>
-          </a:xfrm>
-          <a:prstGeom prst="rect">
-            <a:avLst/>
-          </a:prstGeom>
-          <a:solidFill>
-            <a:srgbClr val="465359"/>
-          </a:solidFill>
-          <a:ln w="6350" cmpd="sng">
-            <a:noFill/>
-          </a:ln>
-          <a:effectLst/>
-        </p:spPr>
-        <p:style>
-          <a:lnRef idx="1">
-            <a:schemeClr val="accent1"/>
-          </a:lnRef>
-          <a:fillRef idx="3">
-            <a:schemeClr val="accent1"/>
-          </a:fillRef>
-          <a:effectRef idx="2">
-            <a:schemeClr val="accent1"/>
-          </a:effectRef>
-          <a:fontRef idx="minor">
-            <a:schemeClr val="lt1"/>
-          </a:fontRef>
-        </p:style>
-      </p:sp>
-      <p:sp>
-        <p:nvSpPr>
-          <p:cNvPr id="2" name="Titre 1">
-            <a:extLst>
-              <a:ext uri="{FF2B5EF4-FFF2-40B4-BE49-F238E27FC236}">
-                <a16:creationId xmlns:a16="http://schemas.microsoft.com/office/drawing/2014/main" id="{4EAD5DDB-B5BD-48D2-9252-ABEF43A48487}"/>
-              </a:ext>
-            </a:extLst>
-          </p:cNvPr>
-          <p:cNvSpPr>
-            <a:spLocks noGrp="1"/>
-          </p:cNvSpPr>
-          <p:nvPr>
-            <p:ph type="title"/>
-          </p:nvPr>
-        </p:nvSpPr>
-        <p:spPr>
-          <a:xfrm>
-            <a:off x="609599" y="4572000"/>
-            <a:ext cx="10965141" cy="895244"/>
-          </a:xfrm>
-        </p:spPr>
-        <p:txBody>
-          <a:bodyPr vert="horz" lIns="91440" tIns="45720" rIns="91440" bIns="45720" rtlCol="0" anchor="b">
-            <a:normAutofit/>
-          </a:bodyPr>
-          <a:lstStyle/>
-          <a:p>
-            <a:r>
-              <a:rPr lang="en-US" sz="4000">
-                <a:solidFill>
-                  <a:srgbClr val="FFFFFF"/>
-                </a:solidFill>
-              </a:rPr>
-              <a:t>Communication entre </a:t>
-            </a:r>
-            <a:r>
-              <a:rPr lang="en-US" sz="4000" err="1">
-                <a:solidFill>
-                  <a:srgbClr val="FFFFFF"/>
-                </a:solidFill>
-              </a:rPr>
-              <a:t>mvc</a:t>
-            </a:r>
-            <a:endParaRPr lang="en-US" sz="4000">
-              <a:solidFill>
-                <a:srgbClr val="FFFFFF"/>
-              </a:solidFill>
-            </a:endParaRPr>
-          </a:p>
-        </p:txBody>
-      </p:sp>
-      <p:pic>
-        <p:nvPicPr>
-          <p:cNvPr id="5" name="Image 4" descr="Une image contenant texte&#10;&#10;Description générée automatiquement">
-            <a:extLst>
-              <a:ext uri="{FF2B5EF4-FFF2-40B4-BE49-F238E27FC236}">
-                <a16:creationId xmlns:a16="http://schemas.microsoft.com/office/drawing/2014/main" id="{9C0FF547-09DB-1E52-CE86-E7531288096F}"/>
-              </a:ext>
-            </a:extLst>
-          </p:cNvPr>
-          <p:cNvPicPr>
-            <a:picLocks noChangeAspect="1"/>
-          </p:cNvPicPr>
-          <p:nvPr/>
-        </p:nvPicPr>
-        <p:blipFill>
-          <a:blip r:embed="rId3"/>
-          <a:stretch>
-            <a:fillRect/>
-          </a:stretch>
-        </p:blipFill>
-        <p:spPr>
-          <a:xfrm>
-            <a:off x="8628737" y="882665"/>
-            <a:ext cx="3116730" cy="3027963"/>
-          </a:xfrm>
-          <a:prstGeom prst="rect">
-            <a:avLst/>
-          </a:prstGeom>
+            <a:off x="2356306" y="2022781"/>
+            <a:ext cx="7479387" cy="4386408"/>
+          </a:xfrm>
         </p:spPr>
       </p:pic>
     </p:spTree>
     <p:extLst>
       <p:ext uri="{BB962C8B-B14F-4D97-AF65-F5344CB8AC3E}">
-        <p14:creationId xmlns:p14="http://schemas.microsoft.com/office/powerpoint/2010/main" val="1937854784"/>
+        <p14:creationId xmlns:p14="http://schemas.microsoft.com/office/powerpoint/2010/main" val="2012815432"/>
       </p:ext>
     </p:extLst>
   </p:cSld>
@@ -8727,7 +9208,7 @@
       </p:grpSpPr>
       <p:sp>
         <p:nvSpPr>
-          <p:cNvPr id="10" name="Rectangle 9">
+          <p:cNvPr id="9" name="Rectangle 8">
             <a:extLst>
               <a:ext uri="{FF2B5EF4-FFF2-40B4-BE49-F238E27FC236}">
                 <a16:creationId xmlns:a16="http://schemas.microsoft.com/office/drawing/2014/main" id="{DD651B61-325E-4E73-8445-38B0DE8AAAB6}"/>
@@ -8781,7 +9262,7 @@
       </p:sp>
       <p:sp>
         <p:nvSpPr>
-          <p:cNvPr id="12" name="Rectangle 11">
+          <p:cNvPr id="11" name="Rectangle 10">
             <a:extLst>
               <a:ext uri="{FF2B5EF4-FFF2-40B4-BE49-F238E27FC236}">
                 <a16:creationId xmlns:a16="http://schemas.microsoft.com/office/drawing/2014/main" id="{B42E5253-D3AC-4AC2-B766-8B34F13C2F5E}"/>
@@ -8835,7 +9316,7 @@
       </p:sp>
       <p:sp>
         <p:nvSpPr>
-          <p:cNvPr id="14" name="Rectangle 13">
+          <p:cNvPr id="13" name="Rectangle 12">
             <a:extLst>
               <a:ext uri="{FF2B5EF4-FFF2-40B4-BE49-F238E27FC236}">
                 <a16:creationId xmlns:a16="http://schemas.microsoft.com/office/drawing/2014/main" id="{10AE8D57-436A-4073-9A75-15BB5949F8B4}"/>
@@ -8889,7 +9370,7 @@
       </p:sp>
       <p:sp>
         <p:nvSpPr>
-          <p:cNvPr id="16" name="Rectangle 15">
+          <p:cNvPr id="15" name="Rectangle 14">
             <a:extLst>
               <a:ext uri="{FF2B5EF4-FFF2-40B4-BE49-F238E27FC236}">
                 <a16:creationId xmlns:a16="http://schemas.microsoft.com/office/drawing/2014/main" id="{E2852671-8EB6-4EAF-8AF8-65CF3FD66456}"/>
@@ -8943,10 +9424,10 @@
       </p:sp>
       <p:sp useBgFill="1">
         <p:nvSpPr>
-          <p:cNvPr id="18" name="Rectangle 17">
+          <p:cNvPr id="17" name="Rectangle 16">
             <a:extLst>
               <a:ext uri="{FF2B5EF4-FFF2-40B4-BE49-F238E27FC236}">
-                <a16:creationId xmlns:a16="http://schemas.microsoft.com/office/drawing/2014/main" id="{26B4480E-B7FF-4481-890E-043A69AE6FE2}"/>
+                <a16:creationId xmlns:a16="http://schemas.microsoft.com/office/drawing/2014/main" id="{C1FA8F66-3B85-411D-A2A6-A50DF3026D9A}"/>
               </a:ext>
               <a:ext uri="{C183D7F6-B498-43B3-948B-1728B52AA6E4}">
                 <adec:decorative xmlns:adec="http://schemas.microsoft.com/office/drawing/2017/decorative" val="1"/>
@@ -9001,21 +9482,59 @@
           </a:p>
         </p:txBody>
       </p:sp>
-      <p:grpSp>
-        <p:nvGrpSpPr>
-          <p:cNvPr id="20" name="Group 19">
+      <p:pic>
+        <p:nvPicPr>
+          <p:cNvPr id="4" name="Espace réservé du contenu 3">
             <a:extLst>
               <a:ext uri="{FF2B5EF4-FFF2-40B4-BE49-F238E27FC236}">
-                <a16:creationId xmlns:a16="http://schemas.microsoft.com/office/drawing/2014/main" id="{79394E1F-0B5F-497D-B2A6-8383A2A54834}"/>
+                <a16:creationId xmlns:a16="http://schemas.microsoft.com/office/drawing/2014/main" id="{8243DC87-D750-FE24-0AEE-03E515957A2A}"/>
+              </a:ext>
+            </a:extLst>
+          </p:cNvPr>
+          <p:cNvPicPr>
+            <a:picLocks noGrp="1" noChangeAspect="1"/>
+          </p:cNvPicPr>
+          <p:nvPr>
+            <p:ph idx="1"/>
+          </p:nvPr>
+        </p:nvPicPr>
+        <p:blipFill>
+          <a:blip r:embed="rId2">
+            <a:extLst>
+              <a:ext uri="{28A0092B-C50C-407E-A947-70E740481C1C}">
+                <a14:useLocalDpi xmlns:a14="http://schemas.microsoft.com/office/drawing/2010/main" val="0"/>
+              </a:ext>
+            </a:extLst>
+          </a:blip>
+          <a:stretch>
+            <a:fillRect/>
+          </a:stretch>
+        </p:blipFill>
+        <p:spPr>
+          <a:xfrm>
+            <a:off x="441140" y="888261"/>
+            <a:ext cx="7814097" cy="3027963"/>
+          </a:xfrm>
+          <a:prstGeom prst="rect">
+            <a:avLst/>
+          </a:prstGeom>
+        </p:spPr>
+      </p:pic>
+      <p:sp>
+        <p:nvSpPr>
+          <p:cNvPr id="19" name="Rectangle 18">
+            <a:extLst>
+              <a:ext uri="{FF2B5EF4-FFF2-40B4-BE49-F238E27FC236}">
+                <a16:creationId xmlns:a16="http://schemas.microsoft.com/office/drawing/2014/main" id="{4179E790-E691-4202-B7FA-62924FC8D195}"/>
               </a:ext>
               <a:ext uri="{C183D7F6-B498-43B3-948B-1728B52AA6E4}">
                 <adec:decorative xmlns:adec="http://schemas.microsoft.com/office/drawing/2017/decorative" val="1"/>
               </a:ext>
             </a:extLst>
           </p:cNvPr>
-          <p:cNvGrpSpPr>
-            <a:grpSpLocks noGrp="1" noUngrp="1" noRot="1" noChangeAspect="1" noMove="1" noResize="1"/>
-          </p:cNvGrpSpPr>
+          <p:cNvSpPr>
+            <a:spLocks noGrp="1" noRot="1" noChangeAspect="1" noMove="1" noResize="1" noEditPoints="1" noAdjustHandles="1" noChangeArrowheads="1" noChangeShapeType="1" noTextEdit="1"/>
+          </p:cNvSpPr>
           <p:nvPr>
             <p:extLst>
               <p:ext uri="{386F3935-93C4-4BCD-93E2-E3B085C9AB24}">
@@ -9023,128 +9542,98 @@
               </p:ext>
             </p:extLst>
           </p:nvPr>
-        </p:nvGrpSpPr>
-        <p:grpSpPr>
-          <a:xfrm>
-            <a:off x="438068" y="457200"/>
-            <a:ext cx="3703320" cy="5935133"/>
-            <a:chOff x="438068" y="457200"/>
-            <a:chExt cx="3703320" cy="5935133"/>
-          </a:xfrm>
-        </p:grpSpPr>
-        <p:sp>
-          <p:nvSpPr>
-            <p:cNvPr id="21" name="Rectangle 20">
-              <a:extLst>
-                <a:ext uri="{FF2B5EF4-FFF2-40B4-BE49-F238E27FC236}">
-                  <a16:creationId xmlns:a16="http://schemas.microsoft.com/office/drawing/2014/main" id="{1F1FF39A-AC3C-4066-9D4C-519AA22812EA}"/>
-                </a:ext>
-                <a:ext uri="{C183D7F6-B498-43B3-948B-1728B52AA6E4}">
-                  <adec:decorative xmlns:adec="http://schemas.microsoft.com/office/drawing/2017/decorative" val="1"/>
-                </a:ext>
-              </a:extLst>
-            </p:cNvPr>
-            <p:cNvSpPr/>
-            <p:nvPr>
-              <p:extLst>
-                <p:ext uri="{386F3935-93C4-4BCD-93E2-E3B085C9AB24}">
-                  <p16:designElem xmlns:p16="http://schemas.microsoft.com/office/powerpoint/2015/main" val="1"/>
-                </p:ext>
-              </p:extLst>
-            </p:nvPr>
-          </p:nvSpPr>
-          <p:spPr>
-            <a:xfrm>
-              <a:off x="438068" y="601201"/>
-              <a:ext cx="3702134" cy="5791132"/>
-            </a:xfrm>
-            <a:prstGeom prst="rect">
-              <a:avLst/>
-            </a:prstGeom>
-            <a:solidFill>
-              <a:srgbClr val="465359">
-                <a:alpha val="97000"/>
-              </a:srgbClr>
-            </a:solidFill>
-            <a:ln w="6350" cmpd="sng">
-              <a:noFill/>
-            </a:ln>
-            <a:effectLst/>
-          </p:spPr>
-          <p:style>
-            <a:lnRef idx="1">
-              <a:schemeClr val="accent1"/>
-            </a:lnRef>
-            <a:fillRef idx="3">
-              <a:schemeClr val="accent1"/>
-            </a:fillRef>
-            <a:effectRef idx="2">
-              <a:schemeClr val="accent1"/>
-            </a:effectRef>
-            <a:fontRef idx="minor">
-              <a:schemeClr val="lt1"/>
-            </a:fontRef>
-          </p:style>
-        </p:sp>
-        <p:sp>
-          <p:nvSpPr>
-            <p:cNvPr id="22" name="Rectangle 21">
-              <a:extLst>
-                <a:ext uri="{FF2B5EF4-FFF2-40B4-BE49-F238E27FC236}">
-                  <a16:creationId xmlns:a16="http://schemas.microsoft.com/office/drawing/2014/main" id="{64C13BAB-7C00-4D21-A857-E3D41C0A2A66}"/>
-                </a:ext>
-                <a:ext uri="{C183D7F6-B498-43B3-948B-1728B52AA6E4}">
-                  <adec:decorative xmlns:adec="http://schemas.microsoft.com/office/drawing/2017/decorative" val="1"/>
-                </a:ext>
-              </a:extLst>
-            </p:cNvPr>
-            <p:cNvSpPr/>
-            <p:nvPr>
-              <p:extLst>
-                <p:ext uri="{386F3935-93C4-4BCD-93E2-E3B085C9AB24}">
-                  <p16:designElem xmlns:p16="http://schemas.microsoft.com/office/powerpoint/2015/main" val="1"/>
-                </p:ext>
-              </p:extLst>
-            </p:nvPr>
-          </p:nvSpPr>
-          <p:spPr>
-            <a:xfrm>
-              <a:off x="438068" y="457200"/>
-              <a:ext cx="3703320" cy="94997"/>
-            </a:xfrm>
-            <a:prstGeom prst="rect">
-              <a:avLst/>
-            </a:prstGeom>
-            <a:solidFill>
-              <a:srgbClr val="465359"/>
-            </a:solidFill>
-            <a:ln>
-              <a:noFill/>
-            </a:ln>
-            <a:effectLst/>
-          </p:spPr>
-          <p:style>
-            <a:lnRef idx="1">
-              <a:schemeClr val="accent1"/>
-            </a:lnRef>
-            <a:fillRef idx="3">
-              <a:schemeClr val="accent1"/>
-            </a:fillRef>
-            <a:effectRef idx="2">
-              <a:schemeClr val="accent1"/>
-            </a:effectRef>
-            <a:fontRef idx="minor">
-              <a:schemeClr val="lt1"/>
-            </a:fontRef>
-          </p:style>
-        </p:sp>
-      </p:grpSp>
+        </p:nvSpPr>
+        <p:spPr>
+          <a:xfrm>
+            <a:off x="447234" y="4219240"/>
+            <a:ext cx="11301984" cy="94997"/>
+          </a:xfrm>
+          <a:prstGeom prst="rect">
+            <a:avLst/>
+          </a:prstGeom>
+          <a:solidFill>
+            <a:srgbClr val="465359"/>
+          </a:solidFill>
+          <a:ln>
+            <a:noFill/>
+          </a:ln>
+          <a:effectLst/>
+        </p:spPr>
+        <p:style>
+          <a:lnRef idx="1">
+            <a:schemeClr val="accent1"/>
+          </a:lnRef>
+          <a:fillRef idx="3">
+            <a:schemeClr val="accent1"/>
+          </a:fillRef>
+          <a:effectRef idx="2">
+            <a:schemeClr val="accent1"/>
+          </a:effectRef>
+          <a:fontRef idx="minor">
+            <a:schemeClr val="lt1"/>
+          </a:fontRef>
+        </p:style>
+      </p:sp>
+      <p:sp>
+        <p:nvSpPr>
+          <p:cNvPr id="21" name="Rectangle 20">
+            <a:extLst>
+              <a:ext uri="{FF2B5EF4-FFF2-40B4-BE49-F238E27FC236}">
+                <a16:creationId xmlns:a16="http://schemas.microsoft.com/office/drawing/2014/main" id="{065EE0A0-4DA6-4AA2-A475-14DB03C55AFA}"/>
+              </a:ext>
+              <a:ext uri="{C183D7F6-B498-43B3-948B-1728B52AA6E4}">
+                <adec:decorative xmlns:adec="http://schemas.microsoft.com/office/drawing/2017/decorative" val="1"/>
+              </a:ext>
+            </a:extLst>
+          </p:cNvPr>
+          <p:cNvSpPr>
+            <a:spLocks noGrp="1" noRot="1" noChangeAspect="1" noMove="1" noResize="1" noEditPoints="1" noAdjustHandles="1" noChangeArrowheads="1" noChangeShapeType="1" noTextEdit="1"/>
+          </p:cNvSpPr>
+          <p:nvPr>
+            <p:extLst>
+              <p:ext uri="{386F3935-93C4-4BCD-93E2-E3B085C9AB24}">
+                <p16:designElem xmlns:p16="http://schemas.microsoft.com/office/powerpoint/2015/main" val="1"/>
+              </p:ext>
+            </p:extLst>
+          </p:nvPr>
+        </p:nvSpPr>
+        <p:spPr>
+          <a:xfrm>
+            <a:off x="447234" y="4365523"/>
+            <a:ext cx="11303626" cy="2045243"/>
+          </a:xfrm>
+          <a:prstGeom prst="rect">
+            <a:avLst/>
+          </a:prstGeom>
+          <a:solidFill>
+            <a:srgbClr val="465359"/>
+          </a:solidFill>
+          <a:ln w="6350" cmpd="sng">
+            <a:noFill/>
+          </a:ln>
+          <a:effectLst/>
+        </p:spPr>
+        <p:style>
+          <a:lnRef idx="1">
+            <a:schemeClr val="accent1"/>
+          </a:lnRef>
+          <a:fillRef idx="3">
+            <a:schemeClr val="accent1"/>
+          </a:fillRef>
+          <a:effectRef idx="2">
+            <a:schemeClr val="accent1"/>
+          </a:effectRef>
+          <a:fontRef idx="minor">
+            <a:schemeClr val="lt1"/>
+          </a:fontRef>
+        </p:style>
+      </p:sp>
       <p:sp>
         <p:nvSpPr>
           <p:cNvPr id="2" name="Titre 1">
             <a:extLst>
               <a:ext uri="{FF2B5EF4-FFF2-40B4-BE49-F238E27FC236}">
-                <a16:creationId xmlns:a16="http://schemas.microsoft.com/office/drawing/2014/main" id="{4B3BEAB0-CD94-5B01-DA9F-080E5EF51460}"/>
+                <a16:creationId xmlns:a16="http://schemas.microsoft.com/office/drawing/2014/main" id="{4EAD5DDB-B5BD-48D2-9252-ABEF43A48487}"/>
               </a:ext>
             </a:extLst>
           </p:cNvPr>
@@ -9157,8 +9646,8 @@
         </p:nvSpPr>
         <p:spPr>
           <a:xfrm>
-            <a:off x="584200" y="1524001"/>
-            <a:ext cx="3412067" cy="3478384"/>
+            <a:off x="609599" y="4572000"/>
+            <a:ext cx="10965141" cy="895244"/>
           </a:xfrm>
         </p:spPr>
         <p:txBody>
@@ -9168,22 +9657,35 @@
           <a:lstStyle/>
           <a:p>
             <a:r>
-              <a:rPr lang="en-US">
+              <a:rPr lang="en-US" sz="4000">
                 <a:solidFill>
                   <a:srgbClr val="FFFFFF"/>
                 </a:solidFill>
               </a:rPr>
-              <a:t>Démonstration de l’application</a:t>
-            </a:r>
+              <a:t>Communication entre </a:t>
+            </a:r>
+            <a:r>
+              <a:rPr lang="en-US" sz="4000" err="1">
+                <a:solidFill>
+                  <a:srgbClr val="FFFFFF"/>
+                </a:solidFill>
+              </a:rPr>
+              <a:t>mvc</a:t>
+            </a:r>
+            <a:endParaRPr lang="en-US" sz="4000">
+              <a:solidFill>
+                <a:srgbClr val="FFFFFF"/>
+              </a:solidFill>
+            </a:endParaRPr>
           </a:p>
         </p:txBody>
       </p:sp>
       <p:pic>
         <p:nvPicPr>
-          <p:cNvPr id="7" name="Graphic 6" descr="Enseignant">
+          <p:cNvPr id="5" name="Image 4" descr="Une image contenant texte&#10;&#10;Description générée automatiquement">
             <a:extLst>
               <a:ext uri="{FF2B5EF4-FFF2-40B4-BE49-F238E27FC236}">
-                <a16:creationId xmlns:a16="http://schemas.microsoft.com/office/drawing/2014/main" id="{778700BB-3F2B-1467-9A53-CA789CBD6E96}"/>
+                <a16:creationId xmlns:a16="http://schemas.microsoft.com/office/drawing/2014/main" id="{9C0FF547-09DB-1E52-CE86-E7531288096F}"/>
               </a:ext>
             </a:extLst>
           </p:cNvPr>
@@ -9193,24 +9695,15 @@
           <p:nvPr/>
         </p:nvPicPr>
         <p:blipFill>
-          <a:blip r:embed="rId2">
-            <a:extLst>
-              <a:ext uri="{28A0092B-C50C-407E-A947-70E740481C1C}">
-                <a14:useLocalDpi xmlns:a14="http://schemas.microsoft.com/office/drawing/2010/main" val="0"/>
-              </a:ext>
-              <a:ext uri="{96DAC541-7B7A-43D3-8B79-37D633B846F1}">
-                <asvg:svgBlip xmlns:asvg="http://schemas.microsoft.com/office/drawing/2016/SVG/main" r:embed="rId3"/>
-              </a:ext>
-            </a:extLst>
-          </a:blip>
+          <a:blip r:embed="rId3"/>
           <a:stretch>
             <a:fillRect/>
           </a:stretch>
         </p:blipFill>
         <p:spPr>
           <a:xfrm>
-            <a:off x="5348406" y="618067"/>
-            <a:ext cx="5598157" cy="5598157"/>
+            <a:off x="8628737" y="882665"/>
+            <a:ext cx="3116730" cy="3027963"/>
           </a:xfrm>
           <a:prstGeom prst="rect">
             <a:avLst/>
@@ -9220,7 +9713,7 @@
     </p:spTree>
     <p:extLst>
       <p:ext uri="{BB962C8B-B14F-4D97-AF65-F5344CB8AC3E}">
-        <p14:creationId xmlns:p14="http://schemas.microsoft.com/office/powerpoint/2010/main" val="1767854227"/>
+        <p14:creationId xmlns:p14="http://schemas.microsoft.com/office/powerpoint/2010/main" val="1937854784"/>
       </p:ext>
     </p:extLst>
   </p:cSld>

</xml_diff>

<commit_message>
Préparation de la soutenance
</commit_message>
<xml_diff>
--- a/Soutenance/Horn_Mickael_presentation_4_102022.pptx
+++ b/Soutenance/Horn_Mickael_presentation_4_102022.pptx
@@ -5999,7 +5999,7 @@
           <a:lstStyle/>
           <a:p>
             <a:r>
-              <a:rPr lang="fr-FR"/>
+              <a:rPr lang="fr-FR" dirty="0"/>
               <a:t>Application mobile (SWIFT)</a:t>
             </a:r>
           </a:p>
@@ -6007,32 +6007,32 @@
             <a:pPr marL="0" indent="0">
               <a:buNone/>
             </a:pPr>
-            <a:endParaRPr lang="fr-FR"/>
-          </a:p>
-          <a:p>
-            <a:r>
-              <a:rPr lang="fr-FR"/>
+            <a:endParaRPr lang="fr-FR" dirty="0"/>
+          </a:p>
+          <a:p>
+            <a:r>
+              <a:rPr lang="fr-FR" dirty="0"/>
               <a:t>Trois fonctionnalités</a:t>
             </a:r>
           </a:p>
           <a:p>
             <a:pPr lvl="1"/>
             <a:r>
-              <a:rPr lang="fr-FR"/>
-              <a:t>Taux de change EUR -&gt; USD</a:t>
+              <a:rPr lang="fr-FR" dirty="0"/>
+              <a:t>Convertir EUR -&gt; USD</a:t>
             </a:r>
           </a:p>
           <a:p>
             <a:pPr lvl="1"/>
             <a:r>
-              <a:rPr lang="fr-FR"/>
+              <a:rPr lang="fr-FR" dirty="0"/>
               <a:t>Traduction FR -&gt; ENG</a:t>
             </a:r>
           </a:p>
           <a:p>
             <a:pPr lvl="1"/>
             <a:r>
-              <a:rPr lang="fr-FR"/>
+              <a:rPr lang="fr-FR" dirty="0"/>
               <a:t>Météo Paris &amp; New York</a:t>
             </a:r>
           </a:p>
@@ -6382,12 +6382,117 @@
           </a:fontRef>
         </p:style>
       </p:sp>
+      <p:sp>
+        <p:nvSpPr>
+          <p:cNvPr id="7" name="ZoneTexte 6">
+            <a:extLst>
+              <a:ext uri="{FF2B5EF4-FFF2-40B4-BE49-F238E27FC236}">
+                <a16:creationId xmlns:a16="http://schemas.microsoft.com/office/drawing/2014/main" id="{5A7240BB-297A-9053-4774-F0B5600A2108}"/>
+              </a:ext>
+            </a:extLst>
+          </p:cNvPr>
+          <p:cNvSpPr txBox="1"/>
+          <p:nvPr/>
+        </p:nvSpPr>
+        <p:spPr>
+          <a:xfrm>
+            <a:off x="1485303" y="4579093"/>
+            <a:ext cx="1617751" cy="369332"/>
+          </a:xfrm>
+          <a:prstGeom prst="rect">
+            <a:avLst/>
+          </a:prstGeom>
+          <a:noFill/>
+        </p:spPr>
+        <p:txBody>
+          <a:bodyPr wrap="none" rtlCol="0">
+            <a:spAutoFit/>
+          </a:bodyPr>
+          <a:lstStyle/>
+          <a:p>
+            <a:r>
+              <a:rPr lang="fr-FR"/>
+              <a:t>Taux de change</a:t>
+            </a:r>
+          </a:p>
+        </p:txBody>
+      </p:sp>
+      <p:sp>
+        <p:nvSpPr>
+          <p:cNvPr id="8" name="ZoneTexte 7">
+            <a:extLst>
+              <a:ext uri="{FF2B5EF4-FFF2-40B4-BE49-F238E27FC236}">
+                <a16:creationId xmlns:a16="http://schemas.microsoft.com/office/drawing/2014/main" id="{3D607210-48D2-7024-0286-9AD8F99E0376}"/>
+              </a:ext>
+            </a:extLst>
+          </p:cNvPr>
+          <p:cNvSpPr txBox="1"/>
+          <p:nvPr/>
+        </p:nvSpPr>
+        <p:spPr>
+          <a:xfrm>
+            <a:off x="5499416" y="4574369"/>
+            <a:ext cx="1188146" cy="369332"/>
+          </a:xfrm>
+          <a:prstGeom prst="rect">
+            <a:avLst/>
+          </a:prstGeom>
+          <a:noFill/>
+        </p:spPr>
+        <p:txBody>
+          <a:bodyPr wrap="none" rtlCol="0">
+            <a:spAutoFit/>
+          </a:bodyPr>
+          <a:lstStyle/>
+          <a:p>
+            <a:r>
+              <a:rPr lang="fr-FR"/>
+              <a:t>Traduction</a:t>
+            </a:r>
+          </a:p>
+        </p:txBody>
+      </p:sp>
+      <p:sp>
+        <p:nvSpPr>
+          <p:cNvPr id="9" name="ZoneTexte 8">
+            <a:extLst>
+              <a:ext uri="{FF2B5EF4-FFF2-40B4-BE49-F238E27FC236}">
+                <a16:creationId xmlns:a16="http://schemas.microsoft.com/office/drawing/2014/main" id="{226FB120-1349-42C1-259D-F946CCE05ECE}"/>
+              </a:ext>
+            </a:extLst>
+          </p:cNvPr>
+          <p:cNvSpPr txBox="1"/>
+          <p:nvPr/>
+        </p:nvSpPr>
+        <p:spPr>
+          <a:xfrm>
+            <a:off x="9499307" y="4574369"/>
+            <a:ext cx="788999" cy="369332"/>
+          </a:xfrm>
+          <a:prstGeom prst="rect">
+            <a:avLst/>
+          </a:prstGeom>
+          <a:noFill/>
+        </p:spPr>
+        <p:txBody>
+          <a:bodyPr wrap="none" rtlCol="0">
+            <a:spAutoFit/>
+          </a:bodyPr>
+          <a:lstStyle/>
+          <a:p>
+            <a:r>
+              <a:rPr lang="fr-FR"/>
+              <a:t>Météo</a:t>
+            </a:r>
+          </a:p>
+        </p:txBody>
+      </p:sp>
       <p:pic>
         <p:nvPicPr>
-          <p:cNvPr id="5" name="Image 4">
+          <p:cNvPr id="16" name="Image 15" descr="Une image contenant texte&#10;&#10;Description générée automatiquement">
             <a:extLst>
               <a:ext uri="{FF2B5EF4-FFF2-40B4-BE49-F238E27FC236}">
-                <a16:creationId xmlns:a16="http://schemas.microsoft.com/office/drawing/2014/main" id="{D1A2EEE5-C623-BDFD-1A34-7A2BDDD4EBE8}"/>
+                <a16:creationId xmlns:a16="http://schemas.microsoft.com/office/drawing/2014/main" id="{8A06426A-06BA-0497-CA06-4FD26DBF1ADB}"/>
               </a:ext>
             </a:extLst>
           </p:cNvPr>
@@ -6397,7 +6502,7 @@
           <p:nvPr/>
         </p:nvPicPr>
         <p:blipFill>
-          <a:blip r:embed="rId2" cstate="print">
+          <a:blip r:embed="rId2">
             <a:extLst>
               <a:ext uri="{28A0092B-C50C-407E-A947-70E740481C1C}">
                 <a14:useLocalDpi xmlns:a14="http://schemas.microsoft.com/office/drawing/2010/main" val="0"/>
@@ -6410,125 +6515,20 @@
         </p:blipFill>
         <p:spPr>
           <a:xfrm>
-            <a:off x="5275015" y="737763"/>
-            <a:ext cx="1636949" cy="3539353"/>
+            <a:off x="4650846" y="5379046"/>
+            <a:ext cx="2885285" cy="835547"/>
           </a:xfrm>
           <a:prstGeom prst="rect">
             <a:avLst/>
           </a:prstGeom>
         </p:spPr>
       </p:pic>
-      <p:sp>
-        <p:nvSpPr>
-          <p:cNvPr id="7" name="ZoneTexte 6">
-            <a:extLst>
-              <a:ext uri="{FF2B5EF4-FFF2-40B4-BE49-F238E27FC236}">
-                <a16:creationId xmlns:a16="http://schemas.microsoft.com/office/drawing/2014/main" id="{5A7240BB-297A-9053-4774-F0B5600A2108}"/>
-              </a:ext>
-            </a:extLst>
-          </p:cNvPr>
-          <p:cNvSpPr txBox="1"/>
-          <p:nvPr/>
-        </p:nvSpPr>
-        <p:spPr>
-          <a:xfrm>
-            <a:off x="1485303" y="4579093"/>
-            <a:ext cx="1617751" cy="369332"/>
-          </a:xfrm>
-          <a:prstGeom prst="rect">
-            <a:avLst/>
-          </a:prstGeom>
-          <a:noFill/>
-        </p:spPr>
-        <p:txBody>
-          <a:bodyPr wrap="none" rtlCol="0">
-            <a:spAutoFit/>
-          </a:bodyPr>
-          <a:lstStyle/>
-          <a:p>
-            <a:r>
-              <a:rPr lang="fr-FR"/>
-              <a:t>Taux de change</a:t>
-            </a:r>
-          </a:p>
-        </p:txBody>
-      </p:sp>
-      <p:sp>
-        <p:nvSpPr>
-          <p:cNvPr id="8" name="ZoneTexte 7">
-            <a:extLst>
-              <a:ext uri="{FF2B5EF4-FFF2-40B4-BE49-F238E27FC236}">
-                <a16:creationId xmlns:a16="http://schemas.microsoft.com/office/drawing/2014/main" id="{3D607210-48D2-7024-0286-9AD8F99E0376}"/>
-              </a:ext>
-            </a:extLst>
-          </p:cNvPr>
-          <p:cNvSpPr txBox="1"/>
-          <p:nvPr/>
-        </p:nvSpPr>
-        <p:spPr>
-          <a:xfrm>
-            <a:off x="5499416" y="4574369"/>
-            <a:ext cx="1188146" cy="369332"/>
-          </a:xfrm>
-          <a:prstGeom prst="rect">
-            <a:avLst/>
-          </a:prstGeom>
-          <a:noFill/>
-        </p:spPr>
-        <p:txBody>
-          <a:bodyPr wrap="none" rtlCol="0">
-            <a:spAutoFit/>
-          </a:bodyPr>
-          <a:lstStyle/>
-          <a:p>
-            <a:r>
-              <a:rPr lang="fr-FR"/>
-              <a:t>Traduction</a:t>
-            </a:r>
-          </a:p>
-        </p:txBody>
-      </p:sp>
-      <p:sp>
-        <p:nvSpPr>
-          <p:cNvPr id="9" name="ZoneTexte 8">
-            <a:extLst>
-              <a:ext uri="{FF2B5EF4-FFF2-40B4-BE49-F238E27FC236}">
-                <a16:creationId xmlns:a16="http://schemas.microsoft.com/office/drawing/2014/main" id="{226FB120-1349-42C1-259D-F946CCE05ECE}"/>
-              </a:ext>
-            </a:extLst>
-          </p:cNvPr>
-          <p:cNvSpPr txBox="1"/>
-          <p:nvPr/>
-        </p:nvSpPr>
-        <p:spPr>
-          <a:xfrm>
-            <a:off x="9499307" y="4574369"/>
-            <a:ext cx="788999" cy="369332"/>
-          </a:xfrm>
-          <a:prstGeom prst="rect">
-            <a:avLst/>
-          </a:prstGeom>
-          <a:noFill/>
-        </p:spPr>
-        <p:txBody>
-          <a:bodyPr wrap="none" rtlCol="0">
-            <a:spAutoFit/>
-          </a:bodyPr>
-          <a:lstStyle/>
-          <a:p>
-            <a:r>
-              <a:rPr lang="fr-FR"/>
-              <a:t>Météo</a:t>
-            </a:r>
-          </a:p>
-        </p:txBody>
-      </p:sp>
       <p:pic>
         <p:nvPicPr>
-          <p:cNvPr id="16" name="Image 15" descr="Une image contenant texte&#10;&#10;Description générée automatiquement">
+          <p:cNvPr id="10" name="Image 9">
             <a:extLst>
               <a:ext uri="{FF2B5EF4-FFF2-40B4-BE49-F238E27FC236}">
-                <a16:creationId xmlns:a16="http://schemas.microsoft.com/office/drawing/2014/main" id="{8A06426A-06BA-0497-CA06-4FD26DBF1ADB}"/>
+                <a16:creationId xmlns:a16="http://schemas.microsoft.com/office/drawing/2014/main" id="{6AB16CF5-6686-0225-6478-3DEBCE1E3AFB}"/>
               </a:ext>
             </a:extLst>
           </p:cNvPr>
@@ -6538,21 +6538,15 @@
           <p:nvPr/>
         </p:nvPicPr>
         <p:blipFill>
-          <a:blip r:embed="rId3">
-            <a:extLst>
-              <a:ext uri="{28A0092B-C50C-407E-A947-70E740481C1C}">
-                <a14:useLocalDpi xmlns:a14="http://schemas.microsoft.com/office/drawing/2010/main" val="0"/>
-              </a:ext>
-            </a:extLst>
-          </a:blip>
+          <a:blip r:embed="rId3"/>
           <a:stretch>
             <a:fillRect/>
           </a:stretch>
         </p:blipFill>
         <p:spPr>
           <a:xfrm>
-            <a:off x="4650846" y="5379046"/>
-            <a:ext cx="2885285" cy="835547"/>
+            <a:off x="1475703" y="737763"/>
+            <a:ext cx="1635227" cy="3538800"/>
           </a:xfrm>
           <a:prstGeom prst="rect">
             <a:avLst/>
@@ -6561,10 +6555,10 @@
       </p:pic>
       <p:pic>
         <p:nvPicPr>
-          <p:cNvPr id="10" name="Image 9">
+          <p:cNvPr id="4" name="Image 3" descr="Une image contenant texte&#10;&#10;Description générée automatiquement">
             <a:extLst>
               <a:ext uri="{FF2B5EF4-FFF2-40B4-BE49-F238E27FC236}">
-                <a16:creationId xmlns:a16="http://schemas.microsoft.com/office/drawing/2014/main" id="{6AB16CF5-6686-0225-6478-3DEBCE1E3AFB}"/>
+                <a16:creationId xmlns:a16="http://schemas.microsoft.com/office/drawing/2014/main" id="{24E90E6A-9273-EDE1-404E-A2CC9787703D}"/>
               </a:ext>
             </a:extLst>
           </p:cNvPr>
@@ -6581,7 +6575,7 @@
         </p:blipFill>
         <p:spPr>
           <a:xfrm>
-            <a:off x="1475703" y="737763"/>
+            <a:off x="9081070" y="737763"/>
             <a:ext cx="1635227" cy="3538800"/>
           </a:xfrm>
           <a:prstGeom prst="rect">
@@ -6591,10 +6585,10 @@
       </p:pic>
       <p:pic>
         <p:nvPicPr>
-          <p:cNvPr id="4" name="Image 3" descr="Une image contenant texte&#10;&#10;Description générée automatiquement">
+          <p:cNvPr id="6" name="Image 5">
             <a:extLst>
               <a:ext uri="{FF2B5EF4-FFF2-40B4-BE49-F238E27FC236}">
-                <a16:creationId xmlns:a16="http://schemas.microsoft.com/office/drawing/2014/main" id="{24E90E6A-9273-EDE1-404E-A2CC9787703D}"/>
+                <a16:creationId xmlns:a16="http://schemas.microsoft.com/office/drawing/2014/main" id="{075B4837-DA02-B33C-BF0C-7B9676FCFE4B}"/>
               </a:ext>
             </a:extLst>
           </p:cNvPr>
@@ -6611,7 +6605,7 @@
         </p:blipFill>
         <p:spPr>
           <a:xfrm>
-            <a:off x="9081070" y="737763"/>
+            <a:off x="5275874" y="737763"/>
             <a:ext cx="1635227" cy="3538800"/>
           </a:xfrm>
           <a:prstGeom prst="rect">
@@ -9147,10 +9141,10 @@
       </p:sp>
       <p:pic>
         <p:nvPicPr>
-          <p:cNvPr id="7" name="Espace réservé du contenu 6">
+          <p:cNvPr id="6" name="Espace réservé du contenu 5">
             <a:extLst>
               <a:ext uri="{FF2B5EF4-FFF2-40B4-BE49-F238E27FC236}">
-                <a16:creationId xmlns:a16="http://schemas.microsoft.com/office/drawing/2014/main" id="{2FF1C4C1-BAC5-8E3B-E6B3-6FB613596A32}"/>
+                <a16:creationId xmlns:a16="http://schemas.microsoft.com/office/drawing/2014/main" id="{A77A26CE-79F9-E806-51CC-376B33772E63}"/>
               </a:ext>
             </a:extLst>
           </p:cNvPr>
@@ -9169,8 +9163,8 @@
         </p:blipFill>
         <p:spPr>
           <a:xfrm>
-            <a:off x="2247000" y="2006003"/>
-            <a:ext cx="7697999" cy="4514616"/>
+            <a:off x="2467115" y="2032130"/>
+            <a:ext cx="7257769" cy="4050848"/>
           </a:xfrm>
         </p:spPr>
       </p:pic>

</xml_diff>

<commit_message>
Modifications mineures pour la soutenance
</commit_message>
<xml_diff>
--- a/Soutenance/Horn_Mickael_presentation_4_102022.pptx
+++ b/Soutenance/Horn_Mickael_presentation_4_102022.pptx
@@ -122,6 +122,2657 @@
 </p:presentation>
 </file>
 
+<file path=ppt/diagrams/colors1.xml><?xml version="1.0" encoding="utf-8"?>
+<dgm:colorsDef xmlns:dgm="http://schemas.openxmlformats.org/drawingml/2006/diagram" xmlns:a="http://schemas.openxmlformats.org/drawingml/2006/main" uniqueId="urn:microsoft.com/office/officeart/2005/8/colors/accent1_2">
+  <dgm:title val=""/>
+  <dgm:desc val=""/>
+  <dgm:catLst>
+    <dgm:cat type="accent1" pri="11200"/>
+  </dgm:catLst>
+  <dgm:styleLbl name="node0">
+    <dgm:fillClrLst meth="repeat">
+      <a:schemeClr val="accent1"/>
+    </dgm:fillClrLst>
+    <dgm:linClrLst meth="repeat">
+      <a:schemeClr val="lt1"/>
+    </dgm:linClrLst>
+    <dgm:effectClrLst/>
+    <dgm:txLinClrLst/>
+    <dgm:txFillClrLst/>
+    <dgm:txEffectClrLst/>
+  </dgm:styleLbl>
+  <dgm:styleLbl name="alignNode1">
+    <dgm:fillClrLst meth="repeat">
+      <a:schemeClr val="accent1"/>
+    </dgm:fillClrLst>
+    <dgm:linClrLst meth="repeat">
+      <a:schemeClr val="accent1"/>
+    </dgm:linClrLst>
+    <dgm:effectClrLst/>
+    <dgm:txLinClrLst/>
+    <dgm:txFillClrLst/>
+    <dgm:txEffectClrLst/>
+  </dgm:styleLbl>
+  <dgm:styleLbl name="node1">
+    <dgm:fillClrLst meth="repeat">
+      <a:schemeClr val="accent1"/>
+    </dgm:fillClrLst>
+    <dgm:linClrLst meth="repeat">
+      <a:schemeClr val="lt1"/>
+    </dgm:linClrLst>
+    <dgm:effectClrLst/>
+    <dgm:txLinClrLst/>
+    <dgm:txFillClrLst/>
+    <dgm:txEffectClrLst/>
+  </dgm:styleLbl>
+  <dgm:styleLbl name="lnNode1">
+    <dgm:fillClrLst meth="repeat">
+      <a:schemeClr val="accent1"/>
+    </dgm:fillClrLst>
+    <dgm:linClrLst meth="repeat">
+      <a:schemeClr val="lt1"/>
+    </dgm:linClrLst>
+    <dgm:effectClrLst/>
+    <dgm:txLinClrLst/>
+    <dgm:txFillClrLst/>
+    <dgm:txEffectClrLst/>
+  </dgm:styleLbl>
+  <dgm:styleLbl name="vennNode1">
+    <dgm:fillClrLst meth="repeat">
+      <a:schemeClr val="accent1">
+        <a:alpha val="50000"/>
+      </a:schemeClr>
+    </dgm:fillClrLst>
+    <dgm:linClrLst meth="repeat">
+      <a:schemeClr val="lt1"/>
+    </dgm:linClrLst>
+    <dgm:effectClrLst/>
+    <dgm:txLinClrLst/>
+    <dgm:txFillClrLst/>
+    <dgm:txEffectClrLst/>
+  </dgm:styleLbl>
+  <dgm:styleLbl name="node2">
+    <dgm:fillClrLst meth="repeat">
+      <a:schemeClr val="accent1"/>
+    </dgm:fillClrLst>
+    <dgm:linClrLst meth="repeat">
+      <a:schemeClr val="lt1"/>
+    </dgm:linClrLst>
+    <dgm:effectClrLst/>
+    <dgm:txLinClrLst/>
+    <dgm:txFillClrLst/>
+    <dgm:txEffectClrLst/>
+  </dgm:styleLbl>
+  <dgm:styleLbl name="node3">
+    <dgm:fillClrLst meth="repeat">
+      <a:schemeClr val="accent1"/>
+    </dgm:fillClrLst>
+    <dgm:linClrLst meth="repeat">
+      <a:schemeClr val="lt1"/>
+    </dgm:linClrLst>
+    <dgm:effectClrLst/>
+    <dgm:txLinClrLst/>
+    <dgm:txFillClrLst/>
+    <dgm:txEffectClrLst/>
+  </dgm:styleLbl>
+  <dgm:styleLbl name="node4">
+    <dgm:fillClrLst meth="repeat">
+      <a:schemeClr val="accent1"/>
+    </dgm:fillClrLst>
+    <dgm:linClrLst meth="repeat">
+      <a:schemeClr val="lt1"/>
+    </dgm:linClrLst>
+    <dgm:effectClrLst/>
+    <dgm:txLinClrLst/>
+    <dgm:txFillClrLst/>
+    <dgm:txEffectClrLst/>
+  </dgm:styleLbl>
+  <dgm:styleLbl name="fgImgPlace1">
+    <dgm:fillClrLst meth="repeat">
+      <a:schemeClr val="accent1">
+        <a:tint val="50000"/>
+      </a:schemeClr>
+    </dgm:fillClrLst>
+    <dgm:linClrLst meth="repeat">
+      <a:schemeClr val="lt1"/>
+    </dgm:linClrLst>
+    <dgm:effectClrLst/>
+    <dgm:txLinClrLst/>
+    <dgm:txFillClrLst meth="repeat">
+      <a:schemeClr val="lt1"/>
+    </dgm:txFillClrLst>
+    <dgm:txEffectClrLst/>
+  </dgm:styleLbl>
+  <dgm:styleLbl name="alignImgPlace1">
+    <dgm:fillClrLst meth="repeat">
+      <a:schemeClr val="accent1">
+        <a:tint val="50000"/>
+      </a:schemeClr>
+    </dgm:fillClrLst>
+    <dgm:linClrLst meth="repeat">
+      <a:schemeClr val="lt1"/>
+    </dgm:linClrLst>
+    <dgm:effectClrLst/>
+    <dgm:txLinClrLst/>
+    <dgm:txFillClrLst meth="repeat">
+      <a:schemeClr val="lt1"/>
+    </dgm:txFillClrLst>
+    <dgm:txEffectClrLst/>
+  </dgm:styleLbl>
+  <dgm:styleLbl name="bgImgPlace1">
+    <dgm:fillClrLst meth="repeat">
+      <a:schemeClr val="accent1">
+        <a:tint val="50000"/>
+      </a:schemeClr>
+    </dgm:fillClrLst>
+    <dgm:linClrLst meth="repeat">
+      <a:schemeClr val="lt1"/>
+    </dgm:linClrLst>
+    <dgm:effectClrLst/>
+    <dgm:txLinClrLst/>
+    <dgm:txFillClrLst meth="repeat">
+      <a:schemeClr val="lt1"/>
+    </dgm:txFillClrLst>
+    <dgm:txEffectClrLst/>
+  </dgm:styleLbl>
+  <dgm:styleLbl name="sibTrans2D1">
+    <dgm:fillClrLst meth="repeat">
+      <a:schemeClr val="accent1">
+        <a:tint val="60000"/>
+      </a:schemeClr>
+    </dgm:fillClrLst>
+    <dgm:linClrLst meth="repeat">
+      <a:schemeClr val="accent1">
+        <a:tint val="60000"/>
+      </a:schemeClr>
+    </dgm:linClrLst>
+    <dgm:effectClrLst/>
+    <dgm:txLinClrLst/>
+    <dgm:txFillClrLst/>
+    <dgm:txEffectClrLst/>
+  </dgm:styleLbl>
+  <dgm:styleLbl name="fgSibTrans2D1">
+    <dgm:fillClrLst meth="repeat">
+      <a:schemeClr val="accent1">
+        <a:tint val="60000"/>
+      </a:schemeClr>
+    </dgm:fillClrLst>
+    <dgm:linClrLst meth="repeat">
+      <a:schemeClr val="accent1">
+        <a:tint val="60000"/>
+      </a:schemeClr>
+    </dgm:linClrLst>
+    <dgm:effectClrLst/>
+    <dgm:txLinClrLst/>
+    <dgm:txFillClrLst/>
+    <dgm:txEffectClrLst/>
+  </dgm:styleLbl>
+  <dgm:styleLbl name="bgSibTrans2D1">
+    <dgm:fillClrLst meth="repeat">
+      <a:schemeClr val="accent1">
+        <a:tint val="60000"/>
+      </a:schemeClr>
+    </dgm:fillClrLst>
+    <dgm:linClrLst meth="repeat">
+      <a:schemeClr val="accent1">
+        <a:tint val="60000"/>
+      </a:schemeClr>
+    </dgm:linClrLst>
+    <dgm:effectClrLst/>
+    <dgm:txLinClrLst/>
+    <dgm:txFillClrLst/>
+    <dgm:txEffectClrLst/>
+  </dgm:styleLbl>
+  <dgm:styleLbl name="sibTrans1D1">
+    <dgm:fillClrLst meth="repeat">
+      <a:schemeClr val="accent1"/>
+    </dgm:fillClrLst>
+    <dgm:linClrLst meth="repeat">
+      <a:schemeClr val="accent1"/>
+    </dgm:linClrLst>
+    <dgm:effectClrLst/>
+    <dgm:txLinClrLst/>
+    <dgm:txFillClrLst meth="repeat">
+      <a:schemeClr val="tx1"/>
+    </dgm:txFillClrLst>
+    <dgm:txEffectClrLst/>
+  </dgm:styleLbl>
+  <dgm:styleLbl name="callout">
+    <dgm:fillClrLst meth="repeat">
+      <a:schemeClr val="accent1"/>
+    </dgm:fillClrLst>
+    <dgm:linClrLst meth="repeat">
+      <a:schemeClr val="accent1">
+        <a:tint val="50000"/>
+      </a:schemeClr>
+    </dgm:linClrLst>
+    <dgm:effectClrLst/>
+    <dgm:txLinClrLst/>
+    <dgm:txFillClrLst meth="repeat">
+      <a:schemeClr val="tx1"/>
+    </dgm:txFillClrLst>
+    <dgm:txEffectClrLst/>
+  </dgm:styleLbl>
+  <dgm:styleLbl name="asst0">
+    <dgm:fillClrLst meth="repeat">
+      <a:schemeClr val="accent1"/>
+    </dgm:fillClrLst>
+    <dgm:linClrLst meth="repeat">
+      <a:schemeClr val="lt1"/>
+    </dgm:linClrLst>
+    <dgm:effectClrLst/>
+    <dgm:txLinClrLst/>
+    <dgm:txFillClrLst/>
+    <dgm:txEffectClrLst/>
+  </dgm:styleLbl>
+  <dgm:styleLbl name="asst1">
+    <dgm:fillClrLst meth="repeat">
+      <a:schemeClr val="accent1"/>
+    </dgm:fillClrLst>
+    <dgm:linClrLst meth="repeat">
+      <a:schemeClr val="lt1"/>
+    </dgm:linClrLst>
+    <dgm:effectClrLst/>
+    <dgm:txLinClrLst/>
+    <dgm:txFillClrLst/>
+    <dgm:txEffectClrLst/>
+  </dgm:styleLbl>
+  <dgm:styleLbl name="asst2">
+    <dgm:fillClrLst meth="repeat">
+      <a:schemeClr val="accent1"/>
+    </dgm:fillClrLst>
+    <dgm:linClrLst meth="repeat">
+      <a:schemeClr val="lt1"/>
+    </dgm:linClrLst>
+    <dgm:effectClrLst/>
+    <dgm:txLinClrLst/>
+    <dgm:txFillClrLst/>
+    <dgm:txEffectClrLst/>
+  </dgm:styleLbl>
+  <dgm:styleLbl name="asst3">
+    <dgm:fillClrLst meth="repeat">
+      <a:schemeClr val="accent1"/>
+    </dgm:fillClrLst>
+    <dgm:linClrLst meth="repeat">
+      <a:schemeClr val="lt1"/>
+    </dgm:linClrLst>
+    <dgm:effectClrLst/>
+    <dgm:txLinClrLst/>
+    <dgm:txFillClrLst/>
+    <dgm:txEffectClrLst/>
+  </dgm:styleLbl>
+  <dgm:styleLbl name="asst4">
+    <dgm:fillClrLst meth="repeat">
+      <a:schemeClr val="accent1"/>
+    </dgm:fillClrLst>
+    <dgm:linClrLst meth="repeat">
+      <a:schemeClr val="lt1"/>
+    </dgm:linClrLst>
+    <dgm:effectClrLst/>
+    <dgm:txLinClrLst/>
+    <dgm:txFillClrLst/>
+    <dgm:txEffectClrLst/>
+  </dgm:styleLbl>
+  <dgm:styleLbl name="parChTrans2D1">
+    <dgm:fillClrLst meth="repeat">
+      <a:schemeClr val="accent1">
+        <a:tint val="60000"/>
+      </a:schemeClr>
+    </dgm:fillClrLst>
+    <dgm:linClrLst meth="repeat">
+      <a:schemeClr val="accent1">
+        <a:tint val="60000"/>
+      </a:schemeClr>
+    </dgm:linClrLst>
+    <dgm:effectClrLst/>
+    <dgm:txLinClrLst/>
+    <dgm:txFillClrLst meth="repeat">
+      <a:schemeClr val="lt1"/>
+    </dgm:txFillClrLst>
+    <dgm:txEffectClrLst/>
+  </dgm:styleLbl>
+  <dgm:styleLbl name="parChTrans2D2">
+    <dgm:fillClrLst meth="repeat">
+      <a:schemeClr val="accent1"/>
+    </dgm:fillClrLst>
+    <dgm:linClrLst meth="repeat">
+      <a:schemeClr val="accent1"/>
+    </dgm:linClrLst>
+    <dgm:effectClrLst/>
+    <dgm:txLinClrLst/>
+    <dgm:txFillClrLst meth="repeat">
+      <a:schemeClr val="lt1"/>
+    </dgm:txFillClrLst>
+    <dgm:txEffectClrLst/>
+  </dgm:styleLbl>
+  <dgm:styleLbl name="parChTrans2D3">
+    <dgm:fillClrLst meth="repeat">
+      <a:schemeClr val="accent1"/>
+    </dgm:fillClrLst>
+    <dgm:linClrLst meth="repeat">
+      <a:schemeClr val="accent1"/>
+    </dgm:linClrLst>
+    <dgm:effectClrLst/>
+    <dgm:txLinClrLst/>
+    <dgm:txFillClrLst meth="repeat">
+      <a:schemeClr val="lt1"/>
+    </dgm:txFillClrLst>
+    <dgm:txEffectClrLst/>
+  </dgm:styleLbl>
+  <dgm:styleLbl name="parChTrans2D4">
+    <dgm:fillClrLst meth="repeat">
+      <a:schemeClr val="accent1"/>
+    </dgm:fillClrLst>
+    <dgm:linClrLst meth="repeat">
+      <a:schemeClr val="accent1"/>
+    </dgm:linClrLst>
+    <dgm:effectClrLst/>
+    <dgm:txLinClrLst/>
+    <dgm:txFillClrLst meth="repeat">
+      <a:schemeClr val="lt1"/>
+    </dgm:txFillClrLst>
+    <dgm:txEffectClrLst/>
+  </dgm:styleLbl>
+  <dgm:styleLbl name="parChTrans1D1">
+    <dgm:fillClrLst meth="repeat">
+      <a:schemeClr val="accent1"/>
+    </dgm:fillClrLst>
+    <dgm:linClrLst meth="repeat">
+      <a:schemeClr val="accent1">
+        <a:shade val="60000"/>
+      </a:schemeClr>
+    </dgm:linClrLst>
+    <dgm:effectClrLst/>
+    <dgm:txLinClrLst/>
+    <dgm:txFillClrLst meth="repeat">
+      <a:schemeClr val="tx1"/>
+    </dgm:txFillClrLst>
+    <dgm:txEffectClrLst/>
+  </dgm:styleLbl>
+  <dgm:styleLbl name="parChTrans1D2">
+    <dgm:fillClrLst meth="repeat">
+      <a:schemeClr val="accent1"/>
+    </dgm:fillClrLst>
+    <dgm:linClrLst meth="repeat">
+      <a:schemeClr val="accent1">
+        <a:shade val="60000"/>
+      </a:schemeClr>
+    </dgm:linClrLst>
+    <dgm:effectClrLst/>
+    <dgm:txLinClrLst/>
+    <dgm:txFillClrLst meth="repeat">
+      <a:schemeClr val="tx1"/>
+    </dgm:txFillClrLst>
+    <dgm:txEffectClrLst/>
+  </dgm:styleLbl>
+  <dgm:styleLbl name="parChTrans1D3">
+    <dgm:fillClrLst meth="repeat">
+      <a:schemeClr val="accent1"/>
+    </dgm:fillClrLst>
+    <dgm:linClrLst meth="repeat">
+      <a:schemeClr val="accent1">
+        <a:shade val="80000"/>
+      </a:schemeClr>
+    </dgm:linClrLst>
+    <dgm:effectClrLst/>
+    <dgm:txLinClrLst/>
+    <dgm:txFillClrLst meth="repeat">
+      <a:schemeClr val="tx1"/>
+    </dgm:txFillClrLst>
+    <dgm:txEffectClrLst/>
+  </dgm:styleLbl>
+  <dgm:styleLbl name="parChTrans1D4">
+    <dgm:fillClrLst meth="repeat">
+      <a:schemeClr val="accent1"/>
+    </dgm:fillClrLst>
+    <dgm:linClrLst meth="repeat">
+      <a:schemeClr val="accent1">
+        <a:shade val="80000"/>
+      </a:schemeClr>
+    </dgm:linClrLst>
+    <dgm:effectClrLst/>
+    <dgm:txLinClrLst/>
+    <dgm:txFillClrLst meth="repeat">
+      <a:schemeClr val="tx1"/>
+    </dgm:txFillClrLst>
+    <dgm:txEffectClrLst/>
+  </dgm:styleLbl>
+  <dgm:styleLbl name="fgAcc1">
+    <dgm:fillClrLst meth="repeat">
+      <a:schemeClr val="lt1">
+        <a:alpha val="90000"/>
+      </a:schemeClr>
+    </dgm:fillClrLst>
+    <dgm:linClrLst meth="repeat">
+      <a:schemeClr val="accent1"/>
+    </dgm:linClrLst>
+    <dgm:effectClrLst/>
+    <dgm:txLinClrLst/>
+    <dgm:txFillClrLst meth="repeat">
+      <a:schemeClr val="dk1"/>
+    </dgm:txFillClrLst>
+    <dgm:txEffectClrLst/>
+  </dgm:styleLbl>
+  <dgm:styleLbl name="conFgAcc1">
+    <dgm:fillClrLst meth="repeat">
+      <a:schemeClr val="lt1">
+        <a:alpha val="90000"/>
+      </a:schemeClr>
+    </dgm:fillClrLst>
+    <dgm:linClrLst meth="repeat">
+      <a:schemeClr val="accent1"/>
+    </dgm:linClrLst>
+    <dgm:effectClrLst/>
+    <dgm:txLinClrLst/>
+    <dgm:txFillClrLst meth="repeat">
+      <a:schemeClr val="dk1"/>
+    </dgm:txFillClrLst>
+    <dgm:txEffectClrLst/>
+  </dgm:styleLbl>
+  <dgm:styleLbl name="alignAcc1">
+    <dgm:fillClrLst meth="repeat">
+      <a:schemeClr val="lt1">
+        <a:alpha val="90000"/>
+      </a:schemeClr>
+    </dgm:fillClrLst>
+    <dgm:linClrLst meth="repeat">
+      <a:schemeClr val="accent1"/>
+    </dgm:linClrLst>
+    <dgm:effectClrLst/>
+    <dgm:txLinClrLst/>
+    <dgm:txFillClrLst meth="repeat">
+      <a:schemeClr val="dk1"/>
+    </dgm:txFillClrLst>
+    <dgm:txEffectClrLst/>
+  </dgm:styleLbl>
+  <dgm:styleLbl name="trAlignAcc1">
+    <dgm:fillClrLst meth="repeat">
+      <a:schemeClr val="lt1">
+        <a:alpha val="40000"/>
+      </a:schemeClr>
+    </dgm:fillClrLst>
+    <dgm:linClrLst meth="repeat">
+      <a:schemeClr val="accent1"/>
+    </dgm:linClrLst>
+    <dgm:effectClrLst/>
+    <dgm:txLinClrLst/>
+    <dgm:txFillClrLst meth="repeat">
+      <a:schemeClr val="dk1"/>
+    </dgm:txFillClrLst>
+    <dgm:txEffectClrLst/>
+  </dgm:styleLbl>
+  <dgm:styleLbl name="bgAcc1">
+    <dgm:fillClrLst meth="repeat">
+      <a:schemeClr val="lt1">
+        <a:alpha val="90000"/>
+      </a:schemeClr>
+    </dgm:fillClrLst>
+    <dgm:linClrLst meth="repeat">
+      <a:schemeClr val="accent1"/>
+    </dgm:linClrLst>
+    <dgm:effectClrLst/>
+    <dgm:txLinClrLst/>
+    <dgm:txFillClrLst meth="repeat">
+      <a:schemeClr val="dk1"/>
+    </dgm:txFillClrLst>
+    <dgm:txEffectClrLst/>
+  </dgm:styleLbl>
+  <dgm:styleLbl name="solidFgAcc1">
+    <dgm:fillClrLst meth="repeat">
+      <a:schemeClr val="lt1"/>
+    </dgm:fillClrLst>
+    <dgm:linClrLst meth="repeat">
+      <a:schemeClr val="accent1"/>
+    </dgm:linClrLst>
+    <dgm:effectClrLst/>
+    <dgm:txLinClrLst/>
+    <dgm:txFillClrLst meth="repeat">
+      <a:schemeClr val="dk1"/>
+    </dgm:txFillClrLst>
+    <dgm:txEffectClrLst/>
+  </dgm:styleLbl>
+  <dgm:styleLbl name="solidAlignAcc1">
+    <dgm:fillClrLst meth="repeat">
+      <a:schemeClr val="lt1"/>
+    </dgm:fillClrLst>
+    <dgm:linClrLst meth="repeat">
+      <a:schemeClr val="accent1"/>
+    </dgm:linClrLst>
+    <dgm:effectClrLst/>
+    <dgm:txLinClrLst/>
+    <dgm:txFillClrLst meth="repeat">
+      <a:schemeClr val="dk1"/>
+    </dgm:txFillClrLst>
+    <dgm:txEffectClrLst/>
+  </dgm:styleLbl>
+  <dgm:styleLbl name="solidBgAcc1">
+    <dgm:fillClrLst meth="repeat">
+      <a:schemeClr val="lt1"/>
+    </dgm:fillClrLst>
+    <dgm:linClrLst meth="repeat">
+      <a:schemeClr val="accent1"/>
+    </dgm:linClrLst>
+    <dgm:effectClrLst/>
+    <dgm:txLinClrLst/>
+    <dgm:txFillClrLst meth="repeat">
+      <a:schemeClr val="dk1"/>
+    </dgm:txFillClrLst>
+    <dgm:txEffectClrLst/>
+  </dgm:styleLbl>
+  <dgm:styleLbl name="fgAccFollowNode1">
+    <dgm:fillClrLst meth="repeat">
+      <a:schemeClr val="accent1">
+        <a:alpha val="90000"/>
+        <a:tint val="40000"/>
+      </a:schemeClr>
+    </dgm:fillClrLst>
+    <dgm:linClrLst meth="repeat">
+      <a:schemeClr val="accent1">
+        <a:alpha val="90000"/>
+        <a:tint val="40000"/>
+      </a:schemeClr>
+    </dgm:linClrLst>
+    <dgm:effectClrLst/>
+    <dgm:txLinClrLst/>
+    <dgm:txFillClrLst meth="repeat">
+      <a:schemeClr val="dk1"/>
+    </dgm:txFillClrLst>
+    <dgm:txEffectClrLst/>
+  </dgm:styleLbl>
+  <dgm:styleLbl name="alignAccFollowNode1">
+    <dgm:fillClrLst meth="repeat">
+      <a:schemeClr val="accent1">
+        <a:alpha val="90000"/>
+        <a:tint val="40000"/>
+      </a:schemeClr>
+    </dgm:fillClrLst>
+    <dgm:linClrLst meth="repeat">
+      <a:schemeClr val="accent1">
+        <a:alpha val="90000"/>
+        <a:tint val="40000"/>
+      </a:schemeClr>
+    </dgm:linClrLst>
+    <dgm:effectClrLst/>
+    <dgm:txLinClrLst/>
+    <dgm:txFillClrLst meth="repeat">
+      <a:schemeClr val="dk1"/>
+    </dgm:txFillClrLst>
+    <dgm:txEffectClrLst/>
+  </dgm:styleLbl>
+  <dgm:styleLbl name="bgAccFollowNode1">
+    <dgm:fillClrLst meth="repeat">
+      <a:schemeClr val="accent1">
+        <a:alpha val="90000"/>
+        <a:tint val="40000"/>
+      </a:schemeClr>
+    </dgm:fillClrLst>
+    <dgm:linClrLst meth="repeat">
+      <a:schemeClr val="accent1">
+        <a:alpha val="90000"/>
+        <a:tint val="40000"/>
+      </a:schemeClr>
+    </dgm:linClrLst>
+    <dgm:effectClrLst/>
+    <dgm:txLinClrLst/>
+    <dgm:txFillClrLst meth="repeat">
+      <a:schemeClr val="dk1"/>
+    </dgm:txFillClrLst>
+    <dgm:txEffectClrLst/>
+  </dgm:styleLbl>
+  <dgm:styleLbl name="fgAcc0">
+    <dgm:fillClrLst meth="repeat">
+      <a:schemeClr val="lt1">
+        <a:alpha val="90000"/>
+      </a:schemeClr>
+    </dgm:fillClrLst>
+    <dgm:linClrLst meth="repeat">
+      <a:schemeClr val="accent1"/>
+    </dgm:linClrLst>
+    <dgm:effectClrLst/>
+    <dgm:txLinClrLst/>
+    <dgm:txFillClrLst meth="repeat">
+      <a:schemeClr val="dk1"/>
+    </dgm:txFillClrLst>
+    <dgm:txEffectClrLst/>
+  </dgm:styleLbl>
+  <dgm:styleLbl name="fgAcc2">
+    <dgm:fillClrLst meth="repeat">
+      <a:schemeClr val="lt1">
+        <a:alpha val="90000"/>
+      </a:schemeClr>
+    </dgm:fillClrLst>
+    <dgm:linClrLst meth="repeat">
+      <a:schemeClr val="accent1"/>
+    </dgm:linClrLst>
+    <dgm:effectClrLst/>
+    <dgm:txLinClrLst/>
+    <dgm:txFillClrLst meth="repeat">
+      <a:schemeClr val="dk1"/>
+    </dgm:txFillClrLst>
+    <dgm:txEffectClrLst/>
+  </dgm:styleLbl>
+  <dgm:styleLbl name="fgAcc3">
+    <dgm:fillClrLst meth="repeat">
+      <a:schemeClr val="lt1">
+        <a:alpha val="90000"/>
+      </a:schemeClr>
+    </dgm:fillClrLst>
+    <dgm:linClrLst meth="repeat">
+      <a:schemeClr val="accent1"/>
+    </dgm:linClrLst>
+    <dgm:effectClrLst/>
+    <dgm:txLinClrLst/>
+    <dgm:txFillClrLst meth="repeat">
+      <a:schemeClr val="dk1"/>
+    </dgm:txFillClrLst>
+    <dgm:txEffectClrLst/>
+  </dgm:styleLbl>
+  <dgm:styleLbl name="fgAcc4">
+    <dgm:fillClrLst meth="repeat">
+      <a:schemeClr val="lt1">
+        <a:alpha val="90000"/>
+      </a:schemeClr>
+    </dgm:fillClrLst>
+    <dgm:linClrLst meth="repeat">
+      <a:schemeClr val="accent1"/>
+    </dgm:linClrLst>
+    <dgm:effectClrLst/>
+    <dgm:txLinClrLst/>
+    <dgm:txFillClrLst meth="repeat">
+      <a:schemeClr val="dk1"/>
+    </dgm:txFillClrLst>
+    <dgm:txEffectClrLst/>
+  </dgm:styleLbl>
+  <dgm:styleLbl name="bgShp">
+    <dgm:fillClrLst meth="repeat">
+      <a:schemeClr val="accent1">
+        <a:tint val="40000"/>
+      </a:schemeClr>
+    </dgm:fillClrLst>
+    <dgm:linClrLst meth="repeat">
+      <a:schemeClr val="accent1"/>
+    </dgm:linClrLst>
+    <dgm:effectClrLst/>
+    <dgm:txLinClrLst/>
+    <dgm:txFillClrLst meth="repeat">
+      <a:schemeClr val="dk1"/>
+    </dgm:txFillClrLst>
+    <dgm:txEffectClrLst/>
+  </dgm:styleLbl>
+  <dgm:styleLbl name="dkBgShp">
+    <dgm:fillClrLst meth="repeat">
+      <a:schemeClr val="accent1">
+        <a:shade val="80000"/>
+      </a:schemeClr>
+    </dgm:fillClrLst>
+    <dgm:linClrLst meth="repeat">
+      <a:schemeClr val="accent1"/>
+    </dgm:linClrLst>
+    <dgm:effectClrLst/>
+    <dgm:txLinClrLst/>
+    <dgm:txFillClrLst meth="repeat">
+      <a:schemeClr val="lt1"/>
+    </dgm:txFillClrLst>
+    <dgm:txEffectClrLst/>
+  </dgm:styleLbl>
+  <dgm:styleLbl name="trBgShp">
+    <dgm:fillClrLst meth="repeat">
+      <a:schemeClr val="accent1">
+        <a:tint val="50000"/>
+        <a:alpha val="40000"/>
+      </a:schemeClr>
+    </dgm:fillClrLst>
+    <dgm:linClrLst meth="repeat">
+      <a:schemeClr val="accent1"/>
+    </dgm:linClrLst>
+    <dgm:effectClrLst/>
+    <dgm:txLinClrLst/>
+    <dgm:txFillClrLst meth="repeat">
+      <a:schemeClr val="lt1"/>
+    </dgm:txFillClrLst>
+    <dgm:txEffectClrLst/>
+  </dgm:styleLbl>
+  <dgm:styleLbl name="fgShp">
+    <dgm:fillClrLst meth="repeat">
+      <a:schemeClr val="accent1">
+        <a:tint val="60000"/>
+      </a:schemeClr>
+    </dgm:fillClrLst>
+    <dgm:linClrLst meth="repeat">
+      <a:schemeClr val="lt1"/>
+    </dgm:linClrLst>
+    <dgm:effectClrLst/>
+    <dgm:txLinClrLst/>
+    <dgm:txFillClrLst meth="repeat">
+      <a:schemeClr val="dk1"/>
+    </dgm:txFillClrLst>
+    <dgm:txEffectClrLst/>
+  </dgm:styleLbl>
+  <dgm:styleLbl name="revTx">
+    <dgm:fillClrLst meth="repeat">
+      <a:schemeClr val="lt1">
+        <a:alpha val="0"/>
+      </a:schemeClr>
+    </dgm:fillClrLst>
+    <dgm:linClrLst meth="repeat">
+      <a:schemeClr val="dk1">
+        <a:alpha val="0"/>
+      </a:schemeClr>
+    </dgm:linClrLst>
+    <dgm:effectClrLst/>
+    <dgm:txLinClrLst/>
+    <dgm:txFillClrLst meth="repeat">
+      <a:schemeClr val="tx1"/>
+    </dgm:txFillClrLst>
+    <dgm:txEffectClrLst/>
+  </dgm:styleLbl>
+</dgm:colorsDef>
+</file>
+
+<file path=ppt/diagrams/data1.xml><?xml version="1.0" encoding="utf-8"?>
+<dgm:dataModel xmlns:dgm="http://schemas.openxmlformats.org/drawingml/2006/diagram" xmlns:a="http://schemas.openxmlformats.org/drawingml/2006/main">
+  <dgm:ptLst>
+    <dgm:pt modelId="{CBEC6512-0D04-4895-A7A2-F6C6305DD3D4}" type="doc">
+      <dgm:prSet loTypeId="urn:microsoft.com/office/officeart/2018/2/layout/IconLabelList" loCatId="icon" qsTypeId="urn:microsoft.com/office/officeart/2005/8/quickstyle/simple1" qsCatId="simple" csTypeId="urn:microsoft.com/office/officeart/2005/8/colors/accent1_2" csCatId="accent1" phldr="1"/>
+      <dgm:spPr/>
+      <dgm:t>
+        <a:bodyPr/>
+        <a:lstStyle/>
+        <a:p>
+          <a:endParaRPr lang="en-US"/>
+        </a:p>
+      </dgm:t>
+    </dgm:pt>
+    <dgm:pt modelId="{61557C70-9446-49E6-A66F-F10FD244CCD6}">
+      <dgm:prSet/>
+      <dgm:spPr/>
+      <dgm:t>
+        <a:bodyPr/>
+        <a:lstStyle/>
+        <a:p>
+          <a:pPr>
+            <a:lnSpc>
+              <a:spcPct val="100000"/>
+            </a:lnSpc>
+          </a:pPr>
+          <a:r>
+            <a:rPr lang="fr-FR"/>
+            <a:t>Feedbacks</a:t>
+          </a:r>
+          <a:endParaRPr lang="en-US"/>
+        </a:p>
+      </dgm:t>
+    </dgm:pt>
+    <dgm:pt modelId="{A92FEAA1-CCC5-45BC-A6A2-579188455C24}" type="parTrans" cxnId="{13B8BAF3-A070-48AD-A2D7-DE10C2A77043}">
+      <dgm:prSet/>
+      <dgm:spPr/>
+      <dgm:t>
+        <a:bodyPr/>
+        <a:lstStyle/>
+        <a:p>
+          <a:endParaRPr lang="en-US"/>
+        </a:p>
+      </dgm:t>
+    </dgm:pt>
+    <dgm:pt modelId="{45A4E135-CBDF-491A-98F7-C5FFB1A73CC0}" type="sibTrans" cxnId="{13B8BAF3-A070-48AD-A2D7-DE10C2A77043}">
+      <dgm:prSet/>
+      <dgm:spPr/>
+      <dgm:t>
+        <a:bodyPr/>
+        <a:lstStyle/>
+        <a:p>
+          <a:endParaRPr lang="en-US"/>
+        </a:p>
+      </dgm:t>
+    </dgm:pt>
+    <dgm:pt modelId="{D3E21BE6-540A-49C9-868B-992C0645C671}">
+      <dgm:prSet/>
+      <dgm:spPr/>
+      <dgm:t>
+        <a:bodyPr/>
+        <a:lstStyle/>
+        <a:p>
+          <a:pPr>
+            <a:lnSpc>
+              <a:spcPct val="100000"/>
+            </a:lnSpc>
+          </a:pPr>
+          <a:r>
+            <a:rPr lang="fr-FR"/>
+            <a:t>Difficultés rencontrées</a:t>
+          </a:r>
+          <a:endParaRPr lang="en-US"/>
+        </a:p>
+      </dgm:t>
+    </dgm:pt>
+    <dgm:pt modelId="{F82CF650-F198-403F-B058-EBCB358F65E4}" type="parTrans" cxnId="{C33FD33C-1BB2-4A96-964C-712D22F76E2B}">
+      <dgm:prSet/>
+      <dgm:spPr/>
+      <dgm:t>
+        <a:bodyPr/>
+        <a:lstStyle/>
+        <a:p>
+          <a:endParaRPr lang="en-US"/>
+        </a:p>
+      </dgm:t>
+    </dgm:pt>
+    <dgm:pt modelId="{784805F7-9B30-4545-8290-5F24035B8E6E}" type="sibTrans" cxnId="{C33FD33C-1BB2-4A96-964C-712D22F76E2B}">
+      <dgm:prSet/>
+      <dgm:spPr/>
+      <dgm:t>
+        <a:bodyPr/>
+        <a:lstStyle/>
+        <a:p>
+          <a:endParaRPr lang="en-US"/>
+        </a:p>
+      </dgm:t>
+    </dgm:pt>
+    <dgm:pt modelId="{25CE2A79-0D7B-4566-9275-06AEA3D73CD2}">
+      <dgm:prSet/>
+      <dgm:spPr/>
+      <dgm:t>
+        <a:bodyPr/>
+        <a:lstStyle/>
+        <a:p>
+          <a:pPr>
+            <a:lnSpc>
+              <a:spcPct val="100000"/>
+            </a:lnSpc>
+          </a:pPr>
+          <a:r>
+            <a:rPr lang="fr-FR"/>
+            <a:t>Et après ?</a:t>
+          </a:r>
+          <a:endParaRPr lang="en-US"/>
+        </a:p>
+      </dgm:t>
+    </dgm:pt>
+    <dgm:pt modelId="{9C773F71-9228-459E-976B-BE111F30FDAC}" type="parTrans" cxnId="{2344670F-5121-4F25-84DB-2A4908645705}">
+      <dgm:prSet/>
+      <dgm:spPr/>
+      <dgm:t>
+        <a:bodyPr/>
+        <a:lstStyle/>
+        <a:p>
+          <a:endParaRPr lang="en-US"/>
+        </a:p>
+      </dgm:t>
+    </dgm:pt>
+    <dgm:pt modelId="{A9BE9258-01B6-4EC1-88AC-532FDCD58BA5}" type="sibTrans" cxnId="{2344670F-5121-4F25-84DB-2A4908645705}">
+      <dgm:prSet/>
+      <dgm:spPr/>
+      <dgm:t>
+        <a:bodyPr/>
+        <a:lstStyle/>
+        <a:p>
+          <a:endParaRPr lang="en-US"/>
+        </a:p>
+      </dgm:t>
+    </dgm:pt>
+    <dgm:pt modelId="{FD0D5348-2C7D-4619-8D7E-1C4E16D7CE66}" type="pres">
+      <dgm:prSet presAssocID="{CBEC6512-0D04-4895-A7A2-F6C6305DD3D4}" presName="root" presStyleCnt="0">
+        <dgm:presLayoutVars>
+          <dgm:dir/>
+          <dgm:resizeHandles val="exact"/>
+        </dgm:presLayoutVars>
+      </dgm:prSet>
+      <dgm:spPr/>
+    </dgm:pt>
+    <dgm:pt modelId="{0A79ADD0-0E82-4370-93CB-CA986E94A8F2}" type="pres">
+      <dgm:prSet presAssocID="{61557C70-9446-49E6-A66F-F10FD244CCD6}" presName="compNode" presStyleCnt="0"/>
+      <dgm:spPr/>
+    </dgm:pt>
+    <dgm:pt modelId="{10CBF13D-758A-4764-952E-39D39D827056}" type="pres">
+      <dgm:prSet presAssocID="{61557C70-9446-49E6-A66F-F10FD244CCD6}" presName="iconRect" presStyleLbl="node1" presStyleIdx="0" presStyleCnt="3"/>
+      <dgm:spPr>
+        <a:blipFill>
+          <a:blip xmlns:r="http://schemas.openxmlformats.org/officeDocument/2006/relationships" r:embed="rId1">
+            <a:extLst>
+              <a:ext uri="{28A0092B-C50C-407E-A947-70E740481C1C}">
+                <a14:useLocalDpi xmlns:a14="http://schemas.microsoft.com/office/drawing/2010/main" val="0"/>
+              </a:ext>
+              <a:ext uri="{96DAC541-7B7A-43D3-8B79-37D633B846F1}">
+                <asvg:svgBlip xmlns:asvg="http://schemas.microsoft.com/office/drawing/2016/SVG/main" r:embed="rId2"/>
+              </a:ext>
+            </a:extLst>
+          </a:blip>
+          <a:stretch>
+            <a:fillRect/>
+          </a:stretch>
+        </a:blipFill>
+      </dgm:spPr>
+      <dgm:extLst>
+        <a:ext uri="{E40237B7-FDA0-4F09-8148-C483321AD2D9}">
+          <dgm14:cNvPr xmlns:dgm14="http://schemas.microsoft.com/office/drawing/2010/diagram" id="0" name="" descr="Chat"/>
+        </a:ext>
+      </dgm:extLst>
+    </dgm:pt>
+    <dgm:pt modelId="{49A0571E-9FE8-4141-85BE-510EB9C1539A}" type="pres">
+      <dgm:prSet presAssocID="{61557C70-9446-49E6-A66F-F10FD244CCD6}" presName="spaceRect" presStyleCnt="0"/>
+      <dgm:spPr/>
+    </dgm:pt>
+    <dgm:pt modelId="{C65D75B0-39AA-4263-96F5-7C2AEE01BB8B}" type="pres">
+      <dgm:prSet presAssocID="{61557C70-9446-49E6-A66F-F10FD244CCD6}" presName="textRect" presStyleLbl="revTx" presStyleIdx="0" presStyleCnt="3">
+        <dgm:presLayoutVars>
+          <dgm:chMax val="1"/>
+          <dgm:chPref val="1"/>
+        </dgm:presLayoutVars>
+      </dgm:prSet>
+      <dgm:spPr/>
+    </dgm:pt>
+    <dgm:pt modelId="{A37F58C9-D87E-4976-9C37-50B38EA9CA4D}" type="pres">
+      <dgm:prSet presAssocID="{45A4E135-CBDF-491A-98F7-C5FFB1A73CC0}" presName="sibTrans" presStyleCnt="0"/>
+      <dgm:spPr/>
+    </dgm:pt>
+    <dgm:pt modelId="{AC5B9A77-95BE-45AD-9E30-5EDAEA0FDAA2}" type="pres">
+      <dgm:prSet presAssocID="{D3E21BE6-540A-49C9-868B-992C0645C671}" presName="compNode" presStyleCnt="0"/>
+      <dgm:spPr/>
+    </dgm:pt>
+    <dgm:pt modelId="{D21E5855-80E8-46E3-8707-488B5916ECAA}" type="pres">
+      <dgm:prSet presAssocID="{D3E21BE6-540A-49C9-868B-992C0645C671}" presName="iconRect" presStyleLbl="node1" presStyleIdx="1" presStyleCnt="3"/>
+      <dgm:spPr>
+        <a:blipFill>
+          <a:blip xmlns:r="http://schemas.openxmlformats.org/officeDocument/2006/relationships" r:embed="rId3">
+            <a:extLst>
+              <a:ext uri="{28A0092B-C50C-407E-A947-70E740481C1C}">
+                <a14:useLocalDpi xmlns:a14="http://schemas.microsoft.com/office/drawing/2010/main" val="0"/>
+              </a:ext>
+              <a:ext uri="{96DAC541-7B7A-43D3-8B79-37D633B846F1}">
+                <asvg:svgBlip xmlns:asvg="http://schemas.microsoft.com/office/drawing/2016/SVG/main" r:embed="rId4"/>
+              </a:ext>
+            </a:extLst>
+          </a:blip>
+          <a:stretch>
+            <a:fillRect/>
+          </a:stretch>
+        </a:blipFill>
+      </dgm:spPr>
+      <dgm:extLst>
+        <a:ext uri="{E40237B7-FDA0-4F09-8148-C483321AD2D9}">
+          <dgm14:cNvPr xmlns:dgm14="http://schemas.microsoft.com/office/drawing/2010/diagram" id="0" name="" descr="Avertissement"/>
+        </a:ext>
+      </dgm:extLst>
+    </dgm:pt>
+    <dgm:pt modelId="{226FE46E-1381-464C-9661-A39534C24074}" type="pres">
+      <dgm:prSet presAssocID="{D3E21BE6-540A-49C9-868B-992C0645C671}" presName="spaceRect" presStyleCnt="0"/>
+      <dgm:spPr/>
+    </dgm:pt>
+    <dgm:pt modelId="{A4CCE24D-7F0D-4D0A-890E-A674107EFD40}" type="pres">
+      <dgm:prSet presAssocID="{D3E21BE6-540A-49C9-868B-992C0645C671}" presName="textRect" presStyleLbl="revTx" presStyleIdx="1" presStyleCnt="3">
+        <dgm:presLayoutVars>
+          <dgm:chMax val="1"/>
+          <dgm:chPref val="1"/>
+        </dgm:presLayoutVars>
+      </dgm:prSet>
+      <dgm:spPr/>
+    </dgm:pt>
+    <dgm:pt modelId="{E90E0313-E95A-4899-9219-042BDBAAAEEC}" type="pres">
+      <dgm:prSet presAssocID="{784805F7-9B30-4545-8290-5F24035B8E6E}" presName="sibTrans" presStyleCnt="0"/>
+      <dgm:spPr/>
+    </dgm:pt>
+    <dgm:pt modelId="{2D482204-38D2-4146-BF32-8593627471B1}" type="pres">
+      <dgm:prSet presAssocID="{25CE2A79-0D7B-4566-9275-06AEA3D73CD2}" presName="compNode" presStyleCnt="0"/>
+      <dgm:spPr/>
+    </dgm:pt>
+    <dgm:pt modelId="{604ED729-9E8D-4CED-8A2F-1BC0316581B4}" type="pres">
+      <dgm:prSet presAssocID="{25CE2A79-0D7B-4566-9275-06AEA3D73CD2}" presName="iconRect" presStyleLbl="node1" presStyleIdx="2" presStyleCnt="3"/>
+      <dgm:spPr>
+        <a:blipFill>
+          <a:blip xmlns:r="http://schemas.openxmlformats.org/officeDocument/2006/relationships" r:embed="rId5">
+            <a:extLst>
+              <a:ext uri="{28A0092B-C50C-407E-A947-70E740481C1C}">
+                <a14:useLocalDpi xmlns:a14="http://schemas.microsoft.com/office/drawing/2010/main" val="0"/>
+              </a:ext>
+              <a:ext uri="{96DAC541-7B7A-43D3-8B79-37D633B846F1}">
+                <asvg:svgBlip xmlns:asvg="http://schemas.microsoft.com/office/drawing/2016/SVG/main" r:embed="rId6"/>
+              </a:ext>
+            </a:extLst>
+          </a:blip>
+          <a:stretch>
+            <a:fillRect/>
+          </a:stretch>
+        </a:blipFill>
+      </dgm:spPr>
+      <dgm:extLst>
+        <a:ext uri="{E40237B7-FDA0-4F09-8148-C483321AD2D9}">
+          <dgm14:cNvPr xmlns:dgm14="http://schemas.microsoft.com/office/drawing/2010/diagram" id="0" name="" descr="Poignée de main"/>
+        </a:ext>
+      </dgm:extLst>
+    </dgm:pt>
+    <dgm:pt modelId="{DBE0DFD4-8E99-41A8-B0CD-619D7D5ED9FD}" type="pres">
+      <dgm:prSet presAssocID="{25CE2A79-0D7B-4566-9275-06AEA3D73CD2}" presName="spaceRect" presStyleCnt="0"/>
+      <dgm:spPr/>
+    </dgm:pt>
+    <dgm:pt modelId="{0E27EFAD-69B1-43FB-903C-959D5FB34058}" type="pres">
+      <dgm:prSet presAssocID="{25CE2A79-0D7B-4566-9275-06AEA3D73CD2}" presName="textRect" presStyleLbl="revTx" presStyleIdx="2" presStyleCnt="3">
+        <dgm:presLayoutVars>
+          <dgm:chMax val="1"/>
+          <dgm:chPref val="1"/>
+        </dgm:presLayoutVars>
+      </dgm:prSet>
+      <dgm:spPr/>
+    </dgm:pt>
+  </dgm:ptLst>
+  <dgm:cxnLst>
+    <dgm:cxn modelId="{2344670F-5121-4F25-84DB-2A4908645705}" srcId="{CBEC6512-0D04-4895-A7A2-F6C6305DD3D4}" destId="{25CE2A79-0D7B-4566-9275-06AEA3D73CD2}" srcOrd="2" destOrd="0" parTransId="{9C773F71-9228-459E-976B-BE111F30FDAC}" sibTransId="{A9BE9258-01B6-4EC1-88AC-532FDCD58BA5}"/>
+    <dgm:cxn modelId="{09703910-23DA-45F0-823C-3DCB3469E440}" type="presOf" srcId="{25CE2A79-0D7B-4566-9275-06AEA3D73CD2}" destId="{0E27EFAD-69B1-43FB-903C-959D5FB34058}" srcOrd="0" destOrd="0" presId="urn:microsoft.com/office/officeart/2018/2/layout/IconLabelList"/>
+    <dgm:cxn modelId="{C33FD33C-1BB2-4A96-964C-712D22F76E2B}" srcId="{CBEC6512-0D04-4895-A7A2-F6C6305DD3D4}" destId="{D3E21BE6-540A-49C9-868B-992C0645C671}" srcOrd="1" destOrd="0" parTransId="{F82CF650-F198-403F-B058-EBCB358F65E4}" sibTransId="{784805F7-9B30-4545-8290-5F24035B8E6E}"/>
+    <dgm:cxn modelId="{2DBD5159-75A2-4309-9B6D-4452B9930854}" type="presOf" srcId="{61557C70-9446-49E6-A66F-F10FD244CCD6}" destId="{C65D75B0-39AA-4263-96F5-7C2AEE01BB8B}" srcOrd="0" destOrd="0" presId="urn:microsoft.com/office/officeart/2018/2/layout/IconLabelList"/>
+    <dgm:cxn modelId="{AAD12360-4780-4B0E-8444-C6099BB0E184}" type="presOf" srcId="{CBEC6512-0D04-4895-A7A2-F6C6305DD3D4}" destId="{FD0D5348-2C7D-4619-8D7E-1C4E16D7CE66}" srcOrd="0" destOrd="0" presId="urn:microsoft.com/office/officeart/2018/2/layout/IconLabelList"/>
+    <dgm:cxn modelId="{BC1C2C8D-CF7D-434A-8F5A-61A47E0748A7}" type="presOf" srcId="{D3E21BE6-540A-49C9-868B-992C0645C671}" destId="{A4CCE24D-7F0D-4D0A-890E-A674107EFD40}" srcOrd="0" destOrd="0" presId="urn:microsoft.com/office/officeart/2018/2/layout/IconLabelList"/>
+    <dgm:cxn modelId="{13B8BAF3-A070-48AD-A2D7-DE10C2A77043}" srcId="{CBEC6512-0D04-4895-A7A2-F6C6305DD3D4}" destId="{61557C70-9446-49E6-A66F-F10FD244CCD6}" srcOrd="0" destOrd="0" parTransId="{A92FEAA1-CCC5-45BC-A6A2-579188455C24}" sibTransId="{45A4E135-CBDF-491A-98F7-C5FFB1A73CC0}"/>
+    <dgm:cxn modelId="{531320CB-FB90-44CE-94F8-00850526611C}" type="presParOf" srcId="{FD0D5348-2C7D-4619-8D7E-1C4E16D7CE66}" destId="{0A79ADD0-0E82-4370-93CB-CA986E94A8F2}" srcOrd="0" destOrd="0" presId="urn:microsoft.com/office/officeart/2018/2/layout/IconLabelList"/>
+    <dgm:cxn modelId="{D4F0BBF1-CA7F-4702-9744-4EAE7E8F4F99}" type="presParOf" srcId="{0A79ADD0-0E82-4370-93CB-CA986E94A8F2}" destId="{10CBF13D-758A-4764-952E-39D39D827056}" srcOrd="0" destOrd="0" presId="urn:microsoft.com/office/officeart/2018/2/layout/IconLabelList"/>
+    <dgm:cxn modelId="{EDE2D2A4-F879-417B-8BF3-C9EAACD96450}" type="presParOf" srcId="{0A79ADD0-0E82-4370-93CB-CA986E94A8F2}" destId="{49A0571E-9FE8-4141-85BE-510EB9C1539A}" srcOrd="1" destOrd="0" presId="urn:microsoft.com/office/officeart/2018/2/layout/IconLabelList"/>
+    <dgm:cxn modelId="{32B5C7B5-5F7A-4E03-8F3E-CC08298F8F57}" type="presParOf" srcId="{0A79ADD0-0E82-4370-93CB-CA986E94A8F2}" destId="{C65D75B0-39AA-4263-96F5-7C2AEE01BB8B}" srcOrd="2" destOrd="0" presId="urn:microsoft.com/office/officeart/2018/2/layout/IconLabelList"/>
+    <dgm:cxn modelId="{FEC8EFE0-CCC9-4209-B1CF-22623607296F}" type="presParOf" srcId="{FD0D5348-2C7D-4619-8D7E-1C4E16D7CE66}" destId="{A37F58C9-D87E-4976-9C37-50B38EA9CA4D}" srcOrd="1" destOrd="0" presId="urn:microsoft.com/office/officeart/2018/2/layout/IconLabelList"/>
+    <dgm:cxn modelId="{09C3A74D-8B34-4CE4-876E-2D8C22DEB540}" type="presParOf" srcId="{FD0D5348-2C7D-4619-8D7E-1C4E16D7CE66}" destId="{AC5B9A77-95BE-45AD-9E30-5EDAEA0FDAA2}" srcOrd="2" destOrd="0" presId="urn:microsoft.com/office/officeart/2018/2/layout/IconLabelList"/>
+    <dgm:cxn modelId="{5B3BE868-02B1-4AB9-AC98-55B39B856E12}" type="presParOf" srcId="{AC5B9A77-95BE-45AD-9E30-5EDAEA0FDAA2}" destId="{D21E5855-80E8-46E3-8707-488B5916ECAA}" srcOrd="0" destOrd="0" presId="urn:microsoft.com/office/officeart/2018/2/layout/IconLabelList"/>
+    <dgm:cxn modelId="{3E499947-07E3-4E74-9612-74DBD6FC08D5}" type="presParOf" srcId="{AC5B9A77-95BE-45AD-9E30-5EDAEA0FDAA2}" destId="{226FE46E-1381-464C-9661-A39534C24074}" srcOrd="1" destOrd="0" presId="urn:microsoft.com/office/officeart/2018/2/layout/IconLabelList"/>
+    <dgm:cxn modelId="{A7AB47FB-EFF3-4AA1-AE2D-FCA235C8F308}" type="presParOf" srcId="{AC5B9A77-95BE-45AD-9E30-5EDAEA0FDAA2}" destId="{A4CCE24D-7F0D-4D0A-890E-A674107EFD40}" srcOrd="2" destOrd="0" presId="urn:microsoft.com/office/officeart/2018/2/layout/IconLabelList"/>
+    <dgm:cxn modelId="{81970594-9016-4E71-A44E-C159F6A7616F}" type="presParOf" srcId="{FD0D5348-2C7D-4619-8D7E-1C4E16D7CE66}" destId="{E90E0313-E95A-4899-9219-042BDBAAAEEC}" srcOrd="3" destOrd="0" presId="urn:microsoft.com/office/officeart/2018/2/layout/IconLabelList"/>
+    <dgm:cxn modelId="{7C9AC6BC-486C-45DF-A9B5-ED7CC107059A}" type="presParOf" srcId="{FD0D5348-2C7D-4619-8D7E-1C4E16D7CE66}" destId="{2D482204-38D2-4146-BF32-8593627471B1}" srcOrd="4" destOrd="0" presId="urn:microsoft.com/office/officeart/2018/2/layout/IconLabelList"/>
+    <dgm:cxn modelId="{C85F8E63-D60D-4673-B1DB-63BB4B906C14}" type="presParOf" srcId="{2D482204-38D2-4146-BF32-8593627471B1}" destId="{604ED729-9E8D-4CED-8A2F-1BC0316581B4}" srcOrd="0" destOrd="0" presId="urn:microsoft.com/office/officeart/2018/2/layout/IconLabelList"/>
+    <dgm:cxn modelId="{A7AF0EC6-3C92-4433-8616-E47E35337399}" type="presParOf" srcId="{2D482204-38D2-4146-BF32-8593627471B1}" destId="{DBE0DFD4-8E99-41A8-B0CD-619D7D5ED9FD}" srcOrd="1" destOrd="0" presId="urn:microsoft.com/office/officeart/2018/2/layout/IconLabelList"/>
+    <dgm:cxn modelId="{AD95C14D-8329-4BFC-B622-00E986051C53}" type="presParOf" srcId="{2D482204-38D2-4146-BF32-8593627471B1}" destId="{0E27EFAD-69B1-43FB-903C-959D5FB34058}" srcOrd="2" destOrd="0" presId="urn:microsoft.com/office/officeart/2018/2/layout/IconLabelList"/>
+  </dgm:cxnLst>
+  <dgm:bg/>
+  <dgm:whole/>
+  <dgm:extLst>
+    <a:ext uri="http://schemas.microsoft.com/office/drawing/2008/diagram">
+      <dsp:dataModelExt xmlns:dsp="http://schemas.microsoft.com/office/drawing/2008/diagram" relId="rId6" minVer="http://schemas.openxmlformats.org/drawingml/2006/diagram"/>
+    </a:ext>
+  </dgm:extLst>
+</dgm:dataModel>
+</file>
+
+<file path=ppt/diagrams/drawing1.xml><?xml version="1.0" encoding="utf-8"?>
+<dsp:drawing xmlns:dgm="http://schemas.openxmlformats.org/drawingml/2006/diagram" xmlns:dsp="http://schemas.microsoft.com/office/drawing/2008/diagram" xmlns:a="http://schemas.openxmlformats.org/drawingml/2006/main">
+  <dsp:spTree>
+    <dsp:nvGrpSpPr>
+      <dsp:cNvPr id="0" name=""/>
+      <dsp:cNvGrpSpPr/>
+    </dsp:nvGrpSpPr>
+    <dsp:grpSpPr/>
+    <dsp:sp modelId="{10CBF13D-758A-4764-952E-39D39D827056}">
+      <dsp:nvSpPr>
+        <dsp:cNvPr id="0" name=""/>
+        <dsp:cNvSpPr/>
+      </dsp:nvSpPr>
+      <dsp:spPr>
+        <a:xfrm>
+          <a:off x="634501" y="1081129"/>
+          <a:ext cx="810000" cy="810000"/>
+        </a:xfrm>
+        <a:prstGeom prst="rect">
+          <a:avLst/>
+        </a:prstGeom>
+        <a:blipFill>
+          <a:blip xmlns:r="http://schemas.openxmlformats.org/officeDocument/2006/relationships" r:embed="rId1">
+            <a:extLst>
+              <a:ext uri="{28A0092B-C50C-407E-A947-70E740481C1C}">
+                <a14:useLocalDpi xmlns:a14="http://schemas.microsoft.com/office/drawing/2010/main" val="0"/>
+              </a:ext>
+              <a:ext uri="{96DAC541-7B7A-43D3-8B79-37D633B846F1}">
+                <asvg:svgBlip xmlns:asvg="http://schemas.microsoft.com/office/drawing/2016/SVG/main" r:embed="rId2"/>
+              </a:ext>
+            </a:extLst>
+          </a:blip>
+          <a:stretch>
+            <a:fillRect/>
+          </a:stretch>
+        </a:blipFill>
+        <a:ln w="22225" cap="rnd" cmpd="sng" algn="ctr">
+          <a:solidFill>
+            <a:schemeClr val="lt1">
+              <a:hueOff val="0"/>
+              <a:satOff val="0"/>
+              <a:lumOff val="0"/>
+              <a:alphaOff val="0"/>
+            </a:schemeClr>
+          </a:solidFill>
+          <a:prstDash val="solid"/>
+        </a:ln>
+        <a:effectLst/>
+      </dsp:spPr>
+      <dsp:style>
+        <a:lnRef idx="2">
+          <a:scrgbClr r="0" g="0" b="0"/>
+        </a:lnRef>
+        <a:fillRef idx="1">
+          <a:scrgbClr r="0" g="0" b="0"/>
+        </a:fillRef>
+        <a:effectRef idx="0">
+          <a:scrgbClr r="0" g="0" b="0"/>
+        </a:effectRef>
+        <a:fontRef idx="minor">
+          <a:schemeClr val="lt1"/>
+        </a:fontRef>
+      </dsp:style>
+    </dsp:sp>
+    <dsp:sp modelId="{C65D75B0-39AA-4263-96F5-7C2AEE01BB8B}">
+      <dsp:nvSpPr>
+        <dsp:cNvPr id="0" name=""/>
+        <dsp:cNvSpPr/>
+      </dsp:nvSpPr>
+      <dsp:spPr>
+        <a:xfrm>
+          <a:off x="139501" y="2161136"/>
+          <a:ext cx="1800000" cy="720000"/>
+        </a:xfrm>
+        <a:prstGeom prst="rect">
+          <a:avLst/>
+        </a:prstGeom>
+        <a:noFill/>
+        <a:ln>
+          <a:noFill/>
+        </a:ln>
+        <a:effectLst/>
+      </dsp:spPr>
+      <dsp:style>
+        <a:lnRef idx="0">
+          <a:scrgbClr r="0" g="0" b="0"/>
+        </a:lnRef>
+        <a:fillRef idx="0">
+          <a:scrgbClr r="0" g="0" b="0"/>
+        </a:fillRef>
+        <a:effectRef idx="0">
+          <a:scrgbClr r="0" g="0" b="0"/>
+        </a:effectRef>
+        <a:fontRef idx="minor"/>
+      </dsp:style>
+      <dsp:txBody>
+        <a:bodyPr spcFirstLastPara="0" vert="horz" wrap="square" lIns="0" tIns="0" rIns="0" bIns="0" numCol="1" spcCol="1270" anchor="t" anchorCtr="0">
+          <a:noAutofit/>
+        </a:bodyPr>
+        <a:lstStyle/>
+        <a:p>
+          <a:pPr marL="0" lvl="0" indent="0" algn="ctr" defTabSz="1066800">
+            <a:lnSpc>
+              <a:spcPct val="100000"/>
+            </a:lnSpc>
+            <a:spcBef>
+              <a:spcPct val="0"/>
+            </a:spcBef>
+            <a:spcAft>
+              <a:spcPct val="35000"/>
+            </a:spcAft>
+            <a:buNone/>
+          </a:pPr>
+          <a:r>
+            <a:rPr lang="fr-FR" sz="2400" kern="1200"/>
+            <a:t>Feedbacks</a:t>
+          </a:r>
+          <a:endParaRPr lang="en-US" sz="2400" kern="1200"/>
+        </a:p>
+      </dsp:txBody>
+      <dsp:txXfrm>
+        <a:off x="139501" y="2161136"/>
+        <a:ext cx="1800000" cy="720000"/>
+      </dsp:txXfrm>
+    </dsp:sp>
+    <dsp:sp modelId="{D21E5855-80E8-46E3-8707-488B5916ECAA}">
+      <dsp:nvSpPr>
+        <dsp:cNvPr id="0" name=""/>
+        <dsp:cNvSpPr/>
+      </dsp:nvSpPr>
+      <dsp:spPr>
+        <a:xfrm>
+          <a:off x="2749501" y="1081129"/>
+          <a:ext cx="810000" cy="810000"/>
+        </a:xfrm>
+        <a:prstGeom prst="rect">
+          <a:avLst/>
+        </a:prstGeom>
+        <a:blipFill>
+          <a:blip xmlns:r="http://schemas.openxmlformats.org/officeDocument/2006/relationships" r:embed="rId3">
+            <a:extLst>
+              <a:ext uri="{28A0092B-C50C-407E-A947-70E740481C1C}">
+                <a14:useLocalDpi xmlns:a14="http://schemas.microsoft.com/office/drawing/2010/main" val="0"/>
+              </a:ext>
+              <a:ext uri="{96DAC541-7B7A-43D3-8B79-37D633B846F1}">
+                <asvg:svgBlip xmlns:asvg="http://schemas.microsoft.com/office/drawing/2016/SVG/main" r:embed="rId4"/>
+              </a:ext>
+            </a:extLst>
+          </a:blip>
+          <a:stretch>
+            <a:fillRect/>
+          </a:stretch>
+        </a:blipFill>
+        <a:ln w="22225" cap="rnd" cmpd="sng" algn="ctr">
+          <a:solidFill>
+            <a:schemeClr val="lt1">
+              <a:hueOff val="0"/>
+              <a:satOff val="0"/>
+              <a:lumOff val="0"/>
+              <a:alphaOff val="0"/>
+            </a:schemeClr>
+          </a:solidFill>
+          <a:prstDash val="solid"/>
+        </a:ln>
+        <a:effectLst/>
+      </dsp:spPr>
+      <dsp:style>
+        <a:lnRef idx="2">
+          <a:scrgbClr r="0" g="0" b="0"/>
+        </a:lnRef>
+        <a:fillRef idx="1">
+          <a:scrgbClr r="0" g="0" b="0"/>
+        </a:fillRef>
+        <a:effectRef idx="0">
+          <a:scrgbClr r="0" g="0" b="0"/>
+        </a:effectRef>
+        <a:fontRef idx="minor">
+          <a:schemeClr val="lt1"/>
+        </a:fontRef>
+      </dsp:style>
+    </dsp:sp>
+    <dsp:sp modelId="{A4CCE24D-7F0D-4D0A-890E-A674107EFD40}">
+      <dsp:nvSpPr>
+        <dsp:cNvPr id="0" name=""/>
+        <dsp:cNvSpPr/>
+      </dsp:nvSpPr>
+      <dsp:spPr>
+        <a:xfrm>
+          <a:off x="2254501" y="2161136"/>
+          <a:ext cx="1800000" cy="720000"/>
+        </a:xfrm>
+        <a:prstGeom prst="rect">
+          <a:avLst/>
+        </a:prstGeom>
+        <a:noFill/>
+        <a:ln>
+          <a:noFill/>
+        </a:ln>
+        <a:effectLst/>
+      </dsp:spPr>
+      <dsp:style>
+        <a:lnRef idx="0">
+          <a:scrgbClr r="0" g="0" b="0"/>
+        </a:lnRef>
+        <a:fillRef idx="0">
+          <a:scrgbClr r="0" g="0" b="0"/>
+        </a:fillRef>
+        <a:effectRef idx="0">
+          <a:scrgbClr r="0" g="0" b="0"/>
+        </a:effectRef>
+        <a:fontRef idx="minor"/>
+      </dsp:style>
+      <dsp:txBody>
+        <a:bodyPr spcFirstLastPara="0" vert="horz" wrap="square" lIns="0" tIns="0" rIns="0" bIns="0" numCol="1" spcCol="1270" anchor="t" anchorCtr="0">
+          <a:noAutofit/>
+        </a:bodyPr>
+        <a:lstStyle/>
+        <a:p>
+          <a:pPr marL="0" lvl="0" indent="0" algn="ctr" defTabSz="1066800">
+            <a:lnSpc>
+              <a:spcPct val="100000"/>
+            </a:lnSpc>
+            <a:spcBef>
+              <a:spcPct val="0"/>
+            </a:spcBef>
+            <a:spcAft>
+              <a:spcPct val="35000"/>
+            </a:spcAft>
+            <a:buNone/>
+          </a:pPr>
+          <a:r>
+            <a:rPr lang="fr-FR" sz="2400" kern="1200"/>
+            <a:t>Difficultés rencontrées</a:t>
+          </a:r>
+          <a:endParaRPr lang="en-US" sz="2400" kern="1200"/>
+        </a:p>
+      </dsp:txBody>
+      <dsp:txXfrm>
+        <a:off x="2254501" y="2161136"/>
+        <a:ext cx="1800000" cy="720000"/>
+      </dsp:txXfrm>
+    </dsp:sp>
+    <dsp:sp modelId="{604ED729-9E8D-4CED-8A2F-1BC0316581B4}">
+      <dsp:nvSpPr>
+        <dsp:cNvPr id="0" name=""/>
+        <dsp:cNvSpPr/>
+      </dsp:nvSpPr>
+      <dsp:spPr>
+        <a:xfrm>
+          <a:off x="4864501" y="1081129"/>
+          <a:ext cx="810000" cy="810000"/>
+        </a:xfrm>
+        <a:prstGeom prst="rect">
+          <a:avLst/>
+        </a:prstGeom>
+        <a:blipFill>
+          <a:blip xmlns:r="http://schemas.openxmlformats.org/officeDocument/2006/relationships" r:embed="rId5">
+            <a:extLst>
+              <a:ext uri="{28A0092B-C50C-407E-A947-70E740481C1C}">
+                <a14:useLocalDpi xmlns:a14="http://schemas.microsoft.com/office/drawing/2010/main" val="0"/>
+              </a:ext>
+              <a:ext uri="{96DAC541-7B7A-43D3-8B79-37D633B846F1}">
+                <asvg:svgBlip xmlns:asvg="http://schemas.microsoft.com/office/drawing/2016/SVG/main" r:embed="rId6"/>
+              </a:ext>
+            </a:extLst>
+          </a:blip>
+          <a:stretch>
+            <a:fillRect/>
+          </a:stretch>
+        </a:blipFill>
+        <a:ln w="22225" cap="rnd" cmpd="sng" algn="ctr">
+          <a:solidFill>
+            <a:schemeClr val="lt1">
+              <a:hueOff val="0"/>
+              <a:satOff val="0"/>
+              <a:lumOff val="0"/>
+              <a:alphaOff val="0"/>
+            </a:schemeClr>
+          </a:solidFill>
+          <a:prstDash val="solid"/>
+        </a:ln>
+        <a:effectLst/>
+      </dsp:spPr>
+      <dsp:style>
+        <a:lnRef idx="2">
+          <a:scrgbClr r="0" g="0" b="0"/>
+        </a:lnRef>
+        <a:fillRef idx="1">
+          <a:scrgbClr r="0" g="0" b="0"/>
+        </a:fillRef>
+        <a:effectRef idx="0">
+          <a:scrgbClr r="0" g="0" b="0"/>
+        </a:effectRef>
+        <a:fontRef idx="minor">
+          <a:schemeClr val="lt1"/>
+        </a:fontRef>
+      </dsp:style>
+    </dsp:sp>
+    <dsp:sp modelId="{0E27EFAD-69B1-43FB-903C-959D5FB34058}">
+      <dsp:nvSpPr>
+        <dsp:cNvPr id="0" name=""/>
+        <dsp:cNvSpPr/>
+      </dsp:nvSpPr>
+      <dsp:spPr>
+        <a:xfrm>
+          <a:off x="4369501" y="2161136"/>
+          <a:ext cx="1800000" cy="720000"/>
+        </a:xfrm>
+        <a:prstGeom prst="rect">
+          <a:avLst/>
+        </a:prstGeom>
+        <a:noFill/>
+        <a:ln>
+          <a:noFill/>
+        </a:ln>
+        <a:effectLst/>
+      </dsp:spPr>
+      <dsp:style>
+        <a:lnRef idx="0">
+          <a:scrgbClr r="0" g="0" b="0"/>
+        </a:lnRef>
+        <a:fillRef idx="0">
+          <a:scrgbClr r="0" g="0" b="0"/>
+        </a:fillRef>
+        <a:effectRef idx="0">
+          <a:scrgbClr r="0" g="0" b="0"/>
+        </a:effectRef>
+        <a:fontRef idx="minor"/>
+      </dsp:style>
+      <dsp:txBody>
+        <a:bodyPr spcFirstLastPara="0" vert="horz" wrap="square" lIns="0" tIns="0" rIns="0" bIns="0" numCol="1" spcCol="1270" anchor="t" anchorCtr="0">
+          <a:noAutofit/>
+        </a:bodyPr>
+        <a:lstStyle/>
+        <a:p>
+          <a:pPr marL="0" lvl="0" indent="0" algn="ctr" defTabSz="1066800">
+            <a:lnSpc>
+              <a:spcPct val="100000"/>
+            </a:lnSpc>
+            <a:spcBef>
+              <a:spcPct val="0"/>
+            </a:spcBef>
+            <a:spcAft>
+              <a:spcPct val="35000"/>
+            </a:spcAft>
+            <a:buNone/>
+          </a:pPr>
+          <a:r>
+            <a:rPr lang="fr-FR" sz="2400" kern="1200"/>
+            <a:t>Et après ?</a:t>
+          </a:r>
+          <a:endParaRPr lang="en-US" sz="2400" kern="1200"/>
+        </a:p>
+      </dsp:txBody>
+      <dsp:txXfrm>
+        <a:off x="4369501" y="2161136"/>
+        <a:ext cx="1800000" cy="720000"/>
+      </dsp:txXfrm>
+    </dsp:sp>
+  </dsp:spTree>
+</dsp:drawing>
+</file>
+
+<file path=ppt/diagrams/layout1.xml><?xml version="1.0" encoding="utf-8"?>
+<dgm:layoutDef xmlns:dgm="http://schemas.openxmlformats.org/drawingml/2006/diagram" xmlns:a="http://schemas.openxmlformats.org/drawingml/2006/main" uniqueId="urn:microsoft.com/office/officeart/2018/2/layout/IconLabelList">
+  <dgm:title val="Icon Label List"/>
+  <dgm:desc val="Use to show non-sequential or grouped chunks of information accompanied by a related visuals. Works best with icons or small pictures with short text captions."/>
+  <dgm:catLst>
+    <dgm:cat type="icon" pri="500"/>
+  </dgm:catLst>
+  <dgm:sampData useDef="1">
+    <dgm:dataModel>
+      <dgm:ptLst/>
+      <dgm:bg/>
+      <dgm:whole/>
+    </dgm:dataModel>
+  </dgm:sampData>
+  <dgm:styleData useDef="1">
+    <dgm:dataModel>
+      <dgm:ptLst/>
+      <dgm:bg/>
+      <dgm:whole/>
+    </dgm:dataModel>
+  </dgm:styleData>
+  <dgm:clrData useDef="1">
+    <dgm:dataModel>
+      <dgm:ptLst/>
+      <dgm:bg/>
+      <dgm:whole/>
+    </dgm:dataModel>
+  </dgm:clrData>
+  <dgm:layoutNode name="root">
+    <dgm:varLst>
+      <dgm:dir/>
+      <dgm:resizeHandles val="exact"/>
+    </dgm:varLst>
+    <dgm:choose name="Name0">
+      <dgm:if name="Name1" axis="self" func="var" arg="dir" op="equ" val="norm">
+        <dgm:alg type="snake">
+          <dgm:param type="grDir" val="tL"/>
+          <dgm:param type="flowDir" val="row"/>
+          <dgm:param type="contDir" val="sameDir"/>
+          <dgm:param type="off" val="ctr"/>
+          <dgm:param type="vertAlign" val="mid"/>
+          <dgm:param type="horzAlign" val="ctr"/>
+        </dgm:alg>
+      </dgm:if>
+      <dgm:else name="Name2">
+        <dgm:alg type="snake">
+          <dgm:param type="grDir" val="tR"/>
+          <dgm:param type="flowDir" val="row"/>
+          <dgm:param type="contDir" val="sameDir"/>
+          <dgm:param type="off" val="ctr"/>
+          <dgm:param type="vertAlign" val="mid"/>
+          <dgm:param type="horzAlign" val="ctr"/>
+        </dgm:alg>
+      </dgm:else>
+    </dgm:choose>
+    <dgm:shape xmlns:r="http://schemas.openxmlformats.org/officeDocument/2006/relationships" r:blip="">
+      <dgm:adjLst/>
+    </dgm:shape>
+    <dgm:presOf/>
+    <dgm:choose name="Name3">
+      <dgm:if name="Name4" axis="ch" ptType="node" func="cnt" op="lte" val="2">
+        <dgm:constrLst>
+          <dgm:constr type="h" for="ch" forName="compNode" refType="h" fact="0.4"/>
+          <dgm:constr type="w" for="ch" forName="compNode" val="120"/>
+          <dgm:constr type="w" for="ch" forName="sibTrans" refType="w" refFor="ch" refForName="compNode" fact="0.175"/>
+          <dgm:constr type="sp" refType="w" refFor="ch" refForName="compNode" op="equ" fact="0.25"/>
+          <dgm:constr type="primFontSz" for="des" ptType="node" op="equ" val="50"/>
+          <dgm:constr type="h" for="des" forName="compNode" op="equ"/>
+          <dgm:constr type="h" for="des" forName="textRect" op="equ"/>
+        </dgm:constrLst>
+      </dgm:if>
+      <dgm:if name="Name5" axis="ch" ptType="node" func="cnt" op="lte" val="4">
+        <dgm:constrLst>
+          <dgm:constr type="h" for="ch" forName="compNode" refType="h" fact="0.4"/>
+          <dgm:constr type="w" for="ch" forName="compNode" refType="w"/>
+          <dgm:constr type="w" for="ch" forName="sibTrans" refType="w" refFor="ch" refForName="compNode" fact="0.175"/>
+          <dgm:constr type="sp" refType="w" refFor="ch" refForName="compNode" op="equ" fact="0.25"/>
+          <dgm:constr type="primFontSz" for="des" ptType="node" op="equ" val="36"/>
+          <dgm:constr type="h" for="des" forName="compNode" op="equ"/>
+          <dgm:constr type="h" for="des" forName="textRect" op="equ"/>
+        </dgm:constrLst>
+      </dgm:if>
+      <dgm:else name="Name6">
+        <dgm:constrLst>
+          <dgm:constr type="h" for="ch" forName="compNode" refType="h" fact="0.4"/>
+          <dgm:constr type="w" for="ch" forName="compNode" refType="w"/>
+          <dgm:constr type="w" for="ch" forName="sibTrans" refType="w" refFor="ch" refForName="compNode" fact="0.175"/>
+          <dgm:constr type="sp" refType="w" refFor="ch" refForName="compNode" op="equ" fact="0.25"/>
+          <dgm:constr type="primFontSz" for="des" ptType="node" op="equ" val="24"/>
+          <dgm:constr type="h" for="des" forName="compNode" op="equ"/>
+          <dgm:constr type="h" for="des" forName="textRect" op="equ"/>
+        </dgm:constrLst>
+      </dgm:else>
+    </dgm:choose>
+    <dgm:ruleLst>
+      <dgm:rule type="w" for="ch" forName="compNode" val="50" fact="NaN" max="NaN"/>
+    </dgm:ruleLst>
+    <dgm:forEach name="Name7" axis="ch" ptType="node">
+      <dgm:layoutNode name="compNode">
+        <dgm:alg type="composite"/>
+        <dgm:shape xmlns:r="http://schemas.openxmlformats.org/officeDocument/2006/relationships" r:blip="">
+          <dgm:adjLst/>
+        </dgm:shape>
+        <dgm:presOf axis="self"/>
+        <dgm:constrLst>
+          <dgm:constr type="w" for="ch" forName="iconRect" refType="w" fact="0.45"/>
+          <dgm:constr type="h" for="ch" forName="iconRect" refType="w" refFor="ch" refForName="iconRect"/>
+          <dgm:constr type="ctrX" for="ch" forName="iconRect" refType="w" fact="0.5"/>
+          <dgm:constr type="t" for="ch" forName="iconRect"/>
+          <dgm:constr type="h" for="ch" forName="spaceRect" refType="h" fact="0.15"/>
+          <dgm:constr type="w" for="ch" forName="spaceRect" refType="w"/>
+          <dgm:constr type="l" for="ch" forName="spaceRect"/>
+          <dgm:constr type="t" for="ch" forName="spaceRect" refType="b" refFor="ch" refForName="iconRect"/>
+          <dgm:constr type="h" for="ch" forName="textRect" val="20"/>
+          <dgm:constr type="w" for="ch" forName="textRect" refType="w"/>
+          <dgm:constr type="l" for="ch" forName="textRect"/>
+          <dgm:constr type="t" for="ch" forName="textRect" refType="b" refFor="ch" refForName="spaceRect"/>
+        </dgm:constrLst>
+        <dgm:ruleLst>
+          <dgm:rule type="h" val="INF" fact="NaN" max="NaN"/>
+        </dgm:ruleLst>
+        <dgm:layoutNode name="iconRect" styleLbl="node1">
+          <dgm:alg type="sp"/>
+          <dgm:shape xmlns:r="http://schemas.openxmlformats.org/officeDocument/2006/relationships" type="rect" r:blip="" blipPhldr="1">
+            <dgm:adjLst/>
+          </dgm:shape>
+          <dgm:presOf/>
+          <dgm:constrLst/>
+          <dgm:ruleLst/>
+        </dgm:layoutNode>
+        <dgm:layoutNode name="spaceRect">
+          <dgm:alg type="sp"/>
+          <dgm:shape xmlns:r="http://schemas.openxmlformats.org/officeDocument/2006/relationships" r:blip="">
+            <dgm:adjLst/>
+          </dgm:shape>
+          <dgm:presOf/>
+          <dgm:constrLst/>
+          <dgm:ruleLst/>
+        </dgm:layoutNode>
+        <dgm:layoutNode name="textRect" styleLbl="revTx">
+          <dgm:varLst>
+            <dgm:chMax val="1"/>
+            <dgm:chPref val="1"/>
+          </dgm:varLst>
+          <dgm:alg type="tx">
+            <dgm:param type="txAnchorVert" val="t"/>
+          </dgm:alg>
+          <dgm:shape xmlns:r="http://schemas.openxmlformats.org/officeDocument/2006/relationships" type="rect" r:blip="">
+            <dgm:adjLst/>
+          </dgm:shape>
+          <dgm:presOf axis="self" ptType="node"/>
+          <dgm:constrLst>
+            <dgm:constr type="lMarg"/>
+            <dgm:constr type="rMarg"/>
+            <dgm:constr type="tMarg"/>
+            <dgm:constr type="bMarg"/>
+          </dgm:constrLst>
+          <dgm:ruleLst>
+            <dgm:rule type="primFontSz" val="11" fact="NaN" max="NaN"/>
+            <dgm:rule type="h" val="INF" fact="NaN" max="NaN"/>
+          </dgm:ruleLst>
+        </dgm:layoutNode>
+      </dgm:layoutNode>
+      <dgm:forEach name="Name8" axis="followSib" ptType="sibTrans" cnt="1">
+        <dgm:layoutNode name="sibTrans">
+          <dgm:alg type="sp"/>
+          <dgm:shape xmlns:r="http://schemas.openxmlformats.org/officeDocument/2006/relationships" r:blip="">
+            <dgm:adjLst/>
+          </dgm:shape>
+          <dgm:presOf axis="self"/>
+          <dgm:constrLst/>
+          <dgm:ruleLst/>
+        </dgm:layoutNode>
+      </dgm:forEach>
+    </dgm:forEach>
+  </dgm:layoutNode>
+  <dgm:extLst>
+    <a:ext uri="{68A01E43-0DF5-4B5B-8FA6-DAF915123BFB}">
+      <dgm1612:lstStyle xmlns:dgm1612="http://schemas.microsoft.com/office/drawing/2016/12/diagram">
+        <a:lvl1pPr>
+          <a:lnSpc>
+            <a:spcPct val="100000"/>
+          </a:lnSpc>
+        </a:lvl1pPr>
+      </dgm1612:lstStyle>
+    </a:ext>
+  </dgm:extLst>
+</dgm:layoutDef>
+</file>
+
+<file path=ppt/diagrams/quickStyle1.xml><?xml version="1.0" encoding="utf-8"?>
+<dgm:styleDef xmlns:dgm="http://schemas.openxmlformats.org/drawingml/2006/diagram" xmlns:a="http://schemas.openxmlformats.org/drawingml/2006/main" uniqueId="urn:microsoft.com/office/officeart/2005/8/quickstyle/simple1">
+  <dgm:title val=""/>
+  <dgm:desc val=""/>
+  <dgm:catLst>
+    <dgm:cat type="simple" pri="10100"/>
+  </dgm:catLst>
+  <dgm:scene3d>
+    <a:camera prst="orthographicFront"/>
+    <a:lightRig rig="threePt" dir="t"/>
+  </dgm:scene3d>
+  <dgm:styleLbl name="node0">
+    <dgm:scene3d>
+      <a:camera prst="orthographicFront"/>
+      <a:lightRig rig="threePt" dir="t"/>
+    </dgm:scene3d>
+    <dgm:sp3d/>
+    <dgm:txPr/>
+    <dgm:style>
+      <a:lnRef idx="2">
+        <a:scrgbClr r="0" g="0" b="0"/>
+      </a:lnRef>
+      <a:fillRef idx="1">
+        <a:scrgbClr r="0" g="0" b="0"/>
+      </a:fillRef>
+      <a:effectRef idx="0">
+        <a:scrgbClr r="0" g="0" b="0"/>
+      </a:effectRef>
+      <a:fontRef idx="minor">
+        <a:schemeClr val="lt1"/>
+      </a:fontRef>
+    </dgm:style>
+  </dgm:styleLbl>
+  <dgm:styleLbl name="lnNode1">
+    <dgm:scene3d>
+      <a:camera prst="orthographicFront"/>
+      <a:lightRig rig="threePt" dir="t"/>
+    </dgm:scene3d>
+    <dgm:sp3d/>
+    <dgm:txPr/>
+    <dgm:style>
+      <a:lnRef idx="2">
+        <a:scrgbClr r="0" g="0" b="0"/>
+      </a:lnRef>
+      <a:fillRef idx="1">
+        <a:scrgbClr r="0" g="0" b="0"/>
+      </a:fillRef>
+      <a:effectRef idx="0">
+        <a:scrgbClr r="0" g="0" b="0"/>
+      </a:effectRef>
+      <a:fontRef idx="minor">
+        <a:schemeClr val="lt1"/>
+      </a:fontRef>
+    </dgm:style>
+  </dgm:styleLbl>
+  <dgm:styleLbl name="vennNode1">
+    <dgm:scene3d>
+      <a:camera prst="orthographicFront"/>
+      <a:lightRig rig="threePt" dir="t"/>
+    </dgm:scene3d>
+    <dgm:sp3d/>
+    <dgm:txPr/>
+    <dgm:style>
+      <a:lnRef idx="2">
+        <a:scrgbClr r="0" g="0" b="0"/>
+      </a:lnRef>
+      <a:fillRef idx="1">
+        <a:scrgbClr r="0" g="0" b="0"/>
+      </a:fillRef>
+      <a:effectRef idx="0">
+        <a:scrgbClr r="0" g="0" b="0"/>
+      </a:effectRef>
+      <a:fontRef idx="minor">
+        <a:schemeClr val="tx1"/>
+      </a:fontRef>
+    </dgm:style>
+  </dgm:styleLbl>
+  <dgm:styleLbl name="alignNode1">
+    <dgm:scene3d>
+      <a:camera prst="orthographicFront"/>
+      <a:lightRig rig="threePt" dir="t"/>
+    </dgm:scene3d>
+    <dgm:sp3d/>
+    <dgm:txPr/>
+    <dgm:style>
+      <a:lnRef idx="2">
+        <a:scrgbClr r="0" g="0" b="0"/>
+      </a:lnRef>
+      <a:fillRef idx="1">
+        <a:scrgbClr r="0" g="0" b="0"/>
+      </a:fillRef>
+      <a:effectRef idx="0">
+        <a:scrgbClr r="0" g="0" b="0"/>
+      </a:effectRef>
+      <a:fontRef idx="minor">
+        <a:schemeClr val="lt1"/>
+      </a:fontRef>
+    </dgm:style>
+  </dgm:styleLbl>
+  <dgm:styleLbl name="node1">
+    <dgm:scene3d>
+      <a:camera prst="orthographicFront"/>
+      <a:lightRig rig="threePt" dir="t"/>
+    </dgm:scene3d>
+    <dgm:sp3d/>
+    <dgm:txPr/>
+    <dgm:style>
+      <a:lnRef idx="2">
+        <a:scrgbClr r="0" g="0" b="0"/>
+      </a:lnRef>
+      <a:fillRef idx="1">
+        <a:scrgbClr r="0" g="0" b="0"/>
+      </a:fillRef>
+      <a:effectRef idx="0">
+        <a:scrgbClr r="0" g="0" b="0"/>
+      </a:effectRef>
+      <a:fontRef idx="minor">
+        <a:schemeClr val="lt1"/>
+      </a:fontRef>
+    </dgm:style>
+  </dgm:styleLbl>
+  <dgm:styleLbl name="node2">
+    <dgm:scene3d>
+      <a:camera prst="orthographicFront"/>
+      <a:lightRig rig="threePt" dir="t"/>
+    </dgm:scene3d>
+    <dgm:sp3d/>
+    <dgm:txPr/>
+    <dgm:style>
+      <a:lnRef idx="2">
+        <a:scrgbClr r="0" g="0" b="0"/>
+      </a:lnRef>
+      <a:fillRef idx="1">
+        <a:scrgbClr r="0" g="0" b="0"/>
+      </a:fillRef>
+      <a:effectRef idx="0">
+        <a:scrgbClr r="0" g="0" b="0"/>
+      </a:effectRef>
+      <a:fontRef idx="minor">
+        <a:schemeClr val="lt1"/>
+      </a:fontRef>
+    </dgm:style>
+  </dgm:styleLbl>
+  <dgm:styleLbl name="node3">
+    <dgm:scene3d>
+      <a:camera prst="orthographicFront"/>
+      <a:lightRig rig="threePt" dir="t"/>
+    </dgm:scene3d>
+    <dgm:sp3d/>
+    <dgm:txPr/>
+    <dgm:style>
+      <a:lnRef idx="2">
+        <a:scrgbClr r="0" g="0" b="0"/>
+      </a:lnRef>
+      <a:fillRef idx="1">
+        <a:scrgbClr r="0" g="0" b="0"/>
+      </a:fillRef>
+      <a:effectRef idx="0">
+        <a:scrgbClr r="0" g="0" b="0"/>
+      </a:effectRef>
+      <a:fontRef idx="minor">
+        <a:schemeClr val="lt1"/>
+      </a:fontRef>
+    </dgm:style>
+  </dgm:styleLbl>
+  <dgm:styleLbl name="node4">
+    <dgm:scene3d>
+      <a:camera prst="orthographicFront"/>
+      <a:lightRig rig="threePt" dir="t"/>
+    </dgm:scene3d>
+    <dgm:sp3d/>
+    <dgm:txPr/>
+    <dgm:style>
+      <a:lnRef idx="2">
+        <a:scrgbClr r="0" g="0" b="0"/>
+      </a:lnRef>
+      <a:fillRef idx="1">
+        <a:scrgbClr r="0" g="0" b="0"/>
+      </a:fillRef>
+      <a:effectRef idx="0">
+        <a:scrgbClr r="0" g="0" b="0"/>
+      </a:effectRef>
+      <a:fontRef idx="minor">
+        <a:schemeClr val="lt1"/>
+      </a:fontRef>
+    </dgm:style>
+  </dgm:styleLbl>
+  <dgm:styleLbl name="fgImgPlace1">
+    <dgm:scene3d>
+      <a:camera prst="orthographicFront"/>
+      <a:lightRig rig="threePt" dir="t"/>
+    </dgm:scene3d>
+    <dgm:sp3d/>
+    <dgm:txPr/>
+    <dgm:style>
+      <a:lnRef idx="2">
+        <a:scrgbClr r="0" g="0" b="0"/>
+      </a:lnRef>
+      <a:fillRef idx="1">
+        <a:scrgbClr r="0" g="0" b="0"/>
+      </a:fillRef>
+      <a:effectRef idx="0">
+        <a:scrgbClr r="0" g="0" b="0"/>
+      </a:effectRef>
+      <a:fontRef idx="minor"/>
+    </dgm:style>
+  </dgm:styleLbl>
+  <dgm:styleLbl name="alignImgPlace1">
+    <dgm:scene3d>
+      <a:camera prst="orthographicFront"/>
+      <a:lightRig rig="threePt" dir="t"/>
+    </dgm:scene3d>
+    <dgm:sp3d/>
+    <dgm:txPr/>
+    <dgm:style>
+      <a:lnRef idx="2">
+        <a:scrgbClr r="0" g="0" b="0"/>
+      </a:lnRef>
+      <a:fillRef idx="1">
+        <a:scrgbClr r="0" g="0" b="0"/>
+      </a:fillRef>
+      <a:effectRef idx="0">
+        <a:scrgbClr r="0" g="0" b="0"/>
+      </a:effectRef>
+      <a:fontRef idx="minor"/>
+    </dgm:style>
+  </dgm:styleLbl>
+  <dgm:styleLbl name="bgImgPlace1">
+    <dgm:scene3d>
+      <a:camera prst="orthographicFront"/>
+      <a:lightRig rig="threePt" dir="t"/>
+    </dgm:scene3d>
+    <dgm:sp3d/>
+    <dgm:txPr/>
+    <dgm:style>
+      <a:lnRef idx="2">
+        <a:scrgbClr r="0" g="0" b="0"/>
+      </a:lnRef>
+      <a:fillRef idx="1">
+        <a:scrgbClr r="0" g="0" b="0"/>
+      </a:fillRef>
+      <a:effectRef idx="0">
+        <a:scrgbClr r="0" g="0" b="0"/>
+      </a:effectRef>
+      <a:fontRef idx="minor"/>
+    </dgm:style>
+  </dgm:styleLbl>
+  <dgm:styleLbl name="sibTrans2D1">
+    <dgm:scene3d>
+      <a:camera prst="orthographicFront"/>
+      <a:lightRig rig="threePt" dir="t"/>
+    </dgm:scene3d>
+    <dgm:sp3d/>
+    <dgm:txPr/>
+    <dgm:style>
+      <a:lnRef idx="0">
+        <a:scrgbClr r="0" g="0" b="0"/>
+      </a:lnRef>
+      <a:fillRef idx="1">
+        <a:scrgbClr r="0" g="0" b="0"/>
+      </a:fillRef>
+      <a:effectRef idx="0">
+        <a:scrgbClr r="0" g="0" b="0"/>
+      </a:effectRef>
+      <a:fontRef idx="minor">
+        <a:schemeClr val="lt1"/>
+      </a:fontRef>
+    </dgm:style>
+  </dgm:styleLbl>
+  <dgm:styleLbl name="fgSibTrans2D1">
+    <dgm:scene3d>
+      <a:camera prst="orthographicFront"/>
+      <a:lightRig rig="threePt" dir="t"/>
+    </dgm:scene3d>
+    <dgm:sp3d/>
+    <dgm:txPr/>
+    <dgm:style>
+      <a:lnRef idx="0">
+        <a:scrgbClr r="0" g="0" b="0"/>
+      </a:lnRef>
+      <a:fillRef idx="1">
+        <a:scrgbClr r="0" g="0" b="0"/>
+      </a:fillRef>
+      <a:effectRef idx="0">
+        <a:scrgbClr r="0" g="0" b="0"/>
+      </a:effectRef>
+      <a:fontRef idx="minor">
+        <a:schemeClr val="lt1"/>
+      </a:fontRef>
+    </dgm:style>
+  </dgm:styleLbl>
+  <dgm:styleLbl name="bgSibTrans2D1">
+    <dgm:scene3d>
+      <a:camera prst="orthographicFront"/>
+      <a:lightRig rig="threePt" dir="t"/>
+    </dgm:scene3d>
+    <dgm:sp3d/>
+    <dgm:txPr/>
+    <dgm:style>
+      <a:lnRef idx="0">
+        <a:scrgbClr r="0" g="0" b="0"/>
+      </a:lnRef>
+      <a:fillRef idx="1">
+        <a:scrgbClr r="0" g="0" b="0"/>
+      </a:fillRef>
+      <a:effectRef idx="0">
+        <a:scrgbClr r="0" g="0" b="0"/>
+      </a:effectRef>
+      <a:fontRef idx="minor">
+        <a:schemeClr val="lt1"/>
+      </a:fontRef>
+    </dgm:style>
+  </dgm:styleLbl>
+  <dgm:styleLbl name="sibTrans1D1">
+    <dgm:scene3d>
+      <a:camera prst="orthographicFront"/>
+      <a:lightRig rig="threePt" dir="t"/>
+    </dgm:scene3d>
+    <dgm:sp3d/>
+    <dgm:txPr/>
+    <dgm:style>
+      <a:lnRef idx="1">
+        <a:scrgbClr r="0" g="0" b="0"/>
+      </a:lnRef>
+      <a:fillRef idx="0">
+        <a:scrgbClr r="0" g="0" b="0"/>
+      </a:fillRef>
+      <a:effectRef idx="0">
+        <a:scrgbClr r="0" g="0" b="0"/>
+      </a:effectRef>
+      <a:fontRef idx="minor"/>
+    </dgm:style>
+  </dgm:styleLbl>
+  <dgm:styleLbl name="callout">
+    <dgm:scene3d>
+      <a:camera prst="orthographicFront"/>
+      <a:lightRig rig="threePt" dir="t"/>
+    </dgm:scene3d>
+    <dgm:sp3d/>
+    <dgm:txPr/>
+    <dgm:style>
+      <a:lnRef idx="2">
+        <a:scrgbClr r="0" g="0" b="0"/>
+      </a:lnRef>
+      <a:fillRef idx="1">
+        <a:scrgbClr r="0" g="0" b="0"/>
+      </a:fillRef>
+      <a:effectRef idx="0">
+        <a:scrgbClr r="0" g="0" b="0"/>
+      </a:effectRef>
+      <a:fontRef idx="minor"/>
+    </dgm:style>
+  </dgm:styleLbl>
+  <dgm:styleLbl name="asst0">
+    <dgm:scene3d>
+      <a:camera prst="orthographicFront"/>
+      <a:lightRig rig="threePt" dir="t"/>
+    </dgm:scene3d>
+    <dgm:sp3d/>
+    <dgm:txPr/>
+    <dgm:style>
+      <a:lnRef idx="2">
+        <a:scrgbClr r="0" g="0" b="0"/>
+      </a:lnRef>
+      <a:fillRef idx="1">
+        <a:scrgbClr r="0" g="0" b="0"/>
+      </a:fillRef>
+      <a:effectRef idx="0">
+        <a:scrgbClr r="0" g="0" b="0"/>
+      </a:effectRef>
+      <a:fontRef idx="minor">
+        <a:schemeClr val="lt1"/>
+      </a:fontRef>
+    </dgm:style>
+  </dgm:styleLbl>
+  <dgm:styleLbl name="asst1">
+    <dgm:scene3d>
+      <a:camera prst="orthographicFront"/>
+      <a:lightRig rig="threePt" dir="t"/>
+    </dgm:scene3d>
+    <dgm:sp3d/>
+    <dgm:txPr/>
+    <dgm:style>
+      <a:lnRef idx="2">
+        <a:scrgbClr r="0" g="0" b="0"/>
+      </a:lnRef>
+      <a:fillRef idx="1">
+        <a:scrgbClr r="0" g="0" b="0"/>
+      </a:fillRef>
+      <a:effectRef idx="0">
+        <a:scrgbClr r="0" g="0" b="0"/>
+      </a:effectRef>
+      <a:fontRef idx="minor">
+        <a:schemeClr val="lt1"/>
+      </a:fontRef>
+    </dgm:style>
+  </dgm:styleLbl>
+  <dgm:styleLbl name="asst2">
+    <dgm:scene3d>
+      <a:camera prst="orthographicFront"/>
+      <a:lightRig rig="threePt" dir="t"/>
+    </dgm:scene3d>
+    <dgm:sp3d/>
+    <dgm:txPr/>
+    <dgm:style>
+      <a:lnRef idx="2">
+        <a:scrgbClr r="0" g="0" b="0"/>
+      </a:lnRef>
+      <a:fillRef idx="1">
+        <a:scrgbClr r="0" g="0" b="0"/>
+      </a:fillRef>
+      <a:effectRef idx="0">
+        <a:scrgbClr r="0" g="0" b="0"/>
+      </a:effectRef>
+      <a:fontRef idx="minor">
+        <a:schemeClr val="lt1"/>
+      </a:fontRef>
+    </dgm:style>
+  </dgm:styleLbl>
+  <dgm:styleLbl name="asst3">
+    <dgm:scene3d>
+      <a:camera prst="orthographicFront"/>
+      <a:lightRig rig="threePt" dir="t"/>
+    </dgm:scene3d>
+    <dgm:sp3d/>
+    <dgm:txPr/>
+    <dgm:style>
+      <a:lnRef idx="2">
+        <a:scrgbClr r="0" g="0" b="0"/>
+      </a:lnRef>
+      <a:fillRef idx="1">
+        <a:scrgbClr r="0" g="0" b="0"/>
+      </a:fillRef>
+      <a:effectRef idx="0">
+        <a:scrgbClr r="0" g="0" b="0"/>
+      </a:effectRef>
+      <a:fontRef idx="minor">
+        <a:schemeClr val="lt1"/>
+      </a:fontRef>
+    </dgm:style>
+  </dgm:styleLbl>
+  <dgm:styleLbl name="asst4">
+    <dgm:scene3d>
+      <a:camera prst="orthographicFront"/>
+      <a:lightRig rig="threePt" dir="t"/>
+    </dgm:scene3d>
+    <dgm:sp3d/>
+    <dgm:txPr/>
+    <dgm:style>
+      <a:lnRef idx="2">
+        <a:scrgbClr r="0" g="0" b="0"/>
+      </a:lnRef>
+      <a:fillRef idx="1">
+        <a:scrgbClr r="0" g="0" b="0"/>
+      </a:fillRef>
+      <a:effectRef idx="0">
+        <a:scrgbClr r="0" g="0" b="0"/>
+      </a:effectRef>
+      <a:fontRef idx="minor">
+        <a:schemeClr val="lt1"/>
+      </a:fontRef>
+    </dgm:style>
+  </dgm:styleLbl>
+  <dgm:styleLbl name="parChTrans2D1">
+    <dgm:scene3d>
+      <a:camera prst="orthographicFront"/>
+      <a:lightRig rig="threePt" dir="t"/>
+    </dgm:scene3d>
+    <dgm:sp3d/>
+    <dgm:txPr/>
+    <dgm:style>
+      <a:lnRef idx="2">
+        <a:scrgbClr r="0" g="0" b="0"/>
+      </a:lnRef>
+      <a:fillRef idx="1">
+        <a:scrgbClr r="0" g="0" b="0"/>
+      </a:fillRef>
+      <a:effectRef idx="0">
+        <a:scrgbClr r="0" g="0" b="0"/>
+      </a:effectRef>
+      <a:fontRef idx="minor">
+        <a:schemeClr val="lt1"/>
+      </a:fontRef>
+    </dgm:style>
+  </dgm:styleLbl>
+  <dgm:styleLbl name="parChTrans2D2">
+    <dgm:scene3d>
+      <a:camera prst="orthographicFront"/>
+      <a:lightRig rig="threePt" dir="t"/>
+    </dgm:scene3d>
+    <dgm:sp3d/>
+    <dgm:txPr/>
+    <dgm:style>
+      <a:lnRef idx="2">
+        <a:scrgbClr r="0" g="0" b="0"/>
+      </a:lnRef>
+      <a:fillRef idx="1">
+        <a:scrgbClr r="0" g="0" b="0"/>
+      </a:fillRef>
+      <a:effectRef idx="0">
+        <a:scrgbClr r="0" g="0" b="0"/>
+      </a:effectRef>
+      <a:fontRef idx="minor">
+        <a:schemeClr val="lt1"/>
+      </a:fontRef>
+    </dgm:style>
+  </dgm:styleLbl>
+  <dgm:styleLbl name="parChTrans2D3">
+    <dgm:scene3d>
+      <a:camera prst="orthographicFront"/>
+      <a:lightRig rig="threePt" dir="t"/>
+    </dgm:scene3d>
+    <dgm:sp3d/>
+    <dgm:txPr/>
+    <dgm:style>
+      <a:lnRef idx="2">
+        <a:scrgbClr r="0" g="0" b="0"/>
+      </a:lnRef>
+      <a:fillRef idx="1">
+        <a:scrgbClr r="0" g="0" b="0"/>
+      </a:fillRef>
+      <a:effectRef idx="0">
+        <a:scrgbClr r="0" g="0" b="0"/>
+      </a:effectRef>
+      <a:fontRef idx="minor">
+        <a:schemeClr val="lt1"/>
+      </a:fontRef>
+    </dgm:style>
+  </dgm:styleLbl>
+  <dgm:styleLbl name="parChTrans2D4">
+    <dgm:scene3d>
+      <a:camera prst="orthographicFront"/>
+      <a:lightRig rig="threePt" dir="t"/>
+    </dgm:scene3d>
+    <dgm:sp3d/>
+    <dgm:txPr/>
+    <dgm:style>
+      <a:lnRef idx="2">
+        <a:scrgbClr r="0" g="0" b="0"/>
+      </a:lnRef>
+      <a:fillRef idx="1">
+        <a:scrgbClr r="0" g="0" b="0"/>
+      </a:fillRef>
+      <a:effectRef idx="0">
+        <a:scrgbClr r="0" g="0" b="0"/>
+      </a:effectRef>
+      <a:fontRef idx="minor">
+        <a:schemeClr val="lt1"/>
+      </a:fontRef>
+    </dgm:style>
+  </dgm:styleLbl>
+  <dgm:styleLbl name="parChTrans1D1">
+    <dgm:scene3d>
+      <a:camera prst="orthographicFront"/>
+      <a:lightRig rig="threePt" dir="t"/>
+    </dgm:scene3d>
+    <dgm:sp3d/>
+    <dgm:txPr/>
+    <dgm:style>
+      <a:lnRef idx="2">
+        <a:scrgbClr r="0" g="0" b="0"/>
+      </a:lnRef>
+      <a:fillRef idx="0">
+        <a:scrgbClr r="0" g="0" b="0"/>
+      </a:fillRef>
+      <a:effectRef idx="0">
+        <a:scrgbClr r="0" g="0" b="0"/>
+      </a:effectRef>
+      <a:fontRef idx="minor"/>
+    </dgm:style>
+  </dgm:styleLbl>
+  <dgm:styleLbl name="parChTrans1D2">
+    <dgm:scene3d>
+      <a:camera prst="orthographicFront"/>
+      <a:lightRig rig="threePt" dir="t"/>
+    </dgm:scene3d>
+    <dgm:sp3d/>
+    <dgm:txPr/>
+    <dgm:style>
+      <a:lnRef idx="2">
+        <a:scrgbClr r="0" g="0" b="0"/>
+      </a:lnRef>
+      <a:fillRef idx="0">
+        <a:scrgbClr r="0" g="0" b="0"/>
+      </a:fillRef>
+      <a:effectRef idx="0">
+        <a:scrgbClr r="0" g="0" b="0"/>
+      </a:effectRef>
+      <a:fontRef idx="minor"/>
+    </dgm:style>
+  </dgm:styleLbl>
+  <dgm:styleLbl name="parChTrans1D3">
+    <dgm:scene3d>
+      <a:camera prst="orthographicFront"/>
+      <a:lightRig rig="threePt" dir="t"/>
+    </dgm:scene3d>
+    <dgm:sp3d/>
+    <dgm:txPr/>
+    <dgm:style>
+      <a:lnRef idx="2">
+        <a:scrgbClr r="0" g="0" b="0"/>
+      </a:lnRef>
+      <a:fillRef idx="0">
+        <a:scrgbClr r="0" g="0" b="0"/>
+      </a:fillRef>
+      <a:effectRef idx="0">
+        <a:scrgbClr r="0" g="0" b="0"/>
+      </a:effectRef>
+      <a:fontRef idx="minor"/>
+    </dgm:style>
+  </dgm:styleLbl>
+  <dgm:styleLbl name="parChTrans1D4">
+    <dgm:scene3d>
+      <a:camera prst="orthographicFront"/>
+      <a:lightRig rig="threePt" dir="t"/>
+    </dgm:scene3d>
+    <dgm:sp3d/>
+    <dgm:txPr/>
+    <dgm:style>
+      <a:lnRef idx="2">
+        <a:scrgbClr r="0" g="0" b="0"/>
+      </a:lnRef>
+      <a:fillRef idx="0">
+        <a:scrgbClr r="0" g="0" b="0"/>
+      </a:fillRef>
+      <a:effectRef idx="0">
+        <a:scrgbClr r="0" g="0" b="0"/>
+      </a:effectRef>
+      <a:fontRef idx="minor"/>
+    </dgm:style>
+  </dgm:styleLbl>
+  <dgm:styleLbl name="fgAcc1">
+    <dgm:scene3d>
+      <a:camera prst="orthographicFront"/>
+      <a:lightRig rig="threePt" dir="t"/>
+    </dgm:scene3d>
+    <dgm:sp3d/>
+    <dgm:txPr/>
+    <dgm:style>
+      <a:lnRef idx="2">
+        <a:scrgbClr r="0" g="0" b="0"/>
+      </a:lnRef>
+      <a:fillRef idx="1">
+        <a:scrgbClr r="0" g="0" b="0"/>
+      </a:fillRef>
+      <a:effectRef idx="0">
+        <a:scrgbClr r="0" g="0" b="0"/>
+      </a:effectRef>
+      <a:fontRef idx="minor"/>
+    </dgm:style>
+  </dgm:styleLbl>
+  <dgm:styleLbl name="conFgAcc1">
+    <dgm:scene3d>
+      <a:camera prst="orthographicFront"/>
+      <a:lightRig rig="threePt" dir="t"/>
+    </dgm:scene3d>
+    <dgm:sp3d/>
+    <dgm:txPr/>
+    <dgm:style>
+      <a:lnRef idx="2">
+        <a:scrgbClr r="0" g="0" b="0"/>
+      </a:lnRef>
+      <a:fillRef idx="1">
+        <a:scrgbClr r="0" g="0" b="0"/>
+      </a:fillRef>
+      <a:effectRef idx="0">
+        <a:scrgbClr r="0" g="0" b="0"/>
+      </a:effectRef>
+      <a:fontRef idx="minor"/>
+    </dgm:style>
+  </dgm:styleLbl>
+  <dgm:styleLbl name="alignAcc1">
+    <dgm:scene3d>
+      <a:camera prst="orthographicFront"/>
+      <a:lightRig rig="threePt" dir="t"/>
+    </dgm:scene3d>
+    <dgm:sp3d/>
+    <dgm:txPr/>
+    <dgm:style>
+      <a:lnRef idx="2">
+        <a:scrgbClr r="0" g="0" b="0"/>
+      </a:lnRef>
+      <a:fillRef idx="1">
+        <a:scrgbClr r="0" g="0" b="0"/>
+      </a:fillRef>
+      <a:effectRef idx="0">
+        <a:scrgbClr r="0" g="0" b="0"/>
+      </a:effectRef>
+      <a:fontRef idx="minor"/>
+    </dgm:style>
+  </dgm:styleLbl>
+  <dgm:styleLbl name="trAlignAcc1">
+    <dgm:scene3d>
+      <a:camera prst="orthographicFront"/>
+      <a:lightRig rig="threePt" dir="t"/>
+    </dgm:scene3d>
+    <dgm:sp3d/>
+    <dgm:txPr/>
+    <dgm:style>
+      <a:lnRef idx="1">
+        <a:scrgbClr r="0" g="0" b="0"/>
+      </a:lnRef>
+      <a:fillRef idx="1">
+        <a:scrgbClr r="0" g="0" b="0"/>
+      </a:fillRef>
+      <a:effectRef idx="0">
+        <a:scrgbClr r="0" g="0" b="0"/>
+      </a:effectRef>
+      <a:fontRef idx="minor"/>
+    </dgm:style>
+  </dgm:styleLbl>
+  <dgm:styleLbl name="bgAcc1">
+    <dgm:scene3d>
+      <a:camera prst="orthographicFront"/>
+      <a:lightRig rig="threePt" dir="t"/>
+    </dgm:scene3d>
+    <dgm:sp3d/>
+    <dgm:txPr/>
+    <dgm:style>
+      <a:lnRef idx="2">
+        <a:scrgbClr r="0" g="0" b="0"/>
+      </a:lnRef>
+      <a:fillRef idx="1">
+        <a:scrgbClr r="0" g="0" b="0"/>
+      </a:fillRef>
+      <a:effectRef idx="0">
+        <a:scrgbClr r="0" g="0" b="0"/>
+      </a:effectRef>
+      <a:fontRef idx="minor"/>
+    </dgm:style>
+  </dgm:styleLbl>
+  <dgm:styleLbl name="solidFgAcc1">
+    <dgm:scene3d>
+      <a:camera prst="orthographicFront"/>
+      <a:lightRig rig="threePt" dir="t"/>
+    </dgm:scene3d>
+    <dgm:sp3d/>
+    <dgm:txPr/>
+    <dgm:style>
+      <a:lnRef idx="2">
+        <a:scrgbClr r="0" g="0" b="0"/>
+      </a:lnRef>
+      <a:fillRef idx="1">
+        <a:scrgbClr r="0" g="0" b="0"/>
+      </a:fillRef>
+      <a:effectRef idx="0">
+        <a:scrgbClr r="0" g="0" b="0"/>
+      </a:effectRef>
+      <a:fontRef idx="minor"/>
+    </dgm:style>
+  </dgm:styleLbl>
+  <dgm:styleLbl name="solidAlignAcc1">
+    <dgm:scene3d>
+      <a:camera prst="orthographicFront"/>
+      <a:lightRig rig="threePt" dir="t"/>
+    </dgm:scene3d>
+    <dgm:sp3d/>
+    <dgm:txPr/>
+    <dgm:style>
+      <a:lnRef idx="2">
+        <a:scrgbClr r="0" g="0" b="0"/>
+      </a:lnRef>
+      <a:fillRef idx="1">
+        <a:scrgbClr r="0" g="0" b="0"/>
+      </a:fillRef>
+      <a:effectRef idx="0">
+        <a:scrgbClr r="0" g="0" b="0"/>
+      </a:effectRef>
+      <a:fontRef idx="minor"/>
+    </dgm:style>
+  </dgm:styleLbl>
+  <dgm:styleLbl name="solidBgAcc1">
+    <dgm:scene3d>
+      <a:camera prst="orthographicFront"/>
+      <a:lightRig rig="threePt" dir="t"/>
+    </dgm:scene3d>
+    <dgm:sp3d/>
+    <dgm:txPr/>
+    <dgm:style>
+      <a:lnRef idx="2">
+        <a:scrgbClr r="0" g="0" b="0"/>
+      </a:lnRef>
+      <a:fillRef idx="1">
+        <a:scrgbClr r="0" g="0" b="0"/>
+      </a:fillRef>
+      <a:effectRef idx="0">
+        <a:scrgbClr r="0" g="0" b="0"/>
+      </a:effectRef>
+      <a:fontRef idx="minor"/>
+    </dgm:style>
+  </dgm:styleLbl>
+  <dgm:styleLbl name="fgAccFollowNode1">
+    <dgm:scene3d>
+      <a:camera prst="orthographicFront"/>
+      <a:lightRig rig="threePt" dir="t"/>
+    </dgm:scene3d>
+    <dgm:sp3d/>
+    <dgm:txPr/>
+    <dgm:style>
+      <a:lnRef idx="2">
+        <a:scrgbClr r="0" g="0" b="0"/>
+      </a:lnRef>
+      <a:fillRef idx="1">
+        <a:scrgbClr r="0" g="0" b="0"/>
+      </a:fillRef>
+      <a:effectRef idx="0">
+        <a:scrgbClr r="0" g="0" b="0"/>
+      </a:effectRef>
+      <a:fontRef idx="minor"/>
+    </dgm:style>
+  </dgm:styleLbl>
+  <dgm:styleLbl name="alignAccFollowNode1">
+    <dgm:scene3d>
+      <a:camera prst="orthographicFront"/>
+      <a:lightRig rig="threePt" dir="t"/>
+    </dgm:scene3d>
+    <dgm:sp3d/>
+    <dgm:txPr/>
+    <dgm:style>
+      <a:lnRef idx="2">
+        <a:scrgbClr r="0" g="0" b="0"/>
+      </a:lnRef>
+      <a:fillRef idx="1">
+        <a:scrgbClr r="0" g="0" b="0"/>
+      </a:fillRef>
+      <a:effectRef idx="0">
+        <a:scrgbClr r="0" g="0" b="0"/>
+      </a:effectRef>
+      <a:fontRef idx="minor"/>
+    </dgm:style>
+  </dgm:styleLbl>
+  <dgm:styleLbl name="bgAccFollowNode1">
+    <dgm:scene3d>
+      <a:camera prst="orthographicFront"/>
+      <a:lightRig rig="threePt" dir="t"/>
+    </dgm:scene3d>
+    <dgm:sp3d/>
+    <dgm:txPr/>
+    <dgm:style>
+      <a:lnRef idx="2">
+        <a:scrgbClr r="0" g="0" b="0"/>
+      </a:lnRef>
+      <a:fillRef idx="1">
+        <a:scrgbClr r="0" g="0" b="0"/>
+      </a:fillRef>
+      <a:effectRef idx="0">
+        <a:scrgbClr r="0" g="0" b="0"/>
+      </a:effectRef>
+      <a:fontRef idx="minor"/>
+    </dgm:style>
+  </dgm:styleLbl>
+  <dgm:styleLbl name="fgAcc0">
+    <dgm:scene3d>
+      <a:camera prst="orthographicFront"/>
+      <a:lightRig rig="threePt" dir="t"/>
+    </dgm:scene3d>
+    <dgm:sp3d/>
+    <dgm:txPr/>
+    <dgm:style>
+      <a:lnRef idx="2">
+        <a:scrgbClr r="0" g="0" b="0"/>
+      </a:lnRef>
+      <a:fillRef idx="1">
+        <a:scrgbClr r="0" g="0" b="0"/>
+      </a:fillRef>
+      <a:effectRef idx="0">
+        <a:scrgbClr r="0" g="0" b="0"/>
+      </a:effectRef>
+      <a:fontRef idx="minor"/>
+    </dgm:style>
+  </dgm:styleLbl>
+  <dgm:styleLbl name="fgAcc2">
+    <dgm:scene3d>
+      <a:camera prst="orthographicFront"/>
+      <a:lightRig rig="threePt" dir="t"/>
+    </dgm:scene3d>
+    <dgm:sp3d/>
+    <dgm:txPr/>
+    <dgm:style>
+      <a:lnRef idx="2">
+        <a:scrgbClr r="0" g="0" b="0"/>
+      </a:lnRef>
+      <a:fillRef idx="1">
+        <a:scrgbClr r="0" g="0" b="0"/>
+      </a:fillRef>
+      <a:effectRef idx="0">
+        <a:scrgbClr r="0" g="0" b="0"/>
+      </a:effectRef>
+      <a:fontRef idx="minor"/>
+    </dgm:style>
+  </dgm:styleLbl>
+  <dgm:styleLbl name="fgAcc3">
+    <dgm:scene3d>
+      <a:camera prst="orthographicFront"/>
+      <a:lightRig rig="threePt" dir="t"/>
+    </dgm:scene3d>
+    <dgm:sp3d/>
+    <dgm:txPr/>
+    <dgm:style>
+      <a:lnRef idx="2">
+        <a:scrgbClr r="0" g="0" b="0"/>
+      </a:lnRef>
+      <a:fillRef idx="1">
+        <a:scrgbClr r="0" g="0" b="0"/>
+      </a:fillRef>
+      <a:effectRef idx="0">
+        <a:scrgbClr r="0" g="0" b="0"/>
+      </a:effectRef>
+      <a:fontRef idx="minor"/>
+    </dgm:style>
+  </dgm:styleLbl>
+  <dgm:styleLbl name="fgAcc4">
+    <dgm:scene3d>
+      <a:camera prst="orthographicFront"/>
+      <a:lightRig rig="threePt" dir="t"/>
+    </dgm:scene3d>
+    <dgm:sp3d/>
+    <dgm:txPr/>
+    <dgm:style>
+      <a:lnRef idx="2">
+        <a:scrgbClr r="0" g="0" b="0"/>
+      </a:lnRef>
+      <a:fillRef idx="1">
+        <a:scrgbClr r="0" g="0" b="0"/>
+      </a:fillRef>
+      <a:effectRef idx="0">
+        <a:scrgbClr r="0" g="0" b="0"/>
+      </a:effectRef>
+      <a:fontRef idx="minor"/>
+    </dgm:style>
+  </dgm:styleLbl>
+  <dgm:styleLbl name="bgShp">
+    <dgm:scene3d>
+      <a:camera prst="orthographicFront"/>
+      <a:lightRig rig="threePt" dir="t"/>
+    </dgm:scene3d>
+    <dgm:sp3d/>
+    <dgm:txPr/>
+    <dgm:style>
+      <a:lnRef idx="0">
+        <a:scrgbClr r="0" g="0" b="0"/>
+      </a:lnRef>
+      <a:fillRef idx="1">
+        <a:scrgbClr r="0" g="0" b="0"/>
+      </a:fillRef>
+      <a:effectRef idx="0">
+        <a:scrgbClr r="0" g="0" b="0"/>
+      </a:effectRef>
+      <a:fontRef idx="minor"/>
+    </dgm:style>
+  </dgm:styleLbl>
+  <dgm:styleLbl name="dkBgShp">
+    <dgm:scene3d>
+      <a:camera prst="orthographicFront"/>
+      <a:lightRig rig="threePt" dir="t"/>
+    </dgm:scene3d>
+    <dgm:sp3d/>
+    <dgm:txPr/>
+    <dgm:style>
+      <a:lnRef idx="0">
+        <a:scrgbClr r="0" g="0" b="0"/>
+      </a:lnRef>
+      <a:fillRef idx="1">
+        <a:scrgbClr r="0" g="0" b="0"/>
+      </a:fillRef>
+      <a:effectRef idx="0">
+        <a:scrgbClr r="0" g="0" b="0"/>
+      </a:effectRef>
+      <a:fontRef idx="minor"/>
+    </dgm:style>
+  </dgm:styleLbl>
+  <dgm:styleLbl name="trBgShp">
+    <dgm:scene3d>
+      <a:camera prst="orthographicFront"/>
+      <a:lightRig rig="threePt" dir="t"/>
+    </dgm:scene3d>
+    <dgm:sp3d/>
+    <dgm:txPr/>
+    <dgm:style>
+      <a:lnRef idx="0">
+        <a:scrgbClr r="0" g="0" b="0"/>
+      </a:lnRef>
+      <a:fillRef idx="1">
+        <a:scrgbClr r="0" g="0" b="0"/>
+      </a:fillRef>
+      <a:effectRef idx="0">
+        <a:scrgbClr r="0" g="0" b="0"/>
+      </a:effectRef>
+      <a:fontRef idx="minor"/>
+    </dgm:style>
+  </dgm:styleLbl>
+  <dgm:styleLbl name="fgShp">
+    <dgm:scene3d>
+      <a:camera prst="orthographicFront"/>
+      <a:lightRig rig="threePt" dir="t"/>
+    </dgm:scene3d>
+    <dgm:sp3d/>
+    <dgm:txPr/>
+    <dgm:style>
+      <a:lnRef idx="2">
+        <a:scrgbClr r="0" g="0" b="0"/>
+      </a:lnRef>
+      <a:fillRef idx="1">
+        <a:scrgbClr r="0" g="0" b="0"/>
+      </a:fillRef>
+      <a:effectRef idx="0">
+        <a:scrgbClr r="0" g="0" b="0"/>
+      </a:effectRef>
+      <a:fontRef idx="minor"/>
+    </dgm:style>
+  </dgm:styleLbl>
+  <dgm:styleLbl name="revTx">
+    <dgm:scene3d>
+      <a:camera prst="orthographicFront"/>
+      <a:lightRig rig="threePt" dir="t"/>
+    </dgm:scene3d>
+    <dgm:sp3d/>
+    <dgm:txPr/>
+    <dgm:style>
+      <a:lnRef idx="0">
+        <a:scrgbClr r="0" g="0" b="0"/>
+      </a:lnRef>
+      <a:fillRef idx="0">
+        <a:scrgbClr r="0" g="0" b="0"/>
+      </a:fillRef>
+      <a:effectRef idx="0">
+        <a:scrgbClr r="0" g="0" b="0"/>
+      </a:effectRef>
+      <a:fontRef idx="minor"/>
+    </dgm:style>
+  </dgm:styleLbl>
+</dgm:styleDef>
+</file>
+
 <file path=ppt/slideLayouts/slideLayout1.xml><?xml version="1.0" encoding="utf-8"?>
 <p:sldLayout xmlns:a="http://schemas.openxmlformats.org/drawingml/2006/main" xmlns:r="http://schemas.openxmlformats.org/officeDocument/2006/relationships" xmlns:p="http://schemas.openxmlformats.org/presentationml/2006/main" type="title" preserve="1">
   <p:cSld name="Title Slide">
@@ -360,7 +3011,7 @@
           <a:p>
             <a:fld id="{ED291B17-9318-49DB-B28B-6E5994AE9581}" type="datetime1">
               <a:rPr lang="en-US" smtClean="0"/>
-              <a:t>1/23/23</a:t>
+              <a:t>1/24/23</a:t>
             </a:fld>
             <a:endParaRPr lang="en-US"/>
           </a:p>
@@ -563,7 +3214,7 @@
           <a:p>
             <a:fld id="{2CED4963-E985-44C4-B8C4-FDD613B7C2F8}" type="datetime1">
               <a:rPr lang="en-US" smtClean="0"/>
-              <a:t>1/23/23</a:t>
+              <a:t>1/24/23</a:t>
             </a:fld>
             <a:endParaRPr lang="en-US"/>
           </a:p>
@@ -925,7 +3576,7 @@
           <a:p>
             <a:fld id="{ED291B17-9318-49DB-B28B-6E5994AE9581}" type="datetime1">
               <a:rPr lang="en-US" smtClean="0"/>
-              <a:t>1/23/23</a:t>
+              <a:t>1/24/23</a:t>
             </a:fld>
             <a:endParaRPr lang="en-US"/>
           </a:p>
@@ -1123,7 +3774,7 @@
           <a:p>
             <a:fld id="{78DD82B9-B8EE-4375-B6FF-88FA6ABB15D9}" type="datetime1">
               <a:rPr lang="en-US" smtClean="0"/>
-              <a:t>1/23/23</a:t>
+              <a:t>1/24/23</a:t>
             </a:fld>
             <a:endParaRPr lang="en-US"/>
           </a:p>
@@ -1435,7 +4086,7 @@
           <a:p>
             <a:fld id="{B2497495-0637-405E-AE64-5CC7506D51F5}" type="datetime1">
               <a:rPr lang="en-US" smtClean="0"/>
-              <a:t>1/23/23</a:t>
+              <a:t>1/24/23</a:t>
             </a:fld>
             <a:endParaRPr lang="en-US"/>
           </a:p>
@@ -1688,7 +4339,7 @@
           <a:p>
             <a:fld id="{7BFFD690-9426-415D-8B65-26881E07B2D4}" type="datetime1">
               <a:rPr lang="en-US" smtClean="0"/>
-              <a:t>1/23/23</a:t>
+              <a:t>1/24/23</a:t>
             </a:fld>
             <a:endParaRPr lang="en-US"/>
           </a:p>
@@ -2110,7 +4761,7 @@
           <a:p>
             <a:fld id="{04C4989A-474C-40DE-95B9-011C28B71673}" type="datetime1">
               <a:rPr lang="en-US" smtClean="0"/>
-              <a:t>1/23/23</a:t>
+              <a:t>1/24/23</a:t>
             </a:fld>
             <a:endParaRPr lang="en-US"/>
           </a:p>
@@ -2233,7 +4884,7 @@
           <a:p>
             <a:fld id="{5DB4ED54-5B5E-4A04-93D3-5772E3CE3818}" type="datetime1">
               <a:rPr lang="en-US" smtClean="0"/>
-              <a:t>1/23/23</a:t>
+              <a:t>1/24/23</a:t>
             </a:fld>
             <a:endParaRPr lang="en-US"/>
           </a:p>
@@ -2328,7 +4979,7 @@
           <a:p>
             <a:fld id="{4EDE50D6-574B-40AF-946F-D52A04ADE379}" type="datetime1">
               <a:rPr lang="en-US" smtClean="0"/>
-              <a:t>1/23/23</a:t>
+              <a:t>1/24/23</a:t>
             </a:fld>
             <a:endParaRPr lang="en-US"/>
           </a:p>
@@ -2705,7 +5356,7 @@
           <a:p>
             <a:fld id="{D82884F1-FFEA-405F-9602-3DCA865EDA4E}" type="datetime1">
               <a:rPr lang="en-US" smtClean="0"/>
-              <a:t>1/23/23</a:t>
+              <a:t>1/24/23</a:t>
             </a:fld>
             <a:endParaRPr lang="en-US"/>
           </a:p>
@@ -2997,7 +5648,7 @@
           <a:p>
             <a:fld id="{7E18DB4A-8810-4A10-AD5C-D5E2C667F5B3}" type="datetime1">
               <a:rPr lang="en-US" smtClean="0"/>
-              <a:t>1/23/23</a:t>
+              <a:t>1/24/23</a:t>
             </a:fld>
             <a:endParaRPr lang="en-US"/>
           </a:p>
@@ -3212,7 +5863,7 @@
           <a:p>
             <a:fld id="{ED291B17-9318-49DB-B28B-6E5994AE9581}" type="datetime1">
               <a:rPr lang="en-US" smtClean="0"/>
-              <a:t>1/23/23</a:t>
+              <a:t>1/24/23</a:t>
             </a:fld>
             <a:endParaRPr lang="en-US"/>
           </a:p>
@@ -5139,65 +7790,32 @@
           </a:fontRef>
         </p:style>
       </p:sp>
-      <p:sp>
-        <p:nvSpPr>
-          <p:cNvPr id="3" name="Espace réservé du contenu 2">
+      <p:graphicFrame>
+        <p:nvGraphicFramePr>
+          <p:cNvPr id="13" name="Espace réservé du contenu 2">
             <a:extLst>
               <a:ext uri="{FF2B5EF4-FFF2-40B4-BE49-F238E27FC236}">
-                <a16:creationId xmlns:a16="http://schemas.microsoft.com/office/drawing/2014/main" id="{DA8C2DE9-60D1-087B-AD95-030105367C89}"/>
+                <a16:creationId xmlns:a16="http://schemas.microsoft.com/office/drawing/2014/main" id="{42B1A277-6958-41CA-BD41-2593966BC8AC}"/>
               </a:ext>
             </a:extLst>
           </p:cNvPr>
-          <p:cNvSpPr>
-            <a:spLocks noGrp="1"/>
-          </p:cNvSpPr>
+          <p:cNvGraphicFramePr>
+            <a:graphicFrameLocks noGrp="1"/>
+          </p:cNvGraphicFramePr>
           <p:nvPr>
             <p:ph idx="1"/>
           </p:nvPr>
-        </p:nvSpPr>
-        <p:spPr>
-          <a:xfrm>
-            <a:off x="581194" y="1896533"/>
-            <a:ext cx="6309003" cy="3962266"/>
-          </a:xfrm>
-        </p:spPr>
-        <p:txBody>
-          <a:bodyPr>
-            <a:normAutofit/>
-          </a:bodyPr>
-          <a:lstStyle/>
-          <a:p>
-            <a:r>
-              <a:rPr lang="fr-FR">
-                <a:solidFill>
-                  <a:schemeClr val="tx2"/>
-                </a:solidFill>
-              </a:rPr>
-              <a:t>Feedbacks</a:t>
-            </a:r>
-          </a:p>
-          <a:p>
-            <a:r>
-              <a:rPr lang="fr-FR">
-                <a:solidFill>
-                  <a:schemeClr val="tx2"/>
-                </a:solidFill>
-              </a:rPr>
-              <a:t>Difficultés rencontrées</a:t>
-            </a:r>
-          </a:p>
-          <a:p>
-            <a:r>
-              <a:rPr lang="fr-FR">
-                <a:solidFill>
-                  <a:schemeClr val="tx2"/>
-                </a:solidFill>
-              </a:rPr>
-              <a:t>Et après ?</a:t>
-            </a:r>
-          </a:p>
-        </p:txBody>
-      </p:sp>
+        </p:nvGraphicFramePr>
+        <p:xfrm>
+          <a:off x="581194" y="1896533"/>
+          <a:ext cx="6309003" cy="3962266"/>
+        </p:xfrm>
+        <a:graphic>
+          <a:graphicData uri="http://schemas.openxmlformats.org/drawingml/2006/diagram">
+            <dgm:relIds xmlns:dgm="http://schemas.openxmlformats.org/drawingml/2006/diagram" xmlns:r="http://schemas.openxmlformats.org/officeDocument/2006/relationships" r:dm="rId2" r:lo="rId3" r:qs="rId4" r:cs="rId5"/>
+          </a:graphicData>
+        </a:graphic>
+      </p:graphicFrame>
       <p:pic>
         <p:nvPicPr>
           <p:cNvPr id="5" name="Picture 4" descr="Plusieurs points d’interrogation sur fond noir">
@@ -5213,7 +7831,7 @@
           <p:nvPr/>
         </p:nvPicPr>
         <p:blipFill rotWithShape="1">
-          <a:blip r:embed="rId2"/>
+          <a:blip r:embed="rId7"/>
           <a:srcRect l="58454" r="2" b="2"/>
           <a:stretch/>
         </p:blipFill>
@@ -6740,7 +9358,7 @@
           <a:lstStyle/>
           <a:p>
             <a:r>
-              <a:rPr lang="en-US" b="0" kern="1200" cap="all">
+              <a:rPr lang="en-US" b="0" kern="1200" cap="all" dirty="0">
                 <a:solidFill>
                   <a:schemeClr val="tx2"/>
                 </a:solidFill>
@@ -6748,7 +9366,29 @@
                 <a:ea typeface="+mj-ea"/>
                 <a:cs typeface="+mj-cs"/>
               </a:rPr>
-              <a:t>Structure mvc - model</a:t>
+              <a:t>Structure </a:t>
+            </a:r>
+            <a:r>
+              <a:rPr lang="en-US" b="0" kern="1200" cap="all" dirty="0" err="1">
+                <a:solidFill>
+                  <a:schemeClr val="tx2"/>
+                </a:solidFill>
+                <a:latin typeface="+mj-lt"/>
+                <a:ea typeface="+mj-ea"/>
+                <a:cs typeface="+mj-cs"/>
+              </a:rPr>
+              <a:t>mvc</a:t>
+            </a:r>
+            <a:r>
+              <a:rPr lang="en-US" b="0" kern="1200" cap="all" dirty="0">
+                <a:solidFill>
+                  <a:schemeClr val="tx2"/>
+                </a:solidFill>
+                <a:latin typeface="+mj-lt"/>
+                <a:ea typeface="+mj-ea"/>
+                <a:cs typeface="+mj-cs"/>
+              </a:rPr>
+              <a:t> - model</a:t>
             </a:r>
           </a:p>
         </p:txBody>
@@ -6936,8 +9576,8 @@
         </p:nvSpPr>
         <p:spPr>
           <a:xfrm>
-            <a:off x="4382726" y="1896532"/>
-            <a:ext cx="6878108" cy="4504267"/>
+            <a:off x="4382725" y="1896532"/>
+            <a:ext cx="7747755" cy="4961468"/>
           </a:xfrm>
           <a:prstGeom prst="rect">
             <a:avLst/>
@@ -6945,7 +9585,7 @@
         </p:spPr>
         <p:txBody>
           <a:bodyPr vert="horz" lIns="91440" tIns="45720" rIns="91440" bIns="45720" rtlCol="0" anchor="ctr">
-            <a:normAutofit fontScale="77500" lnSpcReduction="20000"/>
+            <a:normAutofit fontScale="62500" lnSpcReduction="20000"/>
           </a:bodyPr>
           <a:lstStyle/>
           <a:p>
@@ -6967,6 +9607,55 @@
               <a:buChar char=""/>
             </a:pPr>
             <a:r>
+              <a:rPr lang="en-US" sz="2100" dirty="0" err="1">
+                <a:solidFill>
+                  <a:schemeClr val="tx1">
+                    <a:lumMod val="75000"/>
+                    <a:lumOff val="25000"/>
+                  </a:schemeClr>
+                </a:solidFill>
+              </a:rPr>
+              <a:t>APIKeys</a:t>
+            </a:r>
+            <a:endParaRPr lang="en-US" sz="2100" dirty="0">
+              <a:solidFill>
+                <a:schemeClr val="tx1">
+                  <a:lumMod val="75000"/>
+                  <a:lumOff val="25000"/>
+                </a:schemeClr>
+              </a:solidFill>
+            </a:endParaRPr>
+          </a:p>
+          <a:p>
+            <a:pPr marL="285750" indent="-285750" defTabSz="457200">
+              <a:lnSpc>
+                <a:spcPct val="90000"/>
+              </a:lnSpc>
+              <a:spcBef>
+                <a:spcPct val="20000"/>
+              </a:spcBef>
+              <a:spcAft>
+                <a:spcPts val="600"/>
+              </a:spcAft>
+              <a:buClr>
+                <a:schemeClr val="accent1"/>
+              </a:buClr>
+              <a:buSzPct val="92000"/>
+              <a:buFont typeface="Wingdings 2" panose="05020102010507070707" pitchFamily="18" charset="2"/>
+              <a:buChar char=""/>
+            </a:pPr>
+            <a:r>
+              <a:rPr lang="en-US" sz="2100" dirty="0" err="1">
+                <a:solidFill>
+                  <a:schemeClr val="tx1">
+                    <a:lumMod val="75000"/>
+                    <a:lumOff val="25000"/>
+                  </a:schemeClr>
+                </a:solidFill>
+              </a:rPr>
+              <a:t>Fichiers</a:t>
+            </a:r>
+            <a:r>
               <a:rPr lang="en-US" sz="2100" dirty="0">
                 <a:solidFill>
                   <a:schemeClr val="tx1">
@@ -6975,7 +9664,7 @@
                   </a:schemeClr>
                 </a:solidFill>
               </a:rPr>
-              <a:t>Fichiers Service</a:t>
+              <a:t> Service</a:t>
             </a:r>
           </a:p>
           <a:p>
@@ -7258,6 +9947,28 @@
                   </a:schemeClr>
                 </a:solidFill>
               </a:rPr>
+              <a:t>contrôler</a:t>
+            </a:r>
+            <a:r>
+              <a:rPr lang="en-US" dirty="0">
+                <a:solidFill>
+                  <a:schemeClr val="tx1">
+                    <a:lumMod val="75000"/>
+                    <a:lumOff val="25000"/>
+                  </a:schemeClr>
+                </a:solidFill>
+              </a:rPr>
+              <a:t> et </a:t>
+            </a:r>
+            <a:r>
+              <a:rPr lang="en-US" dirty="0" err="1">
+                <a:solidFill>
+                  <a:schemeClr val="tx1">
+                    <a:lumMod val="75000"/>
+                    <a:lumOff val="25000"/>
+                  </a:schemeClr>
+                </a:solidFill>
+              </a:rPr>
               <a:t>convertir</a:t>
             </a:r>
             <a:r>
@@ -7384,7 +10095,56 @@
                   </a:schemeClr>
                 </a:solidFill>
               </a:rPr>
-              <a:t>Comment les </a:t>
+              <a:t>Configuration par </a:t>
+            </a:r>
+            <a:r>
+              <a:rPr lang="en-US" dirty="0" err="1">
+                <a:solidFill>
+                  <a:schemeClr val="tx1">
+                    <a:lumMod val="75000"/>
+                    <a:lumOff val="25000"/>
+                  </a:schemeClr>
+                </a:solidFill>
+              </a:rPr>
+              <a:t>défaut</a:t>
+            </a:r>
+            <a:endParaRPr lang="en-US" dirty="0">
+              <a:solidFill>
+                <a:schemeClr val="tx1">
+                  <a:lumMod val="75000"/>
+                  <a:lumOff val="25000"/>
+                </a:schemeClr>
+              </a:solidFill>
+            </a:endParaRPr>
+          </a:p>
+          <a:p>
+            <a:pPr marL="742950" lvl="1" indent="-285750" defTabSz="457200">
+              <a:lnSpc>
+                <a:spcPct val="90000"/>
+              </a:lnSpc>
+              <a:spcBef>
+                <a:spcPct val="20000"/>
+              </a:spcBef>
+              <a:spcAft>
+                <a:spcPts val="600"/>
+              </a:spcAft>
+              <a:buClr>
+                <a:schemeClr val="accent1"/>
+              </a:buClr>
+              <a:buSzPct val="92000"/>
+              <a:buFont typeface="Wingdings 2" panose="05020102010507070707" pitchFamily="18" charset="2"/>
+              <a:buChar char=""/>
+            </a:pPr>
+            <a:r>
+              <a:rPr lang="en-US" dirty="0">
+                <a:solidFill>
+                  <a:schemeClr val="tx1">
+                    <a:lumMod val="75000"/>
+                    <a:lumOff val="25000"/>
+                  </a:schemeClr>
+                </a:solidFill>
+              </a:rPr>
+              <a:t>Inversion des </a:t>
             </a:r>
             <a:r>
               <a:rPr lang="en-US" dirty="0" err="1">
@@ -7397,6 +10157,33 @@
               </a:rPr>
               <a:t>langues</a:t>
             </a:r>
+            <a:endParaRPr lang="en-US" dirty="0">
+              <a:solidFill>
+                <a:schemeClr val="tx1">
+                  <a:lumMod val="75000"/>
+                  <a:lumOff val="25000"/>
+                </a:schemeClr>
+              </a:solidFill>
+            </a:endParaRPr>
+          </a:p>
+          <a:p>
+            <a:pPr marL="742950" lvl="1" indent="-285750" defTabSz="457200">
+              <a:lnSpc>
+                <a:spcPct val="90000"/>
+              </a:lnSpc>
+              <a:spcBef>
+                <a:spcPct val="20000"/>
+              </a:spcBef>
+              <a:spcAft>
+                <a:spcPts val="600"/>
+              </a:spcAft>
+              <a:buClr>
+                <a:schemeClr val="accent1"/>
+              </a:buClr>
+              <a:buSzPct val="92000"/>
+              <a:buFont typeface="Wingdings 2" panose="05020102010507070707" pitchFamily="18" charset="2"/>
+              <a:buChar char=""/>
+            </a:pPr>
             <a:r>
               <a:rPr lang="en-US" dirty="0">
                 <a:solidFill>
@@ -7406,7 +10193,7 @@
                   </a:schemeClr>
                 </a:solidFill>
               </a:rPr>
-              <a:t> </a:t>
+              <a:t>Obtention du bon tuple pour </a:t>
             </a:r>
             <a:r>
               <a:rPr lang="en-US" dirty="0" err="1">
@@ -7417,7 +10204,7 @@
                   </a:schemeClr>
                 </a:solidFill>
               </a:rPr>
-              <a:t>vont</a:t>
+              <a:t>l’appel</a:t>
             </a:r>
             <a:r>
               <a:rPr lang="en-US" dirty="0">
@@ -7428,71 +10215,8 @@
                   </a:schemeClr>
                 </a:solidFill>
               </a:rPr>
-              <a:t> </a:t>
-            </a:r>
-            <a:r>
-              <a:rPr lang="en-US" dirty="0" err="1">
-                <a:solidFill>
-                  <a:schemeClr val="tx1">
-                    <a:lumMod val="75000"/>
-                    <a:lumOff val="25000"/>
-                  </a:schemeClr>
-                </a:solidFill>
-              </a:rPr>
-              <a:t>êtres</a:t>
-            </a:r>
-            <a:r>
-              <a:rPr lang="en-US" dirty="0">
-                <a:solidFill>
-                  <a:schemeClr val="tx1">
-                    <a:lumMod val="75000"/>
-                    <a:lumOff val="25000"/>
-                  </a:schemeClr>
-                </a:solidFill>
-              </a:rPr>
-              <a:t> </a:t>
-            </a:r>
-            <a:r>
-              <a:rPr lang="en-US" dirty="0" err="1">
-                <a:solidFill>
-                  <a:schemeClr val="tx1">
-                    <a:lumMod val="75000"/>
-                    <a:lumOff val="25000"/>
-                  </a:schemeClr>
-                </a:solidFill>
-              </a:rPr>
-              <a:t>présentées</a:t>
-            </a:r>
-            <a:r>
-              <a:rPr lang="en-US" dirty="0">
-                <a:solidFill>
-                  <a:schemeClr val="tx1">
-                    <a:lumMod val="75000"/>
-                    <a:lumOff val="25000"/>
-                  </a:schemeClr>
-                </a:solidFill>
-              </a:rPr>
-              <a:t> et </a:t>
-            </a:r>
-            <a:r>
-              <a:rPr lang="en-US" dirty="0" err="1">
-                <a:solidFill>
-                  <a:schemeClr val="tx1">
-                    <a:lumMod val="75000"/>
-                    <a:lumOff val="25000"/>
-                  </a:schemeClr>
-                </a:solidFill>
-              </a:rPr>
-              <a:t>utilisées</a:t>
-            </a:r>
-            <a:endParaRPr lang="en-US" dirty="0">
-              <a:solidFill>
-                <a:schemeClr val="tx1">
-                  <a:lumMod val="75000"/>
-                  <a:lumOff val="25000"/>
-                </a:schemeClr>
-              </a:solidFill>
-            </a:endParaRPr>
+              <a:t> API</a:t>
+            </a:r>
           </a:p>
           <a:p>
             <a:pPr lvl="1" defTabSz="457200">

</xml_diff>